<commit_message>
Completed some initial slides
</commit_message>
<xml_diff>
--- a/Presentation/Slides/Presentation.pptx
+++ b/Presentation/Slides/Presentation.pptx
@@ -8,17 +8,20 @@
     <p:sldId id="256" r:id="rId2"/>
     <p:sldId id="257" r:id="rId3"/>
     <p:sldId id="258" r:id="rId4"/>
-    <p:sldId id="259" r:id="rId5"/>
-    <p:sldId id="260" r:id="rId6"/>
-    <p:sldId id="261" r:id="rId7"/>
-    <p:sldId id="262" r:id="rId8"/>
-    <p:sldId id="263" r:id="rId9"/>
-    <p:sldId id="264" r:id="rId10"/>
-    <p:sldId id="265" r:id="rId11"/>
-    <p:sldId id="266" r:id="rId12"/>
-    <p:sldId id="267" r:id="rId13"/>
-    <p:sldId id="269" r:id="rId14"/>
-    <p:sldId id="268" r:id="rId15"/>
+    <p:sldId id="270" r:id="rId5"/>
+    <p:sldId id="272" r:id="rId6"/>
+    <p:sldId id="271" r:id="rId7"/>
+    <p:sldId id="259" r:id="rId8"/>
+    <p:sldId id="260" r:id="rId9"/>
+    <p:sldId id="261" r:id="rId10"/>
+    <p:sldId id="262" r:id="rId11"/>
+    <p:sldId id="263" r:id="rId12"/>
+    <p:sldId id="264" r:id="rId13"/>
+    <p:sldId id="265" r:id="rId14"/>
+    <p:sldId id="266" r:id="rId15"/>
+    <p:sldId id="267" r:id="rId16"/>
+    <p:sldId id="269" r:id="rId17"/>
+    <p:sldId id="268" r:id="rId18"/>
   </p:sldIdLst>
   <p:sldSz cx="12192000" cy="6858000"/>
   <p:notesSz cx="6858000" cy="9144000"/>
@@ -117,6 +120,11 @@
       </a:defRPr>
     </a:lvl9pPr>
   </p:defaultTextStyle>
+  <p:extLst>
+    <p:ext uri="{EFAFB233-063F-42B5-8137-9DF3F51BA10A}">
+      <p15:sldGuideLst xmlns:p15="http://schemas.microsoft.com/office/powerpoint/2012/main"/>
+    </p:ext>
+  </p:extLst>
 </p:presentation>
 </file>
 
@@ -348,7 +356,7 @@
           <a:p>
             <a:fld id="{78698A89-16EE-414F-A76C-14F13C132678}" type="datetimeFigureOut">
               <a:rPr lang="en-US" smtClean="0"/>
-              <a:t>2024-06-10</a:t>
+              <a:t>2024-07-03</a:t>
             </a:fld>
             <a:endParaRPr lang="en-US"/>
           </a:p>
@@ -556,7 +564,7 @@
           <a:p>
             <a:fld id="{78698A89-16EE-414F-A76C-14F13C132678}" type="datetimeFigureOut">
               <a:rPr lang="en-US" smtClean="0"/>
-              <a:t>2024-06-10</a:t>
+              <a:t>2024-07-03</a:t>
             </a:fld>
             <a:endParaRPr lang="en-US"/>
           </a:p>
@@ -814,7 +822,7 @@
           <a:p>
             <a:fld id="{78698A89-16EE-414F-A76C-14F13C132678}" type="datetimeFigureOut">
               <a:rPr lang="en-US" smtClean="0"/>
-              <a:t>2024-06-10</a:t>
+              <a:t>2024-07-03</a:t>
             </a:fld>
             <a:endParaRPr lang="en-US"/>
           </a:p>
@@ -984,7 +992,7 @@
           <a:p>
             <a:fld id="{78698A89-16EE-414F-A76C-14F13C132678}" type="datetimeFigureOut">
               <a:rPr lang="en-US" smtClean="0"/>
-              <a:t>2024-06-10</a:t>
+              <a:t>2024-07-03</a:t>
             </a:fld>
             <a:endParaRPr lang="en-US"/>
           </a:p>
@@ -1321,7 +1329,7 @@
           <a:p>
             <a:fld id="{78698A89-16EE-414F-A76C-14F13C132678}" type="datetimeFigureOut">
               <a:rPr lang="en-US" smtClean="0"/>
-              <a:t>2024-06-10</a:t>
+              <a:t>2024-07-03</a:t>
             </a:fld>
             <a:endParaRPr lang="en-US"/>
           </a:p>
@@ -1596,7 +1604,7 @@
           <a:p>
             <a:fld id="{78698A89-16EE-414F-A76C-14F13C132678}" type="datetimeFigureOut">
               <a:rPr lang="en-US" smtClean="0"/>
-              <a:t>2024-06-10</a:t>
+              <a:t>2024-07-03</a:t>
             </a:fld>
             <a:endParaRPr lang="en-US"/>
           </a:p>
@@ -1979,7 +1987,7 @@
           <a:p>
             <a:fld id="{78698A89-16EE-414F-A76C-14F13C132678}" type="datetimeFigureOut">
               <a:rPr lang="en-US" smtClean="0"/>
-              <a:t>2024-06-10</a:t>
+              <a:t>2024-07-03</a:t>
             </a:fld>
             <a:endParaRPr lang="en-US"/>
           </a:p>
@@ -2097,7 +2105,7 @@
           <a:p>
             <a:fld id="{78698A89-16EE-414F-A76C-14F13C132678}" type="datetimeFigureOut">
               <a:rPr lang="en-US" smtClean="0"/>
-              <a:t>2024-06-10</a:t>
+              <a:t>2024-07-03</a:t>
             </a:fld>
             <a:endParaRPr lang="en-US"/>
           </a:p>
@@ -2270,7 +2278,7 @@
           <a:p>
             <a:fld id="{78698A89-16EE-414F-A76C-14F13C132678}" type="datetimeFigureOut">
               <a:rPr lang="en-US" smtClean="0"/>
-              <a:t>2024-06-10</a:t>
+              <a:t>2024-07-03</a:t>
             </a:fld>
             <a:endParaRPr lang="en-US"/>
           </a:p>
@@ -2626,7 +2634,7 @@
           <a:p>
             <a:fld id="{78698A89-16EE-414F-A76C-14F13C132678}" type="datetimeFigureOut">
               <a:rPr lang="en-US" smtClean="0"/>
-              <a:t>2024-06-10</a:t>
+              <a:t>2024-07-03</a:t>
             </a:fld>
             <a:endParaRPr lang="en-US"/>
           </a:p>
@@ -2974,7 +2982,7 @@
           <a:p>
             <a:fld id="{78698A89-16EE-414F-A76C-14F13C132678}" type="datetimeFigureOut">
               <a:rPr lang="en-US" smtClean="0"/>
-              <a:t>2024-06-10</a:t>
+              <a:t>2024-07-03</a:t>
             </a:fld>
             <a:endParaRPr lang="en-US"/>
           </a:p>
@@ -3285,7 +3293,7 @@
           <a:p>
             <a:fld id="{78698A89-16EE-414F-A76C-14F13C132678}" type="datetimeFigureOut">
               <a:rPr lang="en-US" smtClean="0"/>
-              <a:t>2024-06-10</a:t>
+              <a:t>2024-07-03</a:t>
             </a:fld>
             <a:endParaRPr lang="en-US"/>
           </a:p>
@@ -4016,11 +4024,7 @@
           <a:p>
             <a:r>
               <a:rPr lang="fr-FR" b="1" dirty="0"/>
-              <a:t>RAG: Document </a:t>
-            </a:r>
-            <a:r>
-              <a:rPr lang="fr-FR" b="1" dirty="0" err="1"/>
-              <a:t>Splitting</a:t>
+              <a:t>LangChain: Evaluation</a:t>
             </a:r>
             <a:endParaRPr lang="en-US" b="1" dirty="0"/>
           </a:p>
@@ -4082,7 +4086,7 @@
             <a:pPr algn="ctr"/>
             <a:r>
               <a:rPr lang="en-US" dirty="0"/>
-              <a:t>9 of n</a:t>
+              <a:t>6 of n</a:t>
             </a:r>
           </a:p>
         </p:txBody>
@@ -4090,7 +4094,7 @@
     </p:spTree>
     <p:extLst>
       <p:ext uri="{BB962C8B-B14F-4D97-AF65-F5344CB8AC3E}">
-        <p14:creationId xmlns:p14="http://schemas.microsoft.com/office/powerpoint/2010/main" val="1822237357"/>
+        <p14:creationId xmlns:p14="http://schemas.microsoft.com/office/powerpoint/2010/main" val="518678535"/>
       </p:ext>
     </p:extLst>
   </p:cSld>
@@ -4139,8 +4143,28 @@
           <a:lstStyle/>
           <a:p>
             <a:r>
+              <a:rPr lang="fr-FR" b="1" dirty="0" err="1"/>
+              <a:t>Retrieval</a:t>
+            </a:r>
+            <a:r>
               <a:rPr lang="fr-FR" b="1" dirty="0"/>
-              <a:t>RAG: Storage</a:t>
+              <a:t> </a:t>
+            </a:r>
+            <a:r>
+              <a:rPr lang="fr-FR" b="1" dirty="0" err="1"/>
+              <a:t>Augmented</a:t>
+            </a:r>
+            <a:r>
+              <a:rPr lang="fr-FR" b="1" dirty="0"/>
+              <a:t> </a:t>
+            </a:r>
+            <a:r>
+              <a:rPr lang="fr-FR" b="1" dirty="0" err="1"/>
+              <a:t>Generation</a:t>
+            </a:r>
+            <a:r>
+              <a:rPr lang="fr-FR" b="1" dirty="0"/>
+              <a:t> (RAG)</a:t>
             </a:r>
             <a:endParaRPr lang="en-US" b="1" dirty="0"/>
           </a:p>
@@ -4202,7 +4226,7 @@
             <a:pPr algn="ctr"/>
             <a:r>
               <a:rPr lang="en-US" dirty="0"/>
-              <a:t>10 of n</a:t>
+              <a:t>7 of n</a:t>
             </a:r>
           </a:p>
         </p:txBody>
@@ -4210,7 +4234,7 @@
     </p:spTree>
     <p:extLst>
       <p:ext uri="{BB962C8B-B14F-4D97-AF65-F5344CB8AC3E}">
-        <p14:creationId xmlns:p14="http://schemas.microsoft.com/office/powerpoint/2010/main" val="1364780128"/>
+        <p14:creationId xmlns:p14="http://schemas.microsoft.com/office/powerpoint/2010/main" val="494316150"/>
       </p:ext>
     </p:extLst>
   </p:cSld>
@@ -4260,11 +4284,11 @@
           <a:p>
             <a:r>
               <a:rPr lang="fr-FR" b="1" dirty="0"/>
-              <a:t>RAG: </a:t>
+              <a:t>RAG: Document </a:t>
             </a:r>
             <a:r>
               <a:rPr lang="fr-FR" b="1" dirty="0" err="1"/>
-              <a:t>Retrieval</a:t>
+              <a:t>Loading</a:t>
             </a:r>
             <a:endParaRPr lang="en-US" b="1" dirty="0"/>
           </a:p>
@@ -4326,7 +4350,7 @@
             <a:pPr algn="ctr"/>
             <a:r>
               <a:rPr lang="en-US" dirty="0"/>
-              <a:t>11 of n</a:t>
+              <a:t>8 of n</a:t>
             </a:r>
           </a:p>
         </p:txBody>
@@ -4334,7 +4358,7 @@
     </p:spTree>
     <p:extLst>
       <p:ext uri="{BB962C8B-B14F-4D97-AF65-F5344CB8AC3E}">
-        <p14:creationId xmlns:p14="http://schemas.microsoft.com/office/powerpoint/2010/main" val="644614161"/>
+        <p14:creationId xmlns:p14="http://schemas.microsoft.com/office/powerpoint/2010/main" val="1740740662"/>
       </p:ext>
     </p:extLst>
   </p:cSld>
@@ -4384,6 +4408,374 @@
           <a:p>
             <a:r>
               <a:rPr lang="fr-FR" b="1" dirty="0"/>
+              <a:t>RAG: Document </a:t>
+            </a:r>
+            <a:r>
+              <a:rPr lang="fr-FR" b="1" dirty="0" err="1"/>
+              <a:t>Splitting</a:t>
+            </a:r>
+            <a:endParaRPr lang="en-US" b="1" dirty="0"/>
+          </a:p>
+        </p:txBody>
+      </p:sp>
+      <p:sp>
+        <p:nvSpPr>
+          <p:cNvPr id="3" name="Content Placeholder 2">
+            <a:extLst>
+              <a:ext uri="{FF2B5EF4-FFF2-40B4-BE49-F238E27FC236}">
+                <a16:creationId xmlns:a16="http://schemas.microsoft.com/office/drawing/2014/main" id="{27634627-5020-42B4-8CFD-1B158C53CCAF}"/>
+              </a:ext>
+            </a:extLst>
+          </p:cNvPr>
+          <p:cNvSpPr>
+            <a:spLocks noGrp="1"/>
+          </p:cNvSpPr>
+          <p:nvPr>
+            <p:ph idx="1"/>
+          </p:nvPr>
+        </p:nvSpPr>
+        <p:spPr/>
+        <p:txBody>
+          <a:bodyPr/>
+          <a:lstStyle/>
+          <a:p>
+            <a:endParaRPr lang="en-US" dirty="0"/>
+          </a:p>
+        </p:txBody>
+      </p:sp>
+      <p:sp>
+        <p:nvSpPr>
+          <p:cNvPr id="4" name="TextBox 3">
+            <a:extLst>
+              <a:ext uri="{FF2B5EF4-FFF2-40B4-BE49-F238E27FC236}">
+                <a16:creationId xmlns:a16="http://schemas.microsoft.com/office/drawing/2014/main" id="{9ED3D534-BBDF-481B-B958-084DF4878A72}"/>
+              </a:ext>
+            </a:extLst>
+          </p:cNvPr>
+          <p:cNvSpPr txBox="1"/>
+          <p:nvPr/>
+        </p:nvSpPr>
+        <p:spPr>
+          <a:xfrm>
+            <a:off x="5650230" y="6451501"/>
+            <a:ext cx="1021473" cy="369332"/>
+          </a:xfrm>
+          <a:prstGeom prst="rect">
+            <a:avLst/>
+          </a:prstGeom>
+          <a:noFill/>
+        </p:spPr>
+        <p:txBody>
+          <a:bodyPr wrap="square" rtlCol="0">
+            <a:spAutoFit/>
+          </a:bodyPr>
+          <a:lstStyle/>
+          <a:p>
+            <a:pPr algn="ctr"/>
+            <a:r>
+              <a:rPr lang="en-US" dirty="0"/>
+              <a:t>9 of n</a:t>
+            </a:r>
+          </a:p>
+        </p:txBody>
+      </p:sp>
+    </p:spTree>
+    <p:extLst>
+      <p:ext uri="{BB962C8B-B14F-4D97-AF65-F5344CB8AC3E}">
+        <p14:creationId xmlns:p14="http://schemas.microsoft.com/office/powerpoint/2010/main" val="1822237357"/>
+      </p:ext>
+    </p:extLst>
+  </p:cSld>
+  <p:clrMapOvr>
+    <a:masterClrMapping/>
+  </p:clrMapOvr>
+</p:sld>
+</file>
+
+<file path=ppt/slides/slide14.xml><?xml version="1.0" encoding="utf-8"?>
+<p:sld xmlns:a="http://schemas.openxmlformats.org/drawingml/2006/main" xmlns:r="http://schemas.openxmlformats.org/officeDocument/2006/relationships" xmlns:p="http://schemas.openxmlformats.org/presentationml/2006/main">
+  <p:cSld>
+    <p:spTree>
+      <p:nvGrpSpPr>
+        <p:cNvPr id="1" name=""/>
+        <p:cNvGrpSpPr/>
+        <p:nvPr/>
+      </p:nvGrpSpPr>
+      <p:grpSpPr>
+        <a:xfrm>
+          <a:off x="0" y="0"/>
+          <a:ext cx="0" cy="0"/>
+          <a:chOff x="0" y="0"/>
+          <a:chExt cx="0" cy="0"/>
+        </a:xfrm>
+      </p:grpSpPr>
+      <p:sp>
+        <p:nvSpPr>
+          <p:cNvPr id="2" name="Title 1">
+            <a:extLst>
+              <a:ext uri="{FF2B5EF4-FFF2-40B4-BE49-F238E27FC236}">
+                <a16:creationId xmlns:a16="http://schemas.microsoft.com/office/drawing/2014/main" id="{496A992F-F5B0-4546-9577-213FDA0B45F9}"/>
+              </a:ext>
+            </a:extLst>
+          </p:cNvPr>
+          <p:cNvSpPr>
+            <a:spLocks noGrp="1"/>
+          </p:cNvSpPr>
+          <p:nvPr>
+            <p:ph type="title"/>
+          </p:nvPr>
+        </p:nvSpPr>
+        <p:spPr/>
+        <p:txBody>
+          <a:bodyPr/>
+          <a:lstStyle/>
+          <a:p>
+            <a:r>
+              <a:rPr lang="fr-FR" b="1" dirty="0"/>
+              <a:t>RAG: Storage</a:t>
+            </a:r>
+            <a:endParaRPr lang="en-US" b="1" dirty="0"/>
+          </a:p>
+        </p:txBody>
+      </p:sp>
+      <p:sp>
+        <p:nvSpPr>
+          <p:cNvPr id="3" name="Content Placeholder 2">
+            <a:extLst>
+              <a:ext uri="{FF2B5EF4-FFF2-40B4-BE49-F238E27FC236}">
+                <a16:creationId xmlns:a16="http://schemas.microsoft.com/office/drawing/2014/main" id="{27634627-5020-42B4-8CFD-1B158C53CCAF}"/>
+              </a:ext>
+            </a:extLst>
+          </p:cNvPr>
+          <p:cNvSpPr>
+            <a:spLocks noGrp="1"/>
+          </p:cNvSpPr>
+          <p:nvPr>
+            <p:ph idx="1"/>
+          </p:nvPr>
+        </p:nvSpPr>
+        <p:spPr/>
+        <p:txBody>
+          <a:bodyPr/>
+          <a:lstStyle/>
+          <a:p>
+            <a:endParaRPr lang="en-US" dirty="0"/>
+          </a:p>
+        </p:txBody>
+      </p:sp>
+      <p:sp>
+        <p:nvSpPr>
+          <p:cNvPr id="4" name="TextBox 3">
+            <a:extLst>
+              <a:ext uri="{FF2B5EF4-FFF2-40B4-BE49-F238E27FC236}">
+                <a16:creationId xmlns:a16="http://schemas.microsoft.com/office/drawing/2014/main" id="{9ED3D534-BBDF-481B-B958-084DF4878A72}"/>
+              </a:ext>
+            </a:extLst>
+          </p:cNvPr>
+          <p:cNvSpPr txBox="1"/>
+          <p:nvPr/>
+        </p:nvSpPr>
+        <p:spPr>
+          <a:xfrm>
+            <a:off x="5650230" y="6451501"/>
+            <a:ext cx="1021473" cy="369332"/>
+          </a:xfrm>
+          <a:prstGeom prst="rect">
+            <a:avLst/>
+          </a:prstGeom>
+          <a:noFill/>
+        </p:spPr>
+        <p:txBody>
+          <a:bodyPr wrap="square" rtlCol="0">
+            <a:spAutoFit/>
+          </a:bodyPr>
+          <a:lstStyle/>
+          <a:p>
+            <a:pPr algn="ctr"/>
+            <a:r>
+              <a:rPr lang="en-US" dirty="0"/>
+              <a:t>10 of n</a:t>
+            </a:r>
+          </a:p>
+        </p:txBody>
+      </p:sp>
+    </p:spTree>
+    <p:extLst>
+      <p:ext uri="{BB962C8B-B14F-4D97-AF65-F5344CB8AC3E}">
+        <p14:creationId xmlns:p14="http://schemas.microsoft.com/office/powerpoint/2010/main" val="1364780128"/>
+      </p:ext>
+    </p:extLst>
+  </p:cSld>
+  <p:clrMapOvr>
+    <a:masterClrMapping/>
+  </p:clrMapOvr>
+</p:sld>
+</file>
+
+<file path=ppt/slides/slide15.xml><?xml version="1.0" encoding="utf-8"?>
+<p:sld xmlns:a="http://schemas.openxmlformats.org/drawingml/2006/main" xmlns:r="http://schemas.openxmlformats.org/officeDocument/2006/relationships" xmlns:p="http://schemas.openxmlformats.org/presentationml/2006/main">
+  <p:cSld>
+    <p:spTree>
+      <p:nvGrpSpPr>
+        <p:cNvPr id="1" name=""/>
+        <p:cNvGrpSpPr/>
+        <p:nvPr/>
+      </p:nvGrpSpPr>
+      <p:grpSpPr>
+        <a:xfrm>
+          <a:off x="0" y="0"/>
+          <a:ext cx="0" cy="0"/>
+          <a:chOff x="0" y="0"/>
+          <a:chExt cx="0" cy="0"/>
+        </a:xfrm>
+      </p:grpSpPr>
+      <p:sp>
+        <p:nvSpPr>
+          <p:cNvPr id="2" name="Title 1">
+            <a:extLst>
+              <a:ext uri="{FF2B5EF4-FFF2-40B4-BE49-F238E27FC236}">
+                <a16:creationId xmlns:a16="http://schemas.microsoft.com/office/drawing/2014/main" id="{496A992F-F5B0-4546-9577-213FDA0B45F9}"/>
+              </a:ext>
+            </a:extLst>
+          </p:cNvPr>
+          <p:cNvSpPr>
+            <a:spLocks noGrp="1"/>
+          </p:cNvSpPr>
+          <p:nvPr>
+            <p:ph type="title"/>
+          </p:nvPr>
+        </p:nvSpPr>
+        <p:spPr/>
+        <p:txBody>
+          <a:bodyPr/>
+          <a:lstStyle/>
+          <a:p>
+            <a:r>
+              <a:rPr lang="fr-FR" b="1" dirty="0"/>
+              <a:t>RAG: </a:t>
+            </a:r>
+            <a:r>
+              <a:rPr lang="fr-FR" b="1" dirty="0" err="1"/>
+              <a:t>Retrieval</a:t>
+            </a:r>
+            <a:endParaRPr lang="en-US" b="1" dirty="0"/>
+          </a:p>
+        </p:txBody>
+      </p:sp>
+      <p:sp>
+        <p:nvSpPr>
+          <p:cNvPr id="3" name="Content Placeholder 2">
+            <a:extLst>
+              <a:ext uri="{FF2B5EF4-FFF2-40B4-BE49-F238E27FC236}">
+                <a16:creationId xmlns:a16="http://schemas.microsoft.com/office/drawing/2014/main" id="{27634627-5020-42B4-8CFD-1B158C53CCAF}"/>
+              </a:ext>
+            </a:extLst>
+          </p:cNvPr>
+          <p:cNvSpPr>
+            <a:spLocks noGrp="1"/>
+          </p:cNvSpPr>
+          <p:nvPr>
+            <p:ph idx="1"/>
+          </p:nvPr>
+        </p:nvSpPr>
+        <p:spPr/>
+        <p:txBody>
+          <a:bodyPr/>
+          <a:lstStyle/>
+          <a:p>
+            <a:endParaRPr lang="en-US" dirty="0"/>
+          </a:p>
+        </p:txBody>
+      </p:sp>
+      <p:sp>
+        <p:nvSpPr>
+          <p:cNvPr id="4" name="TextBox 3">
+            <a:extLst>
+              <a:ext uri="{FF2B5EF4-FFF2-40B4-BE49-F238E27FC236}">
+                <a16:creationId xmlns:a16="http://schemas.microsoft.com/office/drawing/2014/main" id="{9ED3D534-BBDF-481B-B958-084DF4878A72}"/>
+              </a:ext>
+            </a:extLst>
+          </p:cNvPr>
+          <p:cNvSpPr txBox="1"/>
+          <p:nvPr/>
+        </p:nvSpPr>
+        <p:spPr>
+          <a:xfrm>
+            <a:off x="5650230" y="6451501"/>
+            <a:ext cx="1021473" cy="369332"/>
+          </a:xfrm>
+          <a:prstGeom prst="rect">
+            <a:avLst/>
+          </a:prstGeom>
+          <a:noFill/>
+        </p:spPr>
+        <p:txBody>
+          <a:bodyPr wrap="square" rtlCol="0">
+            <a:spAutoFit/>
+          </a:bodyPr>
+          <a:lstStyle/>
+          <a:p>
+            <a:pPr algn="ctr"/>
+            <a:r>
+              <a:rPr lang="en-US" dirty="0"/>
+              <a:t>11 of n</a:t>
+            </a:r>
+          </a:p>
+        </p:txBody>
+      </p:sp>
+    </p:spTree>
+    <p:extLst>
+      <p:ext uri="{BB962C8B-B14F-4D97-AF65-F5344CB8AC3E}">
+        <p14:creationId xmlns:p14="http://schemas.microsoft.com/office/powerpoint/2010/main" val="644614161"/>
+      </p:ext>
+    </p:extLst>
+  </p:cSld>
+  <p:clrMapOvr>
+    <a:masterClrMapping/>
+  </p:clrMapOvr>
+</p:sld>
+</file>
+
+<file path=ppt/slides/slide16.xml><?xml version="1.0" encoding="utf-8"?>
+<p:sld xmlns:a="http://schemas.openxmlformats.org/drawingml/2006/main" xmlns:r="http://schemas.openxmlformats.org/officeDocument/2006/relationships" xmlns:p="http://schemas.openxmlformats.org/presentationml/2006/main">
+  <p:cSld>
+    <p:spTree>
+      <p:nvGrpSpPr>
+        <p:cNvPr id="1" name=""/>
+        <p:cNvGrpSpPr/>
+        <p:nvPr/>
+      </p:nvGrpSpPr>
+      <p:grpSpPr>
+        <a:xfrm>
+          <a:off x="0" y="0"/>
+          <a:ext cx="0" cy="0"/>
+          <a:chOff x="0" y="0"/>
+          <a:chExt cx="0" cy="0"/>
+        </a:xfrm>
+      </p:grpSpPr>
+      <p:sp>
+        <p:nvSpPr>
+          <p:cNvPr id="2" name="Title 1">
+            <a:extLst>
+              <a:ext uri="{FF2B5EF4-FFF2-40B4-BE49-F238E27FC236}">
+                <a16:creationId xmlns:a16="http://schemas.microsoft.com/office/drawing/2014/main" id="{496A992F-F5B0-4546-9577-213FDA0B45F9}"/>
+              </a:ext>
+            </a:extLst>
+          </p:cNvPr>
+          <p:cNvSpPr>
+            <a:spLocks noGrp="1"/>
+          </p:cNvSpPr>
+          <p:nvPr>
+            <p:ph type="title"/>
+          </p:nvPr>
+        </p:nvSpPr>
+        <p:spPr/>
+        <p:txBody>
+          <a:bodyPr/>
+          <a:lstStyle/>
+          <a:p>
+            <a:r>
+              <a:rPr lang="fr-FR" b="1" dirty="0"/>
               <a:t>RAG: Chat </a:t>
             </a:r>
             <a:r>
@@ -4472,7 +4864,7 @@
 </p:sld>
 </file>
 
-<file path=ppt/slides/slide14.xml><?xml version="1.0" encoding="utf-8"?>
+<file path=ppt/slides/slide17.xml><?xml version="1.0" encoding="utf-8"?>
 <p:sld xmlns:a="http://schemas.openxmlformats.org/drawingml/2006/main" xmlns:r="http://schemas.openxmlformats.org/officeDocument/2006/relationships" xmlns:p="http://schemas.openxmlformats.org/presentationml/2006/main">
   <p:cSld>
     <p:spTree>
@@ -4901,7 +5293,65 @@
           <a:bodyPr/>
           <a:lstStyle/>
           <a:p>
+            <a:pPr>
+              <a:buFont typeface="Arial" panose="020B0604020202020204" pitchFamily="34" charset="0"/>
+              <a:buChar char="•"/>
+            </a:pPr>
+            <a:r>
+              <a:rPr lang="en-US" b="1" dirty="0"/>
+              <a:t> Direct API calls to </a:t>
+            </a:r>
+            <a:r>
+              <a:rPr lang="en-US" b="1" dirty="0" err="1"/>
+              <a:t>OpenAI</a:t>
+            </a:r>
+            <a:endParaRPr lang="en-US" b="1" dirty="0"/>
+          </a:p>
+          <a:p>
+            <a:pPr marL="0" indent="0">
+              <a:buNone/>
+            </a:pPr>
             <a:endParaRPr lang="en-US" dirty="0"/>
+          </a:p>
+          <a:p>
+            <a:pPr>
+              <a:buFont typeface="Arial" panose="020B0604020202020204" pitchFamily="34" charset="0"/>
+              <a:buChar char="•"/>
+            </a:pPr>
+            <a:r>
+              <a:rPr lang="en-US" b="1" dirty="0"/>
+              <a:t> API calls through LangChain:</a:t>
+            </a:r>
+          </a:p>
+          <a:p>
+            <a:pPr lvl="1">
+              <a:buFont typeface="Arial" panose="020B0604020202020204" pitchFamily="34" charset="0"/>
+              <a:buChar char="•"/>
+            </a:pPr>
+            <a:r>
+              <a:rPr lang="en-US" dirty="0"/>
+              <a:t>   Prompts</a:t>
+            </a:r>
+          </a:p>
+          <a:p>
+            <a:pPr lvl="1">
+              <a:buFont typeface="Arial" panose="020B0604020202020204" pitchFamily="34" charset="0"/>
+              <a:buChar char="•"/>
+            </a:pPr>
+            <a:r>
+              <a:rPr lang="en-US" dirty="0"/>
+              <a:t>   Models</a:t>
+            </a:r>
+          </a:p>
+          <a:p>
+            <a:pPr lvl="1">
+              <a:buFont typeface="Arial" panose="020B0604020202020204" pitchFamily="34" charset="0"/>
+              <a:buChar char="•"/>
+            </a:pPr>
+            <a:r>
+              <a:rPr lang="en-US" dirty="0"/>
+              <a:t>   Output parsers</a:t>
+            </a:r>
           </a:p>
         </p:txBody>
       </p:sp>
@@ -4976,7 +5426,7 @@
           <p:cNvPr id="2" name="Title 1">
             <a:extLst>
               <a:ext uri="{FF2B5EF4-FFF2-40B4-BE49-F238E27FC236}">
-                <a16:creationId xmlns:a16="http://schemas.microsoft.com/office/drawing/2014/main" id="{496A992F-F5B0-4546-9577-213FDA0B45F9}"/>
+                <a16:creationId xmlns:a16="http://schemas.microsoft.com/office/drawing/2014/main" id="{02805235-1D7C-48FB-AEE6-C3676B249BC6}"/>
               </a:ext>
             </a:extLst>
           </p:cNvPr>
@@ -4993,77 +5443,52 @@
           <a:lstStyle/>
           <a:p>
             <a:r>
-              <a:rPr lang="en-US" b="1" dirty="0"/>
-              <a:t>LangChain: Memory</a:t>
-            </a:r>
-          </a:p>
-        </p:txBody>
-      </p:sp>
-      <p:sp>
-        <p:nvSpPr>
-          <p:cNvPr id="3" name="Content Placeholder 2">
+              <a:rPr lang="en-US" dirty="0"/>
+              <a:t> Direct API calls to </a:t>
+            </a:r>
+            <a:r>
+              <a:rPr lang="en-US" dirty="0" err="1"/>
+              <a:t>OpenAI</a:t>
+            </a:r>
+            <a:endParaRPr lang="en-US" dirty="0"/>
+          </a:p>
+        </p:txBody>
+      </p:sp>
+      <p:pic>
+        <p:nvPicPr>
+          <p:cNvPr id="4" name="Content Placeholder 3">
             <a:extLst>
               <a:ext uri="{FF2B5EF4-FFF2-40B4-BE49-F238E27FC236}">
-                <a16:creationId xmlns:a16="http://schemas.microsoft.com/office/drawing/2014/main" id="{27634627-5020-42B4-8CFD-1B158C53CCAF}"/>
+                <a16:creationId xmlns:a16="http://schemas.microsoft.com/office/drawing/2014/main" id="{360BD178-34D5-43B8-B105-5F0F7B31A7BB}"/>
               </a:ext>
             </a:extLst>
           </p:cNvPr>
-          <p:cNvSpPr>
-            <a:spLocks noGrp="1"/>
-          </p:cNvSpPr>
+          <p:cNvPicPr>
+            <a:picLocks noGrp="1" noChangeAspect="1"/>
+          </p:cNvPicPr>
           <p:nvPr>
             <p:ph idx="1"/>
           </p:nvPr>
-        </p:nvSpPr>
-        <p:spPr/>
-        <p:txBody>
-          <a:bodyPr/>
-          <a:lstStyle/>
-          <a:p>
-            <a:endParaRPr lang="en-US"/>
-          </a:p>
-        </p:txBody>
-      </p:sp>
-      <p:sp>
-        <p:nvSpPr>
-          <p:cNvPr id="4" name="TextBox 3">
-            <a:extLst>
-              <a:ext uri="{FF2B5EF4-FFF2-40B4-BE49-F238E27FC236}">
-                <a16:creationId xmlns:a16="http://schemas.microsoft.com/office/drawing/2014/main" id="{9ED3D534-BBDF-481B-B958-084DF4878A72}"/>
-              </a:ext>
-            </a:extLst>
-          </p:cNvPr>
-          <p:cNvSpPr txBox="1"/>
-          <p:nvPr/>
-        </p:nvSpPr>
+        </p:nvPicPr>
+        <p:blipFill rotWithShape="1">
+          <a:blip r:embed="rId2"/>
+          <a:srcRect l="6933" t="12937" r="6893" b="12371"/>
+          <a:stretch/>
+        </p:blipFill>
         <p:spPr>
           <a:xfrm>
-            <a:off x="5650230" y="6451501"/>
-            <a:ext cx="1021473" cy="369332"/>
+            <a:off x="2271676" y="1846263"/>
+            <a:ext cx="7708974" cy="4022725"/>
           </a:xfrm>
           <a:prstGeom prst="rect">
             <a:avLst/>
           </a:prstGeom>
-          <a:noFill/>
         </p:spPr>
-        <p:txBody>
-          <a:bodyPr wrap="square" rtlCol="0">
-            <a:spAutoFit/>
-          </a:bodyPr>
-          <a:lstStyle/>
-          <a:p>
-            <a:pPr algn="ctr"/>
-            <a:r>
-              <a:rPr lang="en-US" dirty="0"/>
-              <a:t>3 of n</a:t>
-            </a:r>
-          </a:p>
-        </p:txBody>
-      </p:sp>
+      </p:pic>
     </p:spTree>
     <p:extLst>
       <p:ext uri="{BB962C8B-B14F-4D97-AF65-F5344CB8AC3E}">
-        <p14:creationId xmlns:p14="http://schemas.microsoft.com/office/powerpoint/2010/main" val="1017987466"/>
+        <p14:creationId xmlns:p14="http://schemas.microsoft.com/office/powerpoint/2010/main" val="4211572874"/>
       </p:ext>
     </p:extLst>
   </p:cSld>
@@ -5095,7 +5520,7 @@
           <p:cNvPr id="2" name="Title 1">
             <a:extLst>
               <a:ext uri="{FF2B5EF4-FFF2-40B4-BE49-F238E27FC236}">
-                <a16:creationId xmlns:a16="http://schemas.microsoft.com/office/drawing/2014/main" id="{496A992F-F5B0-4546-9577-213FDA0B45F9}"/>
+                <a16:creationId xmlns:a16="http://schemas.microsoft.com/office/drawing/2014/main" id="{FFB0A897-6A1B-434B-8706-1ABB36A302F5}"/>
               </a:ext>
             </a:extLst>
           </p:cNvPr>
@@ -5112,80 +5537,50 @@
           <a:lstStyle/>
           <a:p>
             <a:r>
-              <a:rPr lang="en-US" b="1" dirty="0"/>
-              <a:t>LangChain: Chains</a:t>
-            </a:r>
-          </a:p>
-        </p:txBody>
-      </p:sp>
-      <p:sp>
-        <p:nvSpPr>
-          <p:cNvPr id="3" name="Content Placeholder 2">
+              <a:rPr lang="en-US" dirty="0"/>
+              <a:t> API calls with LangChain </a:t>
+            </a:r>
+            <a:r>
+              <a:rPr lang="en-US" sz="2400" dirty="0"/>
+              <a:t>(Prompt &amp; Model)</a:t>
+            </a:r>
+            <a:endParaRPr lang="en-US" dirty="0"/>
+          </a:p>
+        </p:txBody>
+      </p:sp>
+      <p:pic>
+        <p:nvPicPr>
+          <p:cNvPr id="5" name="Content Placeholder 4">
             <a:extLst>
               <a:ext uri="{FF2B5EF4-FFF2-40B4-BE49-F238E27FC236}">
-                <a16:creationId xmlns:a16="http://schemas.microsoft.com/office/drawing/2014/main" id="{27634627-5020-42B4-8CFD-1B158C53CCAF}"/>
+                <a16:creationId xmlns:a16="http://schemas.microsoft.com/office/drawing/2014/main" id="{E31CE18A-037A-4B71-813B-7B620296ADDE}"/>
               </a:ext>
             </a:extLst>
           </p:cNvPr>
-          <p:cNvSpPr>
-            <a:spLocks noGrp="1"/>
-          </p:cNvSpPr>
+          <p:cNvPicPr>
+            <a:picLocks noGrp="1" noChangeAspect="1"/>
+          </p:cNvPicPr>
           <p:nvPr>
             <p:ph idx="1"/>
           </p:nvPr>
-        </p:nvSpPr>
-        <p:spPr/>
-        <p:txBody>
-          <a:bodyPr/>
-          <a:lstStyle/>
-          <a:p>
-            <a:pPr marL="0" indent="0">
-              <a:buNone/>
-            </a:pPr>
-            <a:endParaRPr lang="en-US" dirty="0"/>
-          </a:p>
-        </p:txBody>
-      </p:sp>
-      <p:sp>
-        <p:nvSpPr>
-          <p:cNvPr id="4" name="TextBox 3">
-            <a:extLst>
-              <a:ext uri="{FF2B5EF4-FFF2-40B4-BE49-F238E27FC236}">
-                <a16:creationId xmlns:a16="http://schemas.microsoft.com/office/drawing/2014/main" id="{9ED3D534-BBDF-481B-B958-084DF4878A72}"/>
-              </a:ext>
-            </a:extLst>
-          </p:cNvPr>
-          <p:cNvSpPr txBox="1"/>
-          <p:nvPr/>
-        </p:nvSpPr>
+        </p:nvPicPr>
+        <p:blipFill>
+          <a:blip r:embed="rId2"/>
+          <a:stretch>
+            <a:fillRect/>
+          </a:stretch>
+        </p:blipFill>
         <p:spPr>
           <a:xfrm>
-            <a:off x="5650230" y="6451501"/>
-            <a:ext cx="1021473" cy="369332"/>
+            <a:off x="2451668" y="1983115"/>
+            <a:ext cx="7288664" cy="3616406"/>
           </a:xfrm>
-          <a:prstGeom prst="rect">
-            <a:avLst/>
-          </a:prstGeom>
-          <a:noFill/>
         </p:spPr>
-        <p:txBody>
-          <a:bodyPr wrap="square" rtlCol="0">
-            <a:spAutoFit/>
-          </a:bodyPr>
-          <a:lstStyle/>
-          <a:p>
-            <a:pPr algn="ctr"/>
-            <a:r>
-              <a:rPr lang="en-US" dirty="0"/>
-              <a:t>4 of n</a:t>
-            </a:r>
-          </a:p>
-        </p:txBody>
-      </p:sp>
+      </p:pic>
     </p:spTree>
     <p:extLst>
       <p:ext uri="{BB962C8B-B14F-4D97-AF65-F5344CB8AC3E}">
-        <p14:creationId xmlns:p14="http://schemas.microsoft.com/office/powerpoint/2010/main" val="4080987522"/>
+        <p14:creationId xmlns:p14="http://schemas.microsoft.com/office/powerpoint/2010/main" val="2173303761"/>
       </p:ext>
     </p:extLst>
   </p:cSld>
@@ -5217,7 +5612,7 @@
           <p:cNvPr id="2" name="Title 1">
             <a:extLst>
               <a:ext uri="{FF2B5EF4-FFF2-40B4-BE49-F238E27FC236}">
-                <a16:creationId xmlns:a16="http://schemas.microsoft.com/office/drawing/2014/main" id="{496A992F-F5B0-4546-9577-213FDA0B45F9}"/>
+                <a16:creationId xmlns:a16="http://schemas.microsoft.com/office/drawing/2014/main" id="{58FAA31C-FE65-4BFC-BC6F-023F82D50EDB}"/>
               </a:ext>
             </a:extLst>
           </p:cNvPr>
@@ -5234,78 +5629,49 @@
           <a:lstStyle/>
           <a:p>
             <a:r>
-              <a:rPr lang="fr-FR" b="1" dirty="0"/>
-              <a:t>LangChain: Q&amp;A over Documents</a:t>
-            </a:r>
-            <a:endParaRPr lang="en-US" b="1" dirty="0"/>
-          </a:p>
-        </p:txBody>
-      </p:sp>
-      <p:sp>
-        <p:nvSpPr>
-          <p:cNvPr id="3" name="Content Placeholder 2">
+              <a:rPr lang="en-US" dirty="0"/>
+              <a:t> API calls with LangChain </a:t>
+            </a:r>
+            <a:r>
+              <a:rPr lang="en-US" sz="2400" dirty="0"/>
+              <a:t>(Output Parser)</a:t>
+            </a:r>
+            <a:endParaRPr lang="en-US" dirty="0"/>
+          </a:p>
+        </p:txBody>
+      </p:sp>
+      <p:pic>
+        <p:nvPicPr>
+          <p:cNvPr id="7" name="Content Placeholder 6">
             <a:extLst>
               <a:ext uri="{FF2B5EF4-FFF2-40B4-BE49-F238E27FC236}">
-                <a16:creationId xmlns:a16="http://schemas.microsoft.com/office/drawing/2014/main" id="{27634627-5020-42B4-8CFD-1B158C53CCAF}"/>
+                <a16:creationId xmlns:a16="http://schemas.microsoft.com/office/drawing/2014/main" id="{7068B176-C2E7-4D4A-BFF8-1ABA2D6C74FD}"/>
               </a:ext>
             </a:extLst>
           </p:cNvPr>
-          <p:cNvSpPr>
-            <a:spLocks noGrp="1"/>
-          </p:cNvSpPr>
+          <p:cNvPicPr>
+            <a:picLocks noGrp="1" noChangeAspect="1"/>
+          </p:cNvPicPr>
           <p:nvPr>
             <p:ph idx="1"/>
           </p:nvPr>
-        </p:nvSpPr>
-        <p:spPr/>
-        <p:txBody>
-          <a:bodyPr/>
-          <a:lstStyle/>
-          <a:p>
-            <a:endParaRPr lang="en-US" dirty="0"/>
-          </a:p>
-        </p:txBody>
-      </p:sp>
-      <p:sp>
-        <p:nvSpPr>
-          <p:cNvPr id="4" name="TextBox 3">
-            <a:extLst>
-              <a:ext uri="{FF2B5EF4-FFF2-40B4-BE49-F238E27FC236}">
-                <a16:creationId xmlns:a16="http://schemas.microsoft.com/office/drawing/2014/main" id="{9ED3D534-BBDF-481B-B958-084DF4878A72}"/>
-              </a:ext>
-            </a:extLst>
-          </p:cNvPr>
-          <p:cNvSpPr txBox="1"/>
-          <p:nvPr/>
-        </p:nvSpPr>
+        </p:nvPicPr>
+        <p:blipFill rotWithShape="1">
+          <a:blip r:embed="rId2"/>
+          <a:srcRect l="5506" t="7878" r="5335" b="7397"/>
+          <a:stretch/>
+        </p:blipFill>
         <p:spPr>
           <a:xfrm>
-            <a:off x="5650230" y="6451501"/>
-            <a:ext cx="1021473" cy="369332"/>
+            <a:off x="2375555" y="1846683"/>
+            <a:ext cx="7154944" cy="4337726"/>
           </a:xfrm>
-          <a:prstGeom prst="rect">
-            <a:avLst/>
-          </a:prstGeom>
-          <a:noFill/>
         </p:spPr>
-        <p:txBody>
-          <a:bodyPr wrap="square" rtlCol="0">
-            <a:spAutoFit/>
-          </a:bodyPr>
-          <a:lstStyle/>
-          <a:p>
-            <a:pPr algn="ctr"/>
-            <a:r>
-              <a:rPr lang="en-US" dirty="0"/>
-              <a:t>5 of n</a:t>
-            </a:r>
-          </a:p>
-        </p:txBody>
-      </p:sp>
+      </p:pic>
     </p:spTree>
     <p:extLst>
       <p:ext uri="{BB962C8B-B14F-4D97-AF65-F5344CB8AC3E}">
-        <p14:creationId xmlns:p14="http://schemas.microsoft.com/office/powerpoint/2010/main" val="3095798474"/>
+        <p14:creationId xmlns:p14="http://schemas.microsoft.com/office/powerpoint/2010/main" val="3042102261"/>
       </p:ext>
     </p:extLst>
   </p:cSld>
@@ -5354,10 +5720,9 @@
           <a:lstStyle/>
           <a:p>
             <a:r>
-              <a:rPr lang="fr-FR" b="1" dirty="0"/>
-              <a:t>LangChain: Evaluation</a:t>
-            </a:r>
-            <a:endParaRPr lang="en-US" b="1" dirty="0"/>
+              <a:rPr lang="en-US" b="1" dirty="0"/>
+              <a:t>LangChain: Memory</a:t>
+            </a:r>
           </a:p>
         </p:txBody>
       </p:sp>
@@ -5382,6 +5747,120 @@
           <a:bodyPr/>
           <a:lstStyle/>
           <a:p>
+            <a:pPr marL="0" indent="0">
+              <a:buNone/>
+            </a:pPr>
+            <a:r>
+              <a:rPr lang="en-US" dirty="0"/>
+              <a:t>LLMs are `</a:t>
+            </a:r>
+            <a:r>
+              <a:rPr lang="en-US" dirty="0">
+                <a:solidFill>
+                  <a:schemeClr val="accent3"/>
+                </a:solidFill>
+              </a:rPr>
+              <a:t>stateless</a:t>
+            </a:r>
+            <a:r>
+              <a:rPr lang="en-US" dirty="0"/>
+              <a:t>`, that means each transaction is independent.</a:t>
+            </a:r>
+          </a:p>
+          <a:p>
+            <a:pPr marL="0" indent="0">
+              <a:buNone/>
+            </a:pPr>
+            <a:r>
+              <a:rPr lang="en-US" dirty="0"/>
+              <a:t>Chatbots appear to have memory by providing the full conversation as `</a:t>
+            </a:r>
+            <a:r>
+              <a:rPr lang="en-US" dirty="0">
+                <a:solidFill>
+                  <a:schemeClr val="accent3"/>
+                </a:solidFill>
+              </a:rPr>
+              <a:t>context</a:t>
+            </a:r>
+            <a:r>
+              <a:rPr lang="en-US" dirty="0"/>
+              <a:t>` </a:t>
+            </a:r>
+          </a:p>
+          <a:p>
+            <a:pPr marL="0" indent="0">
+              <a:buNone/>
+            </a:pPr>
+            <a:endParaRPr lang="en-US" dirty="0"/>
+          </a:p>
+          <a:p>
+            <a:pPr marL="0" indent="0">
+              <a:buNone/>
+            </a:pPr>
+            <a:r>
+              <a:rPr lang="en-US" dirty="0"/>
+              <a:t>LangChain provides different types of memories and accumulate the conversation: </a:t>
+            </a:r>
+          </a:p>
+          <a:p>
+            <a:pPr lvl="1">
+              <a:buFont typeface="Arial" panose="020B0604020202020204" pitchFamily="34" charset="0"/>
+              <a:buChar char="•"/>
+            </a:pPr>
+            <a:r>
+              <a:rPr lang="en-US" dirty="0"/>
+              <a:t> </a:t>
+            </a:r>
+            <a:r>
+              <a:rPr lang="en-US" dirty="0" err="1"/>
+              <a:t>ConversationBufferMemory</a:t>
+            </a:r>
+            <a:endParaRPr lang="en-US" dirty="0"/>
+          </a:p>
+          <a:p>
+            <a:pPr lvl="1">
+              <a:buFont typeface="Arial" panose="020B0604020202020204" pitchFamily="34" charset="0"/>
+              <a:buChar char="•"/>
+            </a:pPr>
+            <a:r>
+              <a:rPr lang="en-US" dirty="0"/>
+              <a:t> </a:t>
+            </a:r>
+            <a:r>
+              <a:rPr lang="en-US" dirty="0" err="1"/>
+              <a:t>ConversationBufferWindowMemory</a:t>
+            </a:r>
+            <a:endParaRPr lang="en-US" dirty="0"/>
+          </a:p>
+          <a:p>
+            <a:pPr lvl="1">
+              <a:buFont typeface="Arial" panose="020B0604020202020204" pitchFamily="34" charset="0"/>
+              <a:buChar char="•"/>
+            </a:pPr>
+            <a:r>
+              <a:rPr lang="en-US" dirty="0"/>
+              <a:t> </a:t>
+            </a:r>
+            <a:r>
+              <a:rPr lang="en-US" dirty="0" err="1"/>
+              <a:t>ConversationTokenBufferMemory</a:t>
+            </a:r>
+            <a:endParaRPr lang="en-US" dirty="0"/>
+          </a:p>
+          <a:p>
+            <a:pPr lvl="1">
+              <a:buFont typeface="Arial" panose="020B0604020202020204" pitchFamily="34" charset="0"/>
+              <a:buChar char="•"/>
+            </a:pPr>
+            <a:r>
+              <a:rPr lang="en-US" dirty="0"/>
+              <a:t> </a:t>
+            </a:r>
+            <a:r>
+              <a:rPr lang="en-US" dirty="0" err="1"/>
+              <a:t>ConversationSummaryMemory</a:t>
+            </a:r>
             <a:endParaRPr lang="en-US" dirty="0"/>
           </a:p>
         </p:txBody>
@@ -5417,15 +5896,45 @@
             <a:pPr algn="ctr"/>
             <a:r>
               <a:rPr lang="en-US" dirty="0"/>
-              <a:t>6 of n</a:t>
-            </a:r>
-          </a:p>
-        </p:txBody>
-      </p:sp>
+              <a:t>3 of n</a:t>
+            </a:r>
+          </a:p>
+        </p:txBody>
+      </p:sp>
+      <p:pic>
+        <p:nvPicPr>
+          <p:cNvPr id="8" name="Picture 7">
+            <a:extLst>
+              <a:ext uri="{FF2B5EF4-FFF2-40B4-BE49-F238E27FC236}">
+                <a16:creationId xmlns:a16="http://schemas.microsoft.com/office/drawing/2014/main" id="{B93C3051-8E98-4482-AE67-93B5BDBDCD59}"/>
+              </a:ext>
+            </a:extLst>
+          </p:cNvPr>
+          <p:cNvPicPr>
+            <a:picLocks noChangeAspect="1"/>
+          </p:cNvPicPr>
+          <p:nvPr/>
+        </p:nvPicPr>
+        <p:blipFill>
+          <a:blip r:embed="rId2"/>
+          <a:stretch>
+            <a:fillRect/>
+          </a:stretch>
+        </p:blipFill>
+        <p:spPr>
+          <a:xfrm>
+            <a:off x="6331434" y="3588524"/>
+            <a:ext cx="4763286" cy="2571774"/>
+          </a:xfrm>
+          <a:prstGeom prst="rect">
+            <a:avLst/>
+          </a:prstGeom>
+        </p:spPr>
+      </p:pic>
     </p:spTree>
     <p:extLst>
       <p:ext uri="{BB962C8B-B14F-4D97-AF65-F5344CB8AC3E}">
-        <p14:creationId xmlns:p14="http://schemas.microsoft.com/office/powerpoint/2010/main" val="518678535"/>
+        <p14:creationId xmlns:p14="http://schemas.microsoft.com/office/powerpoint/2010/main" val="1017987466"/>
       </p:ext>
     </p:extLst>
   </p:cSld>
@@ -5474,30 +5983,9 @@
           <a:lstStyle/>
           <a:p>
             <a:r>
-              <a:rPr lang="fr-FR" b="1" dirty="0" err="1"/>
-              <a:t>Retrieval</a:t>
-            </a:r>
-            <a:r>
-              <a:rPr lang="fr-FR" b="1" dirty="0"/>
-              <a:t> </a:t>
-            </a:r>
-            <a:r>
-              <a:rPr lang="fr-FR" b="1" dirty="0" err="1"/>
-              <a:t>Augmented</a:t>
-            </a:r>
-            <a:r>
-              <a:rPr lang="fr-FR" b="1" dirty="0"/>
-              <a:t> </a:t>
-            </a:r>
-            <a:r>
-              <a:rPr lang="fr-FR" b="1" dirty="0" err="1"/>
-              <a:t>Generation</a:t>
-            </a:r>
-            <a:r>
-              <a:rPr lang="fr-FR" b="1" dirty="0"/>
-              <a:t> (RAG)</a:t>
-            </a:r>
-            <a:endParaRPr lang="en-US" b="1" dirty="0"/>
+              <a:rPr lang="en-US" b="1" dirty="0"/>
+              <a:t>LangChain: Chains</a:t>
+            </a:r>
           </a:p>
         </p:txBody>
       </p:sp>
@@ -5522,7 +6010,79 @@
           <a:bodyPr/>
           <a:lstStyle/>
           <a:p>
+            <a:pPr>
+              <a:buFont typeface="Arial" panose="020B0604020202020204" pitchFamily="34" charset="0"/>
+              <a:buChar char="•"/>
+            </a:pPr>
+            <a:r>
+              <a:rPr lang="en-US" dirty="0" err="1"/>
+              <a:t>LLMChain</a:t>
+            </a:r>
             <a:endParaRPr lang="en-US" dirty="0"/>
+          </a:p>
+          <a:p>
+            <a:pPr>
+              <a:buFont typeface="Arial" panose="020B0604020202020204" pitchFamily="34" charset="0"/>
+              <a:buChar char="•"/>
+            </a:pPr>
+            <a:endParaRPr lang="en-US" sz="400" dirty="0"/>
+          </a:p>
+          <a:p>
+            <a:pPr>
+              <a:buFont typeface="Arial" panose="020B0604020202020204" pitchFamily="34" charset="0"/>
+              <a:buChar char="•"/>
+            </a:pPr>
+            <a:r>
+              <a:rPr lang="en-US" dirty="0"/>
+              <a:t>Sequential Chains</a:t>
+            </a:r>
+          </a:p>
+          <a:p>
+            <a:pPr lvl="1">
+              <a:buFont typeface="Arial" panose="020B0604020202020204" pitchFamily="34" charset="0"/>
+              <a:buChar char="•"/>
+            </a:pPr>
+            <a:r>
+              <a:rPr lang="en-US" dirty="0"/>
+              <a:t>  </a:t>
+            </a:r>
+            <a:r>
+              <a:rPr lang="en-US" dirty="0" err="1"/>
+              <a:t>SimpleSequentialChain</a:t>
+            </a:r>
+            <a:endParaRPr lang="en-US" dirty="0"/>
+          </a:p>
+          <a:p>
+            <a:pPr lvl="1">
+              <a:buFont typeface="Arial" panose="020B0604020202020204" pitchFamily="34" charset="0"/>
+              <a:buChar char="•"/>
+            </a:pPr>
+            <a:r>
+              <a:rPr lang="en-US" dirty="0"/>
+              <a:t>  </a:t>
+            </a:r>
+            <a:r>
+              <a:rPr lang="en-US" dirty="0" err="1"/>
+              <a:t>SequentialChain</a:t>
+            </a:r>
+            <a:endParaRPr lang="en-US" dirty="0"/>
+          </a:p>
+          <a:p>
+            <a:pPr lvl="1">
+              <a:buFont typeface="Arial" panose="020B0604020202020204" pitchFamily="34" charset="0"/>
+              <a:buChar char="•"/>
+            </a:pPr>
+            <a:endParaRPr lang="en-US" sz="900" dirty="0"/>
+          </a:p>
+          <a:p>
+            <a:pPr>
+              <a:buFont typeface="Arial" panose="020B0604020202020204" pitchFamily="34" charset="0"/>
+              <a:buChar char="•"/>
+            </a:pPr>
+            <a:r>
+              <a:rPr lang="en-US" dirty="0"/>
+              <a:t>Router Chain</a:t>
+            </a:r>
           </a:p>
         </p:txBody>
       </p:sp>
@@ -5557,7 +6117,7 @@
             <a:pPr algn="ctr"/>
             <a:r>
               <a:rPr lang="en-US" dirty="0"/>
-              <a:t>7 of n</a:t>
+              <a:t>4 of n</a:t>
             </a:r>
           </a:p>
         </p:txBody>
@@ -5565,7 +6125,7 @@
     </p:spTree>
     <p:extLst>
       <p:ext uri="{BB962C8B-B14F-4D97-AF65-F5344CB8AC3E}">
-        <p14:creationId xmlns:p14="http://schemas.microsoft.com/office/powerpoint/2010/main" val="494316150"/>
+        <p14:creationId xmlns:p14="http://schemas.microsoft.com/office/powerpoint/2010/main" val="4080987522"/>
       </p:ext>
     </p:extLst>
   </p:cSld>
@@ -5615,41 +6175,41 @@
           <a:p>
             <a:r>
               <a:rPr lang="fr-FR" b="1" dirty="0"/>
-              <a:t>RAG: Document </a:t>
-            </a:r>
-            <a:r>
-              <a:rPr lang="fr-FR" b="1" dirty="0" err="1"/>
-              <a:t>Loading</a:t>
+              <a:t>LangChain: Q&amp;A over Documents</a:t>
             </a:r>
             <a:endParaRPr lang="en-US" b="1" dirty="0"/>
           </a:p>
         </p:txBody>
       </p:sp>
-      <p:sp>
-        <p:nvSpPr>
-          <p:cNvPr id="3" name="Content Placeholder 2">
+      <p:pic>
+        <p:nvPicPr>
+          <p:cNvPr id="6" name="Content Placeholder 5">
             <a:extLst>
               <a:ext uri="{FF2B5EF4-FFF2-40B4-BE49-F238E27FC236}">
-                <a16:creationId xmlns:a16="http://schemas.microsoft.com/office/drawing/2014/main" id="{27634627-5020-42B4-8CFD-1B158C53CCAF}"/>
+                <a16:creationId xmlns:a16="http://schemas.microsoft.com/office/drawing/2014/main" id="{4DDE3E10-FEC4-4890-A560-453DD34D6CBE}"/>
               </a:ext>
             </a:extLst>
           </p:cNvPr>
-          <p:cNvSpPr>
-            <a:spLocks noGrp="1"/>
-          </p:cNvSpPr>
+          <p:cNvPicPr>
+            <a:picLocks noGrp="1" noChangeAspect="1"/>
+          </p:cNvPicPr>
           <p:nvPr>
             <p:ph idx="1"/>
           </p:nvPr>
-        </p:nvSpPr>
-        <p:spPr/>
-        <p:txBody>
-          <a:bodyPr/>
-          <a:lstStyle/>
-          <a:p>
-            <a:endParaRPr lang="en-US" dirty="0"/>
-          </a:p>
-        </p:txBody>
-      </p:sp>
+        </p:nvPicPr>
+        <p:blipFill>
+          <a:blip r:embed="rId2"/>
+          <a:stretch>
+            <a:fillRect/>
+          </a:stretch>
+        </p:blipFill>
+        <p:spPr>
+          <a:xfrm>
+            <a:off x="2006494" y="1788160"/>
+            <a:ext cx="4154472" cy="4516830"/>
+          </a:xfrm>
+        </p:spPr>
+      </p:pic>
       <p:sp>
         <p:nvSpPr>
           <p:cNvPr id="4" name="TextBox 3">
@@ -5681,7 +6241,7 @@
             <a:pPr algn="ctr"/>
             <a:r>
               <a:rPr lang="en-US" dirty="0"/>
-              <a:t>8 of n</a:t>
+              <a:t>5 of n</a:t>
             </a:r>
           </a:p>
         </p:txBody>
@@ -5689,7 +6249,7 @@
     </p:spTree>
     <p:extLst>
       <p:ext uri="{BB962C8B-B14F-4D97-AF65-F5344CB8AC3E}">
-        <p14:creationId xmlns:p14="http://schemas.microsoft.com/office/powerpoint/2010/main" val="1740740662"/>
+        <p14:creationId xmlns:p14="http://schemas.microsoft.com/office/powerpoint/2010/main" val="3095798474"/>
       </p:ext>
     </p:extLst>
   </p:cSld>

</xml_diff>

<commit_message>
Designed and made some slides of presentations
</commit_message>
<xml_diff>
--- a/Presentation/Slides/Presentation.pptx
+++ b/Presentation/Slides/Presentation.pptx
@@ -15,13 +15,16 @@
     <p:sldId id="260" r:id="rId9"/>
     <p:sldId id="261" r:id="rId10"/>
     <p:sldId id="262" r:id="rId11"/>
-    <p:sldId id="263" r:id="rId12"/>
-    <p:sldId id="264" r:id="rId13"/>
-    <p:sldId id="265" r:id="rId14"/>
-    <p:sldId id="266" r:id="rId15"/>
-    <p:sldId id="267" r:id="rId16"/>
-    <p:sldId id="269" r:id="rId17"/>
-    <p:sldId id="268" r:id="rId18"/>
+    <p:sldId id="273" r:id="rId12"/>
+    <p:sldId id="263" r:id="rId13"/>
+    <p:sldId id="274" r:id="rId14"/>
+    <p:sldId id="264" r:id="rId15"/>
+    <p:sldId id="275" r:id="rId16"/>
+    <p:sldId id="265" r:id="rId17"/>
+    <p:sldId id="266" r:id="rId18"/>
+    <p:sldId id="267" r:id="rId19"/>
+    <p:sldId id="269" r:id="rId20"/>
+    <p:sldId id="268" r:id="rId21"/>
   </p:sldIdLst>
   <p:sldSz cx="12192000" cy="6858000"/>
   <p:notesSz cx="6858000" cy="9144000"/>
@@ -356,7 +359,7 @@
           <a:p>
             <a:fld id="{78698A89-16EE-414F-A76C-14F13C132678}" type="datetimeFigureOut">
               <a:rPr lang="en-US" smtClean="0"/>
-              <a:t>2024-07-03</a:t>
+              <a:t>2024-07-04</a:t>
             </a:fld>
             <a:endParaRPr lang="en-US"/>
           </a:p>
@@ -564,7 +567,7 @@
           <a:p>
             <a:fld id="{78698A89-16EE-414F-A76C-14F13C132678}" type="datetimeFigureOut">
               <a:rPr lang="en-US" smtClean="0"/>
-              <a:t>2024-07-03</a:t>
+              <a:t>2024-07-04</a:t>
             </a:fld>
             <a:endParaRPr lang="en-US"/>
           </a:p>
@@ -822,7 +825,7 @@
           <a:p>
             <a:fld id="{78698A89-16EE-414F-A76C-14F13C132678}" type="datetimeFigureOut">
               <a:rPr lang="en-US" smtClean="0"/>
-              <a:t>2024-07-03</a:t>
+              <a:t>2024-07-04</a:t>
             </a:fld>
             <a:endParaRPr lang="en-US"/>
           </a:p>
@@ -992,7 +995,7 @@
           <a:p>
             <a:fld id="{78698A89-16EE-414F-A76C-14F13C132678}" type="datetimeFigureOut">
               <a:rPr lang="en-US" smtClean="0"/>
-              <a:t>2024-07-03</a:t>
+              <a:t>2024-07-04</a:t>
             </a:fld>
             <a:endParaRPr lang="en-US"/>
           </a:p>
@@ -1329,7 +1332,7 @@
           <a:p>
             <a:fld id="{78698A89-16EE-414F-A76C-14F13C132678}" type="datetimeFigureOut">
               <a:rPr lang="en-US" smtClean="0"/>
-              <a:t>2024-07-03</a:t>
+              <a:t>2024-07-04</a:t>
             </a:fld>
             <a:endParaRPr lang="en-US"/>
           </a:p>
@@ -1604,7 +1607,7 @@
           <a:p>
             <a:fld id="{78698A89-16EE-414F-A76C-14F13C132678}" type="datetimeFigureOut">
               <a:rPr lang="en-US" smtClean="0"/>
-              <a:t>2024-07-03</a:t>
+              <a:t>2024-07-04</a:t>
             </a:fld>
             <a:endParaRPr lang="en-US"/>
           </a:p>
@@ -1987,7 +1990,7 @@
           <a:p>
             <a:fld id="{78698A89-16EE-414F-A76C-14F13C132678}" type="datetimeFigureOut">
               <a:rPr lang="en-US" smtClean="0"/>
-              <a:t>2024-07-03</a:t>
+              <a:t>2024-07-04</a:t>
             </a:fld>
             <a:endParaRPr lang="en-US"/>
           </a:p>
@@ -2105,7 +2108,7 @@
           <a:p>
             <a:fld id="{78698A89-16EE-414F-A76C-14F13C132678}" type="datetimeFigureOut">
               <a:rPr lang="en-US" smtClean="0"/>
-              <a:t>2024-07-03</a:t>
+              <a:t>2024-07-04</a:t>
             </a:fld>
             <a:endParaRPr lang="en-US"/>
           </a:p>
@@ -2278,7 +2281,7 @@
           <a:p>
             <a:fld id="{78698A89-16EE-414F-A76C-14F13C132678}" type="datetimeFigureOut">
               <a:rPr lang="en-US" smtClean="0"/>
-              <a:t>2024-07-03</a:t>
+              <a:t>2024-07-04</a:t>
             </a:fld>
             <a:endParaRPr lang="en-US"/>
           </a:p>
@@ -2634,7 +2637,7 @@
           <a:p>
             <a:fld id="{78698A89-16EE-414F-A76C-14F13C132678}" type="datetimeFigureOut">
               <a:rPr lang="en-US" smtClean="0"/>
-              <a:t>2024-07-03</a:t>
+              <a:t>2024-07-04</a:t>
             </a:fld>
             <a:endParaRPr lang="en-US"/>
           </a:p>
@@ -2982,7 +2985,7 @@
           <a:p>
             <a:fld id="{78698A89-16EE-414F-A76C-14F13C132678}" type="datetimeFigureOut">
               <a:rPr lang="en-US" smtClean="0"/>
-              <a:t>2024-07-03</a:t>
+              <a:t>2024-07-04</a:t>
             </a:fld>
             <a:endParaRPr lang="en-US"/>
           </a:p>
@@ -3293,7 +3296,7 @@
           <a:p>
             <a:fld id="{78698A89-16EE-414F-A76C-14F13C132678}" type="datetimeFigureOut">
               <a:rPr lang="en-US" smtClean="0"/>
-              <a:t>2024-07-03</a:t>
+              <a:t>2024-07-04</a:t>
             </a:fld>
             <a:endParaRPr lang="en-US"/>
           </a:p>
@@ -4051,7 +4054,64 @@
           <a:bodyPr/>
           <a:lstStyle/>
           <a:p>
-            <a:endParaRPr lang="en-US" dirty="0"/>
+            <a:pPr>
+              <a:buFont typeface="Arial" panose="020B0604020202020204" pitchFamily="34" charset="0"/>
+              <a:buChar char="•"/>
+            </a:pPr>
+            <a:r>
+              <a:rPr lang="en-US" dirty="0"/>
+              <a:t> Example generation</a:t>
+            </a:r>
+          </a:p>
+          <a:p>
+            <a:pPr lvl="1">
+              <a:buFont typeface="Arial" panose="020B0604020202020204" pitchFamily="34" charset="0"/>
+              <a:buChar char="•"/>
+            </a:pPr>
+            <a:r>
+              <a:rPr lang="en-US" dirty="0"/>
+              <a:t>Hard-Coding Examples</a:t>
+            </a:r>
+          </a:p>
+          <a:p>
+            <a:pPr lvl="1">
+              <a:buFont typeface="Arial" panose="020B0604020202020204" pitchFamily="34" charset="0"/>
+              <a:buChar char="•"/>
+            </a:pPr>
+            <a:r>
+              <a:rPr lang="en-US" dirty="0"/>
+              <a:t>LLM Generated Examples</a:t>
+            </a:r>
+          </a:p>
+          <a:p>
+            <a:pPr>
+              <a:buFont typeface="Arial" panose="020B0604020202020204" pitchFamily="34" charset="0"/>
+              <a:buChar char="•"/>
+            </a:pPr>
+            <a:r>
+              <a:rPr lang="en-US" dirty="0"/>
+              <a:t> Manual evaluation (+ debugging)</a:t>
+            </a:r>
+          </a:p>
+          <a:p>
+            <a:pPr>
+              <a:buFont typeface="Arial" panose="020B0604020202020204" pitchFamily="34" charset="0"/>
+              <a:buChar char="•"/>
+            </a:pPr>
+            <a:r>
+              <a:rPr lang="en-US" dirty="0"/>
+              <a:t> LLM-assisted evaluation</a:t>
+            </a:r>
+          </a:p>
+          <a:p>
+            <a:pPr>
+              <a:buFont typeface="Arial" panose="020B0604020202020204" pitchFamily="34" charset="0"/>
+              <a:buChar char="•"/>
+            </a:pPr>
+            <a:r>
+              <a:rPr lang="en-US" dirty="0"/>
+              <a:t> LangChain evaluation platform</a:t>
+            </a:r>
           </a:p>
         </p:txBody>
       </p:sp>
@@ -4143,28 +4203,8 @@
           <a:lstStyle/>
           <a:p>
             <a:r>
-              <a:rPr lang="fr-FR" b="1" dirty="0" err="1"/>
-              <a:t>Retrieval</a:t>
-            </a:r>
-            <a:r>
               <a:rPr lang="fr-FR" b="1" dirty="0"/>
-              <a:t> </a:t>
-            </a:r>
-            <a:r>
-              <a:rPr lang="fr-FR" b="1" dirty="0" err="1"/>
-              <a:t>Augmented</a:t>
-            </a:r>
-            <a:r>
-              <a:rPr lang="fr-FR" b="1" dirty="0"/>
-              <a:t> </a:t>
-            </a:r>
-            <a:r>
-              <a:rPr lang="fr-FR" b="1" dirty="0" err="1"/>
-              <a:t>Generation</a:t>
-            </a:r>
-            <a:r>
-              <a:rPr lang="fr-FR" b="1" dirty="0"/>
-              <a:t> (RAG)</a:t>
+              <a:t>LangChain: Agents</a:t>
             </a:r>
             <a:endParaRPr lang="en-US" b="1" dirty="0"/>
           </a:p>
@@ -4186,12 +4226,89 @@
             <p:ph idx="1"/>
           </p:nvPr>
         </p:nvSpPr>
-        <p:spPr/>
+        <p:spPr>
+          <a:xfrm>
+            <a:off x="1097280" y="2082750"/>
+            <a:ext cx="10058400" cy="4023360"/>
+          </a:xfrm>
+        </p:spPr>
         <p:txBody>
           <a:bodyPr/>
           <a:lstStyle/>
           <a:p>
+            <a:pPr>
+              <a:buFont typeface="Arial" panose="020B0604020202020204" pitchFamily="34" charset="0"/>
+              <a:buChar char="•"/>
+            </a:pPr>
+            <a:r>
+              <a:rPr lang="en-US" dirty="0"/>
+              <a:t> Using built in LangChain tools</a:t>
+            </a:r>
+          </a:p>
+          <a:p>
+            <a:pPr lvl="1">
+              <a:buFont typeface="Arial" panose="020B0604020202020204" pitchFamily="34" charset="0"/>
+              <a:buChar char="•"/>
+            </a:pPr>
+            <a:r>
+              <a:rPr lang="en-US" dirty="0"/>
+              <a:t>DuckDuckGo search</a:t>
+            </a:r>
+          </a:p>
+          <a:p>
+            <a:pPr lvl="1">
+              <a:buFont typeface="Arial" panose="020B0604020202020204" pitchFamily="34" charset="0"/>
+              <a:buChar char="•"/>
+            </a:pPr>
+            <a:r>
+              <a:rPr lang="en-US" dirty="0"/>
+              <a:t>Wikipedia</a:t>
+            </a:r>
+          </a:p>
+          <a:p>
+            <a:pPr lvl="1">
+              <a:buFont typeface="Arial" panose="020B0604020202020204" pitchFamily="34" charset="0"/>
+              <a:buChar char="•"/>
+            </a:pPr>
+            <a:r>
+              <a:rPr lang="en-US" dirty="0"/>
+              <a:t>Python (</a:t>
+            </a:r>
+            <a:r>
+              <a:rPr lang="en-US" dirty="0" err="1"/>
+              <a:t>PythonREPLTool</a:t>
+            </a:r>
+            <a:r>
+              <a:rPr lang="en-US" dirty="0"/>
+              <a:t>)</a:t>
+            </a:r>
+          </a:p>
+          <a:p>
+            <a:pPr lvl="1">
+              <a:buFont typeface="Arial" panose="020B0604020202020204" pitchFamily="34" charset="0"/>
+              <a:buChar char="•"/>
+            </a:pPr>
+            <a:r>
+              <a:rPr lang="en-US" dirty="0"/>
+              <a:t>Etc.</a:t>
+            </a:r>
+          </a:p>
+          <a:p>
+            <a:pPr lvl="1">
+              <a:buFont typeface="Arial" panose="020B0604020202020204" pitchFamily="34" charset="0"/>
+              <a:buChar char="•"/>
+            </a:pPr>
             <a:endParaRPr lang="en-US" dirty="0"/>
+          </a:p>
+          <a:p>
+            <a:pPr>
+              <a:buFont typeface="Arial" panose="020B0604020202020204" pitchFamily="34" charset="0"/>
+              <a:buChar char="•"/>
+            </a:pPr>
+            <a:r>
+              <a:rPr lang="en-US" dirty="0"/>
+              <a:t> Defining your own tools</a:t>
+            </a:r>
           </a:p>
         </p:txBody>
       </p:sp>
@@ -4226,15 +4343,45 @@
             <a:pPr algn="ctr"/>
             <a:r>
               <a:rPr lang="en-US" dirty="0"/>
-              <a:t>7 of n</a:t>
-            </a:r>
-          </a:p>
-        </p:txBody>
-      </p:sp>
+              <a:t>6 of n</a:t>
+            </a:r>
+          </a:p>
+        </p:txBody>
+      </p:sp>
+      <p:pic>
+        <p:nvPicPr>
+          <p:cNvPr id="6" name="Picture 5">
+            <a:extLst>
+              <a:ext uri="{FF2B5EF4-FFF2-40B4-BE49-F238E27FC236}">
+                <a16:creationId xmlns:a16="http://schemas.microsoft.com/office/drawing/2014/main" id="{A2C713D6-6567-47D5-8E7B-D20E26E7E50B}"/>
+              </a:ext>
+            </a:extLst>
+          </p:cNvPr>
+          <p:cNvPicPr>
+            <a:picLocks noChangeAspect="1"/>
+          </p:cNvPicPr>
+          <p:nvPr/>
+        </p:nvPicPr>
+        <p:blipFill>
+          <a:blip r:embed="rId2"/>
+          <a:stretch>
+            <a:fillRect/>
+          </a:stretch>
+        </p:blipFill>
+        <p:spPr>
+          <a:xfrm>
+            <a:off x="5960203" y="1866508"/>
+            <a:ext cx="4700209" cy="4147794"/>
+          </a:xfrm>
+          <a:prstGeom prst="rect">
+            <a:avLst/>
+          </a:prstGeom>
+        </p:spPr>
+      </p:pic>
     </p:spTree>
     <p:extLst>
       <p:ext uri="{BB962C8B-B14F-4D97-AF65-F5344CB8AC3E}">
-        <p14:creationId xmlns:p14="http://schemas.microsoft.com/office/powerpoint/2010/main" val="494316150"/>
+        <p14:creationId xmlns:p14="http://schemas.microsoft.com/office/powerpoint/2010/main" val="8912079"/>
       </p:ext>
     </p:extLst>
   </p:cSld>
@@ -4283,12 +4430,28 @@
           <a:lstStyle/>
           <a:p>
             <a:r>
+              <a:rPr lang="fr-FR" b="1" dirty="0" err="1"/>
+              <a:t>Retrieval</a:t>
+            </a:r>
+            <a:r>
               <a:rPr lang="fr-FR" b="1" dirty="0"/>
-              <a:t>RAG: Document </a:t>
+              <a:t> </a:t>
             </a:r>
             <a:r>
               <a:rPr lang="fr-FR" b="1" dirty="0" err="1"/>
-              <a:t>Loading</a:t>
+              <a:t>Augmented</a:t>
+            </a:r>
+            <a:r>
+              <a:rPr lang="fr-FR" b="1" dirty="0"/>
+              <a:t> </a:t>
+            </a:r>
+            <a:r>
+              <a:rPr lang="fr-FR" b="1" dirty="0" err="1"/>
+              <a:t>Generation</a:t>
+            </a:r>
+            <a:r>
+              <a:rPr lang="fr-FR" b="1" dirty="0"/>
+              <a:t> (RAG)</a:t>
             </a:r>
             <a:endParaRPr lang="en-US" b="1" dirty="0"/>
           </a:p>
@@ -4315,7 +4478,138 @@
           <a:bodyPr/>
           <a:lstStyle/>
           <a:p>
-            <a:endParaRPr lang="en-US" dirty="0"/>
+            <a:r>
+              <a:rPr lang="en-US" b="1" dirty="0">
+                <a:solidFill>
+                  <a:schemeClr val="accent3"/>
+                </a:solidFill>
+                <a:latin typeface="Helvetica Neue"/>
+              </a:rPr>
+              <a:t>RAG:</a:t>
+            </a:r>
+            <a:r>
+              <a:rPr lang="en-US" dirty="0">
+                <a:solidFill>
+                  <a:schemeClr val="tx1"/>
+                </a:solidFill>
+                <a:latin typeface="Helvetica Neue"/>
+              </a:rPr>
+              <a:t> </a:t>
+            </a:r>
+            <a:r>
+              <a:rPr lang="en-US" b="0" i="0" dirty="0">
+                <a:solidFill>
+                  <a:srgbClr val="FFFFFF"/>
+                </a:solidFill>
+                <a:effectLst/>
+                <a:latin typeface="Google Sans"/>
+              </a:rPr>
+              <a:t>an AI framework that combines the strengths of traditional information retrieval systems (such as databases) with the capabilities of generative large language models (LLMs)</a:t>
+            </a:r>
+            <a:r>
+              <a:rPr lang="en-US" b="0" i="0" dirty="0">
+                <a:solidFill>
+                  <a:srgbClr val="E8E8E8"/>
+                </a:solidFill>
+                <a:effectLst/>
+                <a:latin typeface="Google Sans"/>
+              </a:rPr>
+              <a:t>.</a:t>
+            </a:r>
+          </a:p>
+          <a:p>
+            <a:endParaRPr lang="en-US" dirty="0">
+              <a:solidFill>
+                <a:srgbClr val="E8E8E8"/>
+              </a:solidFill>
+              <a:latin typeface="Google Sans"/>
+            </a:endParaRPr>
+          </a:p>
+          <a:p>
+            <a:r>
+              <a:rPr lang="en-US" b="0" i="0" dirty="0">
+                <a:solidFill>
+                  <a:srgbClr val="E8E8E8"/>
+                </a:solidFill>
+                <a:effectLst/>
+                <a:latin typeface="Google Sans"/>
+              </a:rPr>
+              <a:t>In RAG, </a:t>
+            </a:r>
+            <a:r>
+              <a:rPr lang="en-US" b="0" i="0" dirty="0">
+                <a:solidFill>
+                  <a:schemeClr val="tx1"/>
+                </a:solidFill>
+                <a:effectLst/>
+                <a:latin typeface="Helvetica Neue"/>
+              </a:rPr>
+              <a:t>an LLM retrieves </a:t>
+            </a:r>
+            <a:r>
+              <a:rPr lang="en-US" b="0" i="0" dirty="0">
+                <a:solidFill>
+                  <a:schemeClr val="accent3"/>
+                </a:solidFill>
+                <a:effectLst/>
+                <a:latin typeface="Helvetica Neue"/>
+              </a:rPr>
+              <a:t>contextual documents</a:t>
+            </a:r>
+            <a:r>
+              <a:rPr lang="en-US" b="0" i="0" dirty="0">
+                <a:solidFill>
+                  <a:schemeClr val="tx1"/>
+                </a:solidFill>
+                <a:effectLst/>
+                <a:latin typeface="Helvetica Neue"/>
+              </a:rPr>
+              <a:t> from an external dataset as part of its execution.</a:t>
+            </a:r>
+          </a:p>
+          <a:p>
+            <a:endParaRPr lang="en-US" dirty="0">
+              <a:solidFill>
+                <a:schemeClr val="tx1"/>
+              </a:solidFill>
+              <a:latin typeface="Helvetica Neue"/>
+            </a:endParaRPr>
+          </a:p>
+          <a:p>
+            <a:r>
+              <a:rPr lang="en-US" b="1" dirty="0">
+                <a:solidFill>
+                  <a:schemeClr val="accent3"/>
+                </a:solidFill>
+                <a:latin typeface="Helvetica Neue"/>
+              </a:rPr>
+              <a:t>Use-case:</a:t>
+            </a:r>
+            <a:r>
+              <a:rPr lang="en-US" dirty="0">
+                <a:solidFill>
+                  <a:schemeClr val="tx1"/>
+                </a:solidFill>
+                <a:latin typeface="Helvetica Neue"/>
+              </a:rPr>
+              <a:t> U</a:t>
+            </a:r>
+            <a:r>
+              <a:rPr lang="en-US" b="0" i="0" dirty="0">
+                <a:solidFill>
+                  <a:schemeClr val="tx1"/>
+                </a:solidFill>
+                <a:effectLst/>
+                <a:latin typeface="Helvetica Neue"/>
+              </a:rPr>
+              <a:t>seful if we want to ask question about specific documents (e.g., our PDFs, a set of videos, etc.)</a:t>
+            </a:r>
+            <a:endParaRPr lang="en-US" dirty="0">
+              <a:solidFill>
+                <a:schemeClr val="tx1"/>
+              </a:solidFill>
+              <a:latin typeface="Helvetica Neue"/>
+            </a:endParaRPr>
           </a:p>
         </p:txBody>
       </p:sp>
@@ -4350,7 +4644,7 @@
             <a:pPr algn="ctr"/>
             <a:r>
               <a:rPr lang="en-US" dirty="0"/>
-              <a:t>8 of n</a:t>
+              <a:t>7 of n</a:t>
             </a:r>
           </a:p>
         </p:txBody>
@@ -4358,7 +4652,7 @@
     </p:spTree>
     <p:extLst>
       <p:ext uri="{BB962C8B-B14F-4D97-AF65-F5344CB8AC3E}">
-        <p14:creationId xmlns:p14="http://schemas.microsoft.com/office/powerpoint/2010/main" val="1740740662"/>
+        <p14:creationId xmlns:p14="http://schemas.microsoft.com/office/powerpoint/2010/main" val="494316150"/>
       </p:ext>
     </p:extLst>
   </p:cSld>
@@ -4390,7 +4684,7 @@
           <p:cNvPr id="2" name="Title 1">
             <a:extLst>
               <a:ext uri="{FF2B5EF4-FFF2-40B4-BE49-F238E27FC236}">
-                <a16:creationId xmlns:a16="http://schemas.microsoft.com/office/drawing/2014/main" id="{496A992F-F5B0-4546-9577-213FDA0B45F9}"/>
+                <a16:creationId xmlns:a16="http://schemas.microsoft.com/office/drawing/2014/main" id="{F12F3FD4-56F3-4736-8773-AFBCBE2FF749}"/>
               </a:ext>
             </a:extLst>
           </p:cNvPr>
@@ -4407,82 +4701,45 @@
           <a:lstStyle/>
           <a:p>
             <a:r>
-              <a:rPr lang="fr-FR" b="1" dirty="0"/>
-              <a:t>RAG: Document </a:t>
-            </a:r>
-            <a:r>
-              <a:rPr lang="fr-FR" b="1" dirty="0" err="1"/>
-              <a:t>Splitting</a:t>
-            </a:r>
-            <a:endParaRPr lang="en-US" b="1" dirty="0"/>
-          </a:p>
-        </p:txBody>
-      </p:sp>
-      <p:sp>
-        <p:nvSpPr>
-          <p:cNvPr id="3" name="Content Placeholder 2">
+              <a:rPr lang="en-US" b="1" dirty="0"/>
+              <a:t>RAG: Overview</a:t>
+            </a:r>
+          </a:p>
+        </p:txBody>
+      </p:sp>
+      <p:pic>
+        <p:nvPicPr>
+          <p:cNvPr id="5" name="Content Placeholder 4">
             <a:extLst>
               <a:ext uri="{FF2B5EF4-FFF2-40B4-BE49-F238E27FC236}">
-                <a16:creationId xmlns:a16="http://schemas.microsoft.com/office/drawing/2014/main" id="{27634627-5020-42B4-8CFD-1B158C53CCAF}"/>
+                <a16:creationId xmlns:a16="http://schemas.microsoft.com/office/drawing/2014/main" id="{D45BBA01-F2F6-4B55-AA88-6524F6215839}"/>
               </a:ext>
             </a:extLst>
           </p:cNvPr>
-          <p:cNvSpPr>
-            <a:spLocks noGrp="1"/>
-          </p:cNvSpPr>
+          <p:cNvPicPr>
+            <a:picLocks noGrp="1" noChangeAspect="1"/>
+          </p:cNvPicPr>
           <p:nvPr>
             <p:ph idx="1"/>
           </p:nvPr>
-        </p:nvSpPr>
-        <p:spPr/>
-        <p:txBody>
-          <a:bodyPr/>
-          <a:lstStyle/>
-          <a:p>
-            <a:endParaRPr lang="en-US" dirty="0"/>
-          </a:p>
-        </p:txBody>
-      </p:sp>
-      <p:sp>
-        <p:nvSpPr>
-          <p:cNvPr id="4" name="TextBox 3">
-            <a:extLst>
-              <a:ext uri="{FF2B5EF4-FFF2-40B4-BE49-F238E27FC236}">
-                <a16:creationId xmlns:a16="http://schemas.microsoft.com/office/drawing/2014/main" id="{9ED3D534-BBDF-481B-B958-084DF4878A72}"/>
-              </a:ext>
-            </a:extLst>
-          </p:cNvPr>
-          <p:cNvSpPr txBox="1"/>
-          <p:nvPr/>
-        </p:nvSpPr>
-        <p:spPr>
-          <a:xfrm>
-            <a:off x="5650230" y="6451501"/>
-            <a:ext cx="1021473" cy="369332"/>
-          </a:xfrm>
-          <a:prstGeom prst="rect">
-            <a:avLst/>
-          </a:prstGeom>
-          <a:noFill/>
-        </p:spPr>
-        <p:txBody>
-          <a:bodyPr wrap="square" rtlCol="0">
-            <a:spAutoFit/>
-          </a:bodyPr>
-          <a:lstStyle/>
-          <a:p>
-            <a:pPr algn="ctr"/>
-            <a:r>
-              <a:rPr lang="en-US" dirty="0"/>
-              <a:t>9 of n</a:t>
-            </a:r>
-          </a:p>
-        </p:txBody>
-      </p:sp>
+        </p:nvPicPr>
+        <p:blipFill>
+          <a:blip r:embed="rId2"/>
+          <a:stretch>
+            <a:fillRect/>
+          </a:stretch>
+        </p:blipFill>
+        <p:spPr>
+          <a:xfrm>
+            <a:off x="1097280" y="2396641"/>
+            <a:ext cx="10136701" cy="3089855"/>
+          </a:xfrm>
+        </p:spPr>
+      </p:pic>
     </p:spTree>
     <p:extLst>
       <p:ext uri="{BB962C8B-B14F-4D97-AF65-F5344CB8AC3E}">
-        <p14:creationId xmlns:p14="http://schemas.microsoft.com/office/powerpoint/2010/main" val="1822237357"/>
+        <p14:creationId xmlns:p14="http://schemas.microsoft.com/office/powerpoint/2010/main" val="2721549772"/>
       </p:ext>
     </p:extLst>
   </p:cSld>
@@ -4532,7 +4789,23 @@
           <a:p>
             <a:r>
               <a:rPr lang="fr-FR" b="1" dirty="0"/>
-              <a:t>RAG: Storage</a:t>
+              <a:t>RAG: Document </a:t>
+            </a:r>
+            <a:r>
+              <a:rPr lang="fr-FR" b="1" dirty="0" err="1"/>
+              <a:t>Loading</a:t>
+            </a:r>
+            <a:r>
+              <a:rPr lang="fr-FR" b="1" dirty="0"/>
+              <a:t> </a:t>
+            </a:r>
+            <a:r>
+              <a:rPr lang="fr-FR" sz="2400" b="1" dirty="0"/>
+              <a:t>(Part 1)</a:t>
+            </a:r>
+            <a:r>
+              <a:rPr lang="fr-FR" b="1" dirty="0"/>
+              <a:t> </a:t>
             </a:r>
             <a:endParaRPr lang="en-US" b="1" dirty="0"/>
           </a:p>
@@ -4554,11 +4827,84 @@
             <p:ph idx="1"/>
           </p:nvPr>
         </p:nvSpPr>
-        <p:spPr/>
+        <p:spPr>
+          <a:xfrm>
+            <a:off x="1131766" y="2047871"/>
+            <a:ext cx="10058400" cy="4023360"/>
+          </a:xfrm>
+        </p:spPr>
         <p:txBody>
           <a:bodyPr/>
           <a:lstStyle/>
           <a:p>
+            <a:pPr>
+              <a:buFont typeface="Arial" panose="020B0604020202020204" pitchFamily="34" charset="0"/>
+              <a:buChar char="•"/>
+            </a:pPr>
+            <a:r>
+              <a:rPr lang="en-US" dirty="0"/>
+              <a:t> PDF</a:t>
+            </a:r>
+          </a:p>
+          <a:p>
+            <a:pPr lvl="1">
+              <a:buFont typeface="Arial" panose="020B0604020202020204" pitchFamily="34" charset="0"/>
+              <a:buChar char="•"/>
+            </a:pPr>
+            <a:r>
+              <a:rPr lang="en-US" dirty="0"/>
+              <a:t>Each page in PDF is a `Document`</a:t>
+            </a:r>
+          </a:p>
+          <a:p>
+            <a:pPr lvl="2">
+              <a:buFont typeface="Arial" panose="020B0604020202020204" pitchFamily="34" charset="0"/>
+              <a:buChar char="•"/>
+            </a:pPr>
+            <a:r>
+              <a:rPr lang="en-US" dirty="0" err="1"/>
+              <a:t>page_content</a:t>
+            </a:r>
+            <a:endParaRPr lang="en-US" dirty="0"/>
+          </a:p>
+          <a:p>
+            <a:pPr lvl="2">
+              <a:buFont typeface="Arial" panose="020B0604020202020204" pitchFamily="34" charset="0"/>
+              <a:buChar char="•"/>
+            </a:pPr>
+            <a:r>
+              <a:rPr lang="en-US" dirty="0"/>
+              <a:t>metadata</a:t>
+            </a:r>
+          </a:p>
+          <a:p>
+            <a:pPr>
+              <a:buFont typeface="Arial" panose="020B0604020202020204" pitchFamily="34" charset="0"/>
+              <a:buChar char="•"/>
+            </a:pPr>
+            <a:endParaRPr lang="en-US" dirty="0"/>
+          </a:p>
+          <a:p>
+            <a:pPr>
+              <a:buFont typeface="Arial" panose="020B0604020202020204" pitchFamily="34" charset="0"/>
+              <a:buChar char="•"/>
+            </a:pPr>
+            <a:r>
+              <a:rPr lang="en-US" dirty="0"/>
+              <a:t>URLs</a:t>
+            </a:r>
+          </a:p>
+          <a:p>
+            <a:pPr marL="0" indent="0">
+              <a:buNone/>
+            </a:pPr>
+            <a:endParaRPr lang="en-US" dirty="0"/>
+          </a:p>
+          <a:p>
+            <a:pPr>
+              <a:buFont typeface="Arial" panose="020B0604020202020204" pitchFamily="34" charset="0"/>
+              <a:buChar char="•"/>
+            </a:pPr>
             <a:endParaRPr lang="en-US" dirty="0"/>
           </a:p>
         </p:txBody>
@@ -4594,15 +4940,75 @@
             <a:pPr algn="ctr"/>
             <a:r>
               <a:rPr lang="en-US" dirty="0"/>
-              <a:t>10 of n</a:t>
-            </a:r>
-          </a:p>
-        </p:txBody>
-      </p:sp>
+              <a:t>8 of n</a:t>
+            </a:r>
+          </a:p>
+        </p:txBody>
+      </p:sp>
+      <p:pic>
+        <p:nvPicPr>
+          <p:cNvPr id="6" name="Picture 5">
+            <a:extLst>
+              <a:ext uri="{FF2B5EF4-FFF2-40B4-BE49-F238E27FC236}">
+                <a16:creationId xmlns:a16="http://schemas.microsoft.com/office/drawing/2014/main" id="{49CC08AE-26AD-4E71-8575-5E558455095D}"/>
+              </a:ext>
+            </a:extLst>
+          </p:cNvPr>
+          <p:cNvPicPr>
+            <a:picLocks noChangeAspect="1"/>
+          </p:cNvPicPr>
+          <p:nvPr/>
+        </p:nvPicPr>
+        <p:blipFill>
+          <a:blip r:embed="rId2"/>
+          <a:stretch>
+            <a:fillRect/>
+          </a:stretch>
+        </p:blipFill>
+        <p:spPr>
+          <a:xfrm>
+            <a:off x="5825765" y="1998913"/>
+            <a:ext cx="4860696" cy="1858501"/>
+          </a:xfrm>
+          <a:prstGeom prst="rect">
+            <a:avLst/>
+          </a:prstGeom>
+        </p:spPr>
+      </p:pic>
+      <p:pic>
+        <p:nvPicPr>
+          <p:cNvPr id="8" name="Picture 7">
+            <a:extLst>
+              <a:ext uri="{FF2B5EF4-FFF2-40B4-BE49-F238E27FC236}">
+                <a16:creationId xmlns:a16="http://schemas.microsoft.com/office/drawing/2014/main" id="{E93F74BF-18A0-4B0B-9128-F617ED20531B}"/>
+              </a:ext>
+            </a:extLst>
+          </p:cNvPr>
+          <p:cNvPicPr>
+            <a:picLocks noChangeAspect="1"/>
+          </p:cNvPicPr>
+          <p:nvPr/>
+        </p:nvPicPr>
+        <p:blipFill>
+          <a:blip r:embed="rId3"/>
+          <a:stretch>
+            <a:fillRect/>
+          </a:stretch>
+        </p:blipFill>
+        <p:spPr>
+          <a:xfrm>
+            <a:off x="5825765" y="4163772"/>
+            <a:ext cx="5034291" cy="1858501"/>
+          </a:xfrm>
+          <a:prstGeom prst="rect">
+            <a:avLst/>
+          </a:prstGeom>
+        </p:spPr>
+      </p:pic>
     </p:spTree>
     <p:extLst>
       <p:ext uri="{BB962C8B-B14F-4D97-AF65-F5344CB8AC3E}">
-        <p14:creationId xmlns:p14="http://schemas.microsoft.com/office/powerpoint/2010/main" val="1364780128"/>
+        <p14:creationId xmlns:p14="http://schemas.microsoft.com/office/powerpoint/2010/main" val="1740740662"/>
       </p:ext>
     </p:extLst>
   </p:cSld>
@@ -4652,11 +5058,23 @@
           <a:p>
             <a:r>
               <a:rPr lang="fr-FR" b="1" dirty="0"/>
-              <a:t>RAG: </a:t>
+              <a:t>RAG: Document </a:t>
             </a:r>
             <a:r>
               <a:rPr lang="fr-FR" b="1" dirty="0" err="1"/>
-              <a:t>Retrieval</a:t>
+              <a:t>Loading</a:t>
+            </a:r>
+            <a:r>
+              <a:rPr lang="fr-FR" b="1" dirty="0"/>
+              <a:t> </a:t>
+            </a:r>
+            <a:r>
+              <a:rPr lang="fr-FR" sz="2400" b="1" dirty="0"/>
+              <a:t>(Part 2)</a:t>
+            </a:r>
+            <a:r>
+              <a:rPr lang="fr-FR" b="1" dirty="0"/>
+              <a:t> </a:t>
             </a:r>
             <a:endParaRPr lang="en-US" b="1" dirty="0"/>
           </a:p>
@@ -4678,11 +5096,74 @@
             <p:ph idx="1"/>
           </p:nvPr>
         </p:nvSpPr>
-        <p:spPr/>
+        <p:spPr>
+          <a:xfrm>
+            <a:off x="1131766" y="2047871"/>
+            <a:ext cx="10058400" cy="4023360"/>
+          </a:xfrm>
+        </p:spPr>
         <p:txBody>
           <a:bodyPr/>
           <a:lstStyle/>
           <a:p>
+            <a:pPr>
+              <a:buFont typeface="Arial" panose="020B0604020202020204" pitchFamily="34" charset="0"/>
+              <a:buChar char="•"/>
+            </a:pPr>
+            <a:r>
+              <a:rPr lang="en-US" dirty="0"/>
+              <a:t> YouTube</a:t>
+            </a:r>
+          </a:p>
+          <a:p>
+            <a:pPr>
+              <a:buFont typeface="Arial" panose="020B0604020202020204" pitchFamily="34" charset="0"/>
+              <a:buChar char="•"/>
+            </a:pPr>
+            <a:endParaRPr lang="en-US" dirty="0"/>
+          </a:p>
+          <a:p>
+            <a:pPr>
+              <a:buFont typeface="Arial" panose="020B0604020202020204" pitchFamily="34" charset="0"/>
+              <a:buChar char="•"/>
+            </a:pPr>
+            <a:endParaRPr lang="en-US" dirty="0"/>
+          </a:p>
+          <a:p>
+            <a:pPr>
+              <a:buFont typeface="Arial" panose="020B0604020202020204" pitchFamily="34" charset="0"/>
+              <a:buChar char="•"/>
+            </a:pPr>
+            <a:endParaRPr lang="en-US" dirty="0"/>
+          </a:p>
+          <a:p>
+            <a:pPr>
+              <a:buFont typeface="Arial" panose="020B0604020202020204" pitchFamily="34" charset="0"/>
+              <a:buChar char="•"/>
+            </a:pPr>
+            <a:endParaRPr lang="en-US" dirty="0"/>
+          </a:p>
+          <a:p>
+            <a:pPr>
+              <a:buFont typeface="Arial" panose="020B0604020202020204" pitchFamily="34" charset="0"/>
+              <a:buChar char="•"/>
+            </a:pPr>
+            <a:r>
+              <a:rPr lang="en-US" dirty="0"/>
+              <a:t> Notion</a:t>
+            </a:r>
+          </a:p>
+          <a:p>
+            <a:pPr marL="0" indent="0">
+              <a:buNone/>
+            </a:pPr>
+            <a:endParaRPr lang="en-US" dirty="0"/>
+          </a:p>
+          <a:p>
+            <a:pPr>
+              <a:buFont typeface="Arial" panose="020B0604020202020204" pitchFamily="34" charset="0"/>
+              <a:buChar char="•"/>
+            </a:pPr>
             <a:endParaRPr lang="en-US" dirty="0"/>
           </a:p>
         </p:txBody>
@@ -4718,15 +5199,75 @@
             <a:pPr algn="ctr"/>
             <a:r>
               <a:rPr lang="en-US" dirty="0"/>
-              <a:t>11 of n</a:t>
-            </a:r>
-          </a:p>
-        </p:txBody>
-      </p:sp>
+              <a:t>8 of n</a:t>
+            </a:r>
+          </a:p>
+        </p:txBody>
+      </p:sp>
+      <p:pic>
+        <p:nvPicPr>
+          <p:cNvPr id="7" name="Picture 6">
+            <a:extLst>
+              <a:ext uri="{FF2B5EF4-FFF2-40B4-BE49-F238E27FC236}">
+                <a16:creationId xmlns:a16="http://schemas.microsoft.com/office/drawing/2014/main" id="{FB6BDB51-EF82-4A74-A39F-89C805C467FF}"/>
+              </a:ext>
+            </a:extLst>
+          </p:cNvPr>
+          <p:cNvPicPr>
+            <a:picLocks noChangeAspect="1"/>
+          </p:cNvPicPr>
+          <p:nvPr/>
+        </p:nvPicPr>
+        <p:blipFill>
+          <a:blip r:embed="rId2"/>
+          <a:stretch>
+            <a:fillRect/>
+          </a:stretch>
+        </p:blipFill>
+        <p:spPr>
+          <a:xfrm>
+            <a:off x="5039145" y="4396789"/>
+            <a:ext cx="6151021" cy="1787195"/>
+          </a:xfrm>
+          <a:prstGeom prst="rect">
+            <a:avLst/>
+          </a:prstGeom>
+        </p:spPr>
+      </p:pic>
+      <p:pic>
+        <p:nvPicPr>
+          <p:cNvPr id="10" name="Picture 9">
+            <a:extLst>
+              <a:ext uri="{FF2B5EF4-FFF2-40B4-BE49-F238E27FC236}">
+                <a16:creationId xmlns:a16="http://schemas.microsoft.com/office/drawing/2014/main" id="{33F890AB-6667-401D-832B-D2F4F6303ABF}"/>
+              </a:ext>
+            </a:extLst>
+          </p:cNvPr>
+          <p:cNvPicPr>
+            <a:picLocks noChangeAspect="1"/>
+          </p:cNvPicPr>
+          <p:nvPr/>
+        </p:nvPicPr>
+        <p:blipFill>
+          <a:blip r:embed="rId3"/>
+          <a:stretch>
+            <a:fillRect/>
+          </a:stretch>
+        </p:blipFill>
+        <p:spPr>
+          <a:xfrm>
+            <a:off x="5094166" y="1851671"/>
+            <a:ext cx="6096000" cy="2348918"/>
+          </a:xfrm>
+          <a:prstGeom prst="rect">
+            <a:avLst/>
+          </a:prstGeom>
+        </p:spPr>
+      </p:pic>
     </p:spTree>
     <p:extLst>
       <p:ext uri="{BB962C8B-B14F-4D97-AF65-F5344CB8AC3E}">
-        <p14:creationId xmlns:p14="http://schemas.microsoft.com/office/powerpoint/2010/main" val="644614161"/>
+        <p14:creationId xmlns:p14="http://schemas.microsoft.com/office/powerpoint/2010/main" val="95723970"/>
       </p:ext>
     </p:extLst>
   </p:cSld>
@@ -4776,15 +5317,11 @@
           <a:p>
             <a:r>
               <a:rPr lang="fr-FR" b="1" dirty="0"/>
-              <a:t>RAG: Chat </a:t>
+              <a:t>RAG: Document </a:t>
             </a:r>
             <a:r>
               <a:rPr lang="fr-FR" b="1" dirty="0" err="1"/>
-              <a:t>with</a:t>
-            </a:r>
-            <a:r>
-              <a:rPr lang="fr-FR" b="1" dirty="0"/>
-              <a:t> Data</a:t>
+              <a:t>Splitting</a:t>
             </a:r>
             <a:endParaRPr lang="en-US" b="1" dirty="0"/>
           </a:p>
@@ -4846,7 +5383,7 @@
             <a:pPr algn="ctr"/>
             <a:r>
               <a:rPr lang="en-US" dirty="0"/>
-              <a:t>12 of n</a:t>
+              <a:t>9 of n</a:t>
             </a:r>
           </a:p>
         </p:txBody>
@@ -4854,7 +5391,7 @@
     </p:spTree>
     <p:extLst>
       <p:ext uri="{BB962C8B-B14F-4D97-AF65-F5344CB8AC3E}">
-        <p14:creationId xmlns:p14="http://schemas.microsoft.com/office/powerpoint/2010/main" val="2686710233"/>
+        <p14:creationId xmlns:p14="http://schemas.microsoft.com/office/powerpoint/2010/main" val="1822237357"/>
       </p:ext>
     </p:extLst>
   </p:cSld>
@@ -4897,22 +5434,76 @@
             <p:ph type="title"/>
           </p:nvPr>
         </p:nvSpPr>
-        <p:spPr>
-          <a:xfrm>
-            <a:off x="1066800" y="2521803"/>
-            <a:ext cx="10058400" cy="1450757"/>
-          </a:xfrm>
-        </p:spPr>
-        <p:txBody>
-          <a:bodyPr>
-            <a:normAutofit/>
+        <p:spPr/>
+        <p:txBody>
+          <a:bodyPr/>
+          <a:lstStyle/>
+          <a:p>
+            <a:r>
+              <a:rPr lang="fr-FR" b="1" dirty="0"/>
+              <a:t>RAG: Storage</a:t>
+            </a:r>
+            <a:endParaRPr lang="en-US" b="1" dirty="0"/>
+          </a:p>
+        </p:txBody>
+      </p:sp>
+      <p:sp>
+        <p:nvSpPr>
+          <p:cNvPr id="3" name="Content Placeholder 2">
+            <a:extLst>
+              <a:ext uri="{FF2B5EF4-FFF2-40B4-BE49-F238E27FC236}">
+                <a16:creationId xmlns:a16="http://schemas.microsoft.com/office/drawing/2014/main" id="{27634627-5020-42B4-8CFD-1B158C53CCAF}"/>
+              </a:ext>
+            </a:extLst>
+          </p:cNvPr>
+          <p:cNvSpPr>
+            <a:spLocks noGrp="1"/>
+          </p:cNvSpPr>
+          <p:nvPr>
+            <p:ph idx="1"/>
+          </p:nvPr>
+        </p:nvSpPr>
+        <p:spPr/>
+        <p:txBody>
+          <a:bodyPr/>
+          <a:lstStyle/>
+          <a:p>
+            <a:endParaRPr lang="en-US" dirty="0"/>
+          </a:p>
+        </p:txBody>
+      </p:sp>
+      <p:sp>
+        <p:nvSpPr>
+          <p:cNvPr id="4" name="TextBox 3">
+            <a:extLst>
+              <a:ext uri="{FF2B5EF4-FFF2-40B4-BE49-F238E27FC236}">
+                <a16:creationId xmlns:a16="http://schemas.microsoft.com/office/drawing/2014/main" id="{9ED3D534-BBDF-481B-B958-084DF4878A72}"/>
+              </a:ext>
+            </a:extLst>
+          </p:cNvPr>
+          <p:cNvSpPr txBox="1"/>
+          <p:nvPr/>
+        </p:nvSpPr>
+        <p:spPr>
+          <a:xfrm>
+            <a:off x="5650230" y="6451501"/>
+            <a:ext cx="1021473" cy="369332"/>
+          </a:xfrm>
+          <a:prstGeom prst="rect">
+            <a:avLst/>
+          </a:prstGeom>
+          <a:noFill/>
+        </p:spPr>
+        <p:txBody>
+          <a:bodyPr wrap="square" rtlCol="0">
+            <a:spAutoFit/>
           </a:bodyPr>
           <a:lstStyle/>
           <a:p>
             <a:pPr algn="ctr"/>
             <a:r>
-              <a:rPr lang="en-US" sz="7200" b="1" dirty="0"/>
-              <a:t>The End</a:t>
+              <a:rPr lang="en-US" dirty="0"/>
+              <a:t>10 of n</a:t>
             </a:r>
           </a:p>
         </p:txBody>
@@ -4920,7 +5511,259 @@
     </p:spTree>
     <p:extLst>
       <p:ext uri="{BB962C8B-B14F-4D97-AF65-F5344CB8AC3E}">
-        <p14:creationId xmlns:p14="http://schemas.microsoft.com/office/powerpoint/2010/main" val="2267141562"/>
+        <p14:creationId xmlns:p14="http://schemas.microsoft.com/office/powerpoint/2010/main" val="1364780128"/>
+      </p:ext>
+    </p:extLst>
+  </p:cSld>
+  <p:clrMapOvr>
+    <a:masterClrMapping/>
+  </p:clrMapOvr>
+</p:sld>
+</file>
+
+<file path=ppt/slides/slide18.xml><?xml version="1.0" encoding="utf-8"?>
+<p:sld xmlns:a="http://schemas.openxmlformats.org/drawingml/2006/main" xmlns:r="http://schemas.openxmlformats.org/officeDocument/2006/relationships" xmlns:p="http://schemas.openxmlformats.org/presentationml/2006/main">
+  <p:cSld>
+    <p:spTree>
+      <p:nvGrpSpPr>
+        <p:cNvPr id="1" name=""/>
+        <p:cNvGrpSpPr/>
+        <p:nvPr/>
+      </p:nvGrpSpPr>
+      <p:grpSpPr>
+        <a:xfrm>
+          <a:off x="0" y="0"/>
+          <a:ext cx="0" cy="0"/>
+          <a:chOff x="0" y="0"/>
+          <a:chExt cx="0" cy="0"/>
+        </a:xfrm>
+      </p:grpSpPr>
+      <p:sp>
+        <p:nvSpPr>
+          <p:cNvPr id="2" name="Title 1">
+            <a:extLst>
+              <a:ext uri="{FF2B5EF4-FFF2-40B4-BE49-F238E27FC236}">
+                <a16:creationId xmlns:a16="http://schemas.microsoft.com/office/drawing/2014/main" id="{496A992F-F5B0-4546-9577-213FDA0B45F9}"/>
+              </a:ext>
+            </a:extLst>
+          </p:cNvPr>
+          <p:cNvSpPr>
+            <a:spLocks noGrp="1"/>
+          </p:cNvSpPr>
+          <p:nvPr>
+            <p:ph type="title"/>
+          </p:nvPr>
+        </p:nvSpPr>
+        <p:spPr/>
+        <p:txBody>
+          <a:bodyPr/>
+          <a:lstStyle/>
+          <a:p>
+            <a:r>
+              <a:rPr lang="fr-FR" b="1" dirty="0"/>
+              <a:t>RAG: </a:t>
+            </a:r>
+            <a:r>
+              <a:rPr lang="fr-FR" b="1" dirty="0" err="1"/>
+              <a:t>Retrieval</a:t>
+            </a:r>
+            <a:endParaRPr lang="en-US" b="1" dirty="0"/>
+          </a:p>
+        </p:txBody>
+      </p:sp>
+      <p:sp>
+        <p:nvSpPr>
+          <p:cNvPr id="3" name="Content Placeholder 2">
+            <a:extLst>
+              <a:ext uri="{FF2B5EF4-FFF2-40B4-BE49-F238E27FC236}">
+                <a16:creationId xmlns:a16="http://schemas.microsoft.com/office/drawing/2014/main" id="{27634627-5020-42B4-8CFD-1B158C53CCAF}"/>
+              </a:ext>
+            </a:extLst>
+          </p:cNvPr>
+          <p:cNvSpPr>
+            <a:spLocks noGrp="1"/>
+          </p:cNvSpPr>
+          <p:nvPr>
+            <p:ph idx="1"/>
+          </p:nvPr>
+        </p:nvSpPr>
+        <p:spPr/>
+        <p:txBody>
+          <a:bodyPr/>
+          <a:lstStyle/>
+          <a:p>
+            <a:endParaRPr lang="en-US" dirty="0"/>
+          </a:p>
+        </p:txBody>
+      </p:sp>
+      <p:sp>
+        <p:nvSpPr>
+          <p:cNvPr id="4" name="TextBox 3">
+            <a:extLst>
+              <a:ext uri="{FF2B5EF4-FFF2-40B4-BE49-F238E27FC236}">
+                <a16:creationId xmlns:a16="http://schemas.microsoft.com/office/drawing/2014/main" id="{9ED3D534-BBDF-481B-B958-084DF4878A72}"/>
+              </a:ext>
+            </a:extLst>
+          </p:cNvPr>
+          <p:cNvSpPr txBox="1"/>
+          <p:nvPr/>
+        </p:nvSpPr>
+        <p:spPr>
+          <a:xfrm>
+            <a:off x="5650230" y="6451501"/>
+            <a:ext cx="1021473" cy="369332"/>
+          </a:xfrm>
+          <a:prstGeom prst="rect">
+            <a:avLst/>
+          </a:prstGeom>
+          <a:noFill/>
+        </p:spPr>
+        <p:txBody>
+          <a:bodyPr wrap="square" rtlCol="0">
+            <a:spAutoFit/>
+          </a:bodyPr>
+          <a:lstStyle/>
+          <a:p>
+            <a:pPr algn="ctr"/>
+            <a:r>
+              <a:rPr lang="en-US" dirty="0"/>
+              <a:t>11 of n</a:t>
+            </a:r>
+          </a:p>
+        </p:txBody>
+      </p:sp>
+    </p:spTree>
+    <p:extLst>
+      <p:ext uri="{BB962C8B-B14F-4D97-AF65-F5344CB8AC3E}">
+        <p14:creationId xmlns:p14="http://schemas.microsoft.com/office/powerpoint/2010/main" val="644614161"/>
+      </p:ext>
+    </p:extLst>
+  </p:cSld>
+  <p:clrMapOvr>
+    <a:masterClrMapping/>
+  </p:clrMapOvr>
+</p:sld>
+</file>
+
+<file path=ppt/slides/slide19.xml><?xml version="1.0" encoding="utf-8"?>
+<p:sld xmlns:a="http://schemas.openxmlformats.org/drawingml/2006/main" xmlns:r="http://schemas.openxmlformats.org/officeDocument/2006/relationships" xmlns:p="http://schemas.openxmlformats.org/presentationml/2006/main">
+  <p:cSld>
+    <p:spTree>
+      <p:nvGrpSpPr>
+        <p:cNvPr id="1" name=""/>
+        <p:cNvGrpSpPr/>
+        <p:nvPr/>
+      </p:nvGrpSpPr>
+      <p:grpSpPr>
+        <a:xfrm>
+          <a:off x="0" y="0"/>
+          <a:ext cx="0" cy="0"/>
+          <a:chOff x="0" y="0"/>
+          <a:chExt cx="0" cy="0"/>
+        </a:xfrm>
+      </p:grpSpPr>
+      <p:sp>
+        <p:nvSpPr>
+          <p:cNvPr id="2" name="Title 1">
+            <a:extLst>
+              <a:ext uri="{FF2B5EF4-FFF2-40B4-BE49-F238E27FC236}">
+                <a16:creationId xmlns:a16="http://schemas.microsoft.com/office/drawing/2014/main" id="{496A992F-F5B0-4546-9577-213FDA0B45F9}"/>
+              </a:ext>
+            </a:extLst>
+          </p:cNvPr>
+          <p:cNvSpPr>
+            <a:spLocks noGrp="1"/>
+          </p:cNvSpPr>
+          <p:nvPr>
+            <p:ph type="title"/>
+          </p:nvPr>
+        </p:nvSpPr>
+        <p:spPr/>
+        <p:txBody>
+          <a:bodyPr/>
+          <a:lstStyle/>
+          <a:p>
+            <a:r>
+              <a:rPr lang="fr-FR" b="1" dirty="0"/>
+              <a:t>RAG: Chat </a:t>
+            </a:r>
+            <a:r>
+              <a:rPr lang="fr-FR" b="1" dirty="0" err="1"/>
+              <a:t>with</a:t>
+            </a:r>
+            <a:r>
+              <a:rPr lang="fr-FR" b="1" dirty="0"/>
+              <a:t> Data</a:t>
+            </a:r>
+            <a:endParaRPr lang="en-US" b="1" dirty="0"/>
+          </a:p>
+        </p:txBody>
+      </p:sp>
+      <p:sp>
+        <p:nvSpPr>
+          <p:cNvPr id="3" name="Content Placeholder 2">
+            <a:extLst>
+              <a:ext uri="{FF2B5EF4-FFF2-40B4-BE49-F238E27FC236}">
+                <a16:creationId xmlns:a16="http://schemas.microsoft.com/office/drawing/2014/main" id="{27634627-5020-42B4-8CFD-1B158C53CCAF}"/>
+              </a:ext>
+            </a:extLst>
+          </p:cNvPr>
+          <p:cNvSpPr>
+            <a:spLocks noGrp="1"/>
+          </p:cNvSpPr>
+          <p:nvPr>
+            <p:ph idx="1"/>
+          </p:nvPr>
+        </p:nvSpPr>
+        <p:spPr/>
+        <p:txBody>
+          <a:bodyPr/>
+          <a:lstStyle/>
+          <a:p>
+            <a:endParaRPr lang="en-US" dirty="0"/>
+          </a:p>
+        </p:txBody>
+      </p:sp>
+      <p:sp>
+        <p:nvSpPr>
+          <p:cNvPr id="4" name="TextBox 3">
+            <a:extLst>
+              <a:ext uri="{FF2B5EF4-FFF2-40B4-BE49-F238E27FC236}">
+                <a16:creationId xmlns:a16="http://schemas.microsoft.com/office/drawing/2014/main" id="{9ED3D534-BBDF-481B-B958-084DF4878A72}"/>
+              </a:ext>
+            </a:extLst>
+          </p:cNvPr>
+          <p:cNvSpPr txBox="1"/>
+          <p:nvPr/>
+        </p:nvSpPr>
+        <p:spPr>
+          <a:xfrm>
+            <a:off x="5650230" y="6451501"/>
+            <a:ext cx="1021473" cy="369332"/>
+          </a:xfrm>
+          <a:prstGeom prst="rect">
+            <a:avLst/>
+          </a:prstGeom>
+          <a:noFill/>
+        </p:spPr>
+        <p:txBody>
+          <a:bodyPr wrap="square" rtlCol="0">
+            <a:spAutoFit/>
+          </a:bodyPr>
+          <a:lstStyle/>
+          <a:p>
+            <a:pPr algn="ctr"/>
+            <a:r>
+              <a:rPr lang="en-US" dirty="0"/>
+              <a:t>12 of n</a:t>
+            </a:r>
+          </a:p>
+        </p:txBody>
+      </p:sp>
+    </p:spTree>
+    <p:extLst>
+      <p:ext uri="{BB962C8B-B14F-4D97-AF65-F5344CB8AC3E}">
+        <p14:creationId xmlns:p14="http://schemas.microsoft.com/office/powerpoint/2010/main" val="2686710233"/>
       </p:ext>
     </p:extLst>
   </p:cSld>
@@ -5220,6 +6063,72 @@
 </p:sld>
 </file>
 
+<file path=ppt/slides/slide20.xml><?xml version="1.0" encoding="utf-8"?>
+<p:sld xmlns:a="http://schemas.openxmlformats.org/drawingml/2006/main" xmlns:r="http://schemas.openxmlformats.org/officeDocument/2006/relationships" xmlns:p="http://schemas.openxmlformats.org/presentationml/2006/main">
+  <p:cSld>
+    <p:spTree>
+      <p:nvGrpSpPr>
+        <p:cNvPr id="1" name=""/>
+        <p:cNvGrpSpPr/>
+        <p:nvPr/>
+      </p:nvGrpSpPr>
+      <p:grpSpPr>
+        <a:xfrm>
+          <a:off x="0" y="0"/>
+          <a:ext cx="0" cy="0"/>
+          <a:chOff x="0" y="0"/>
+          <a:chExt cx="0" cy="0"/>
+        </a:xfrm>
+      </p:grpSpPr>
+      <p:sp>
+        <p:nvSpPr>
+          <p:cNvPr id="2" name="Title 1">
+            <a:extLst>
+              <a:ext uri="{FF2B5EF4-FFF2-40B4-BE49-F238E27FC236}">
+                <a16:creationId xmlns:a16="http://schemas.microsoft.com/office/drawing/2014/main" id="{496A992F-F5B0-4546-9577-213FDA0B45F9}"/>
+              </a:ext>
+            </a:extLst>
+          </p:cNvPr>
+          <p:cNvSpPr>
+            <a:spLocks noGrp="1"/>
+          </p:cNvSpPr>
+          <p:nvPr>
+            <p:ph type="title"/>
+          </p:nvPr>
+        </p:nvSpPr>
+        <p:spPr>
+          <a:xfrm>
+            <a:off x="1066800" y="2521803"/>
+            <a:ext cx="10058400" cy="1450757"/>
+          </a:xfrm>
+        </p:spPr>
+        <p:txBody>
+          <a:bodyPr>
+            <a:normAutofit/>
+          </a:bodyPr>
+          <a:lstStyle/>
+          <a:p>
+            <a:pPr algn="ctr"/>
+            <a:r>
+              <a:rPr lang="en-US" sz="7200" b="1" dirty="0"/>
+              <a:t>The End</a:t>
+            </a:r>
+          </a:p>
+        </p:txBody>
+      </p:sp>
+    </p:spTree>
+    <p:extLst>
+      <p:ext uri="{BB962C8B-B14F-4D97-AF65-F5344CB8AC3E}">
+        <p14:creationId xmlns:p14="http://schemas.microsoft.com/office/powerpoint/2010/main" val="2267141562"/>
+      </p:ext>
+    </p:extLst>
+  </p:cSld>
+  <p:clrMapOvr>
+    <a:masterClrMapping/>
+  </p:clrMapOvr>
+</p:sld>
+</file>
+
 <file path=ppt/slides/slide3.xml><?xml version="1.0" encoding="utf-8"?>
 <p:sld xmlns:a="http://schemas.openxmlformats.org/drawingml/2006/main" xmlns:r="http://schemas.openxmlformats.org/officeDocument/2006/relationships" xmlns:p="http://schemas.openxmlformats.org/presentationml/2006/main">
   <p:cSld>
@@ -5288,10 +6197,24 @@
             <p:ph idx="1"/>
           </p:nvPr>
         </p:nvSpPr>
-        <p:spPr/>
+        <p:spPr>
+          <a:xfrm>
+            <a:off x="1097280" y="1737360"/>
+            <a:ext cx="10058400" cy="4023360"/>
+          </a:xfrm>
+        </p:spPr>
         <p:txBody>
           <a:bodyPr/>
           <a:lstStyle/>
+          <a:p>
+            <a:pPr marL="0" indent="0">
+              <a:buNone/>
+            </a:pPr>
+            <a:r>
+              <a:rPr lang="en-US" b="1" dirty="0"/>
+              <a:t> </a:t>
+            </a:r>
+          </a:p>
           <a:p>
             <a:pPr>
               <a:buFont typeface="Arial" panose="020B0604020202020204" pitchFamily="34" charset="0"/>
@@ -5299,7 +6222,7 @@
             </a:pPr>
             <a:r>
               <a:rPr lang="en-US" b="1" dirty="0"/>
-              <a:t> Direct API calls to </a:t>
+              <a:t>Direct API calls to </a:t>
             </a:r>
             <a:r>
               <a:rPr lang="en-US" b="1" dirty="0" err="1"/>
@@ -5443,14 +6366,14 @@
           <a:lstStyle/>
           <a:p>
             <a:r>
-              <a:rPr lang="en-US" dirty="0"/>
+              <a:rPr lang="en-US" b="1" dirty="0"/>
               <a:t> Direct API calls to </a:t>
             </a:r>
             <a:r>
-              <a:rPr lang="en-US" dirty="0" err="1"/>
+              <a:rPr lang="en-US" b="1" dirty="0" err="1"/>
               <a:t>OpenAI</a:t>
             </a:r>
-            <a:endParaRPr lang="en-US" dirty="0"/>
+            <a:endParaRPr lang="en-US" b="1" dirty="0"/>
           </a:p>
         </p:txBody>
       </p:sp>
@@ -5537,14 +6460,14 @@
           <a:lstStyle/>
           <a:p>
             <a:r>
-              <a:rPr lang="en-US" dirty="0"/>
+              <a:rPr lang="en-US" b="1" dirty="0"/>
               <a:t> API calls with LangChain </a:t>
             </a:r>
             <a:r>
-              <a:rPr lang="en-US" sz="2400" dirty="0"/>
+              <a:rPr lang="en-US" sz="2400" b="1" dirty="0"/>
               <a:t>(Prompt &amp; Model)</a:t>
             </a:r>
-            <a:endParaRPr lang="en-US" dirty="0"/>
+            <a:endParaRPr lang="en-US" b="1" dirty="0"/>
           </a:p>
         </p:txBody>
       </p:sp>
@@ -5629,14 +6552,14 @@
           <a:lstStyle/>
           <a:p>
             <a:r>
-              <a:rPr lang="en-US" dirty="0"/>
+              <a:rPr lang="en-US" b="1" dirty="0"/>
               <a:t> API calls with LangChain </a:t>
             </a:r>
             <a:r>
-              <a:rPr lang="en-US" sz="2400" dirty="0"/>
+              <a:rPr lang="en-US" sz="2400" b="1" dirty="0"/>
               <a:t>(Output Parser)</a:t>
             </a:r>
-            <a:endParaRPr lang="en-US" dirty="0"/>
+            <a:endParaRPr lang="en-US" b="1" dirty="0"/>
           </a:p>
         </p:txBody>
       </p:sp>

</xml_diff>

<commit_message>
Added report file of presentation
</commit_message>
<xml_diff>
--- a/Presentation/Slides/Presentation.pptx
+++ b/Presentation/Slides/Presentation.pptx
@@ -359,7 +359,7 @@
           <a:p>
             <a:fld id="{78698A89-16EE-414F-A76C-14F13C132678}" type="datetimeFigureOut">
               <a:rPr lang="en-US" smtClean="0"/>
-              <a:t>2024-07-04</a:t>
+              <a:t>2024-07-05</a:t>
             </a:fld>
             <a:endParaRPr lang="en-US"/>
           </a:p>
@@ -567,7 +567,7 @@
           <a:p>
             <a:fld id="{78698A89-16EE-414F-A76C-14F13C132678}" type="datetimeFigureOut">
               <a:rPr lang="en-US" smtClean="0"/>
-              <a:t>2024-07-04</a:t>
+              <a:t>2024-07-05</a:t>
             </a:fld>
             <a:endParaRPr lang="en-US"/>
           </a:p>
@@ -825,7 +825,7 @@
           <a:p>
             <a:fld id="{78698A89-16EE-414F-A76C-14F13C132678}" type="datetimeFigureOut">
               <a:rPr lang="en-US" smtClean="0"/>
-              <a:t>2024-07-04</a:t>
+              <a:t>2024-07-05</a:t>
             </a:fld>
             <a:endParaRPr lang="en-US"/>
           </a:p>
@@ -995,7 +995,7 @@
           <a:p>
             <a:fld id="{78698A89-16EE-414F-A76C-14F13C132678}" type="datetimeFigureOut">
               <a:rPr lang="en-US" smtClean="0"/>
-              <a:t>2024-07-04</a:t>
+              <a:t>2024-07-05</a:t>
             </a:fld>
             <a:endParaRPr lang="en-US"/>
           </a:p>
@@ -1332,7 +1332,7 @@
           <a:p>
             <a:fld id="{78698A89-16EE-414F-A76C-14F13C132678}" type="datetimeFigureOut">
               <a:rPr lang="en-US" smtClean="0"/>
-              <a:t>2024-07-04</a:t>
+              <a:t>2024-07-05</a:t>
             </a:fld>
             <a:endParaRPr lang="en-US"/>
           </a:p>
@@ -1607,7 +1607,7 @@
           <a:p>
             <a:fld id="{78698A89-16EE-414F-A76C-14F13C132678}" type="datetimeFigureOut">
               <a:rPr lang="en-US" smtClean="0"/>
-              <a:t>2024-07-04</a:t>
+              <a:t>2024-07-05</a:t>
             </a:fld>
             <a:endParaRPr lang="en-US"/>
           </a:p>
@@ -1990,7 +1990,7 @@
           <a:p>
             <a:fld id="{78698A89-16EE-414F-A76C-14F13C132678}" type="datetimeFigureOut">
               <a:rPr lang="en-US" smtClean="0"/>
-              <a:t>2024-07-04</a:t>
+              <a:t>2024-07-05</a:t>
             </a:fld>
             <a:endParaRPr lang="en-US"/>
           </a:p>
@@ -2108,7 +2108,7 @@
           <a:p>
             <a:fld id="{78698A89-16EE-414F-A76C-14F13C132678}" type="datetimeFigureOut">
               <a:rPr lang="en-US" smtClean="0"/>
-              <a:t>2024-07-04</a:t>
+              <a:t>2024-07-05</a:t>
             </a:fld>
             <a:endParaRPr lang="en-US"/>
           </a:p>
@@ -2281,7 +2281,7 @@
           <a:p>
             <a:fld id="{78698A89-16EE-414F-A76C-14F13C132678}" type="datetimeFigureOut">
               <a:rPr lang="en-US" smtClean="0"/>
-              <a:t>2024-07-04</a:t>
+              <a:t>2024-07-05</a:t>
             </a:fld>
             <a:endParaRPr lang="en-US"/>
           </a:p>
@@ -2637,7 +2637,7 @@
           <a:p>
             <a:fld id="{78698A89-16EE-414F-A76C-14F13C132678}" type="datetimeFigureOut">
               <a:rPr lang="en-US" smtClean="0"/>
-              <a:t>2024-07-04</a:t>
+              <a:t>2024-07-05</a:t>
             </a:fld>
             <a:endParaRPr lang="en-US"/>
           </a:p>
@@ -2985,7 +2985,7 @@
           <a:p>
             <a:fld id="{78698A89-16EE-414F-A76C-14F13C132678}" type="datetimeFigureOut">
               <a:rPr lang="en-US" smtClean="0"/>
-              <a:t>2024-07-04</a:t>
+              <a:t>2024-07-05</a:t>
             </a:fld>
             <a:endParaRPr lang="en-US"/>
           </a:p>
@@ -3296,7 +3296,7 @@
           <a:p>
             <a:fld id="{78698A89-16EE-414F-A76C-14F13C132678}" type="datetimeFigureOut">
               <a:rPr lang="en-US" smtClean="0"/>
-              <a:t>2024-07-04</a:t>
+              <a:t>2024-07-05</a:t>
             </a:fld>
             <a:endParaRPr lang="en-US"/>
           </a:p>
@@ -5348,7 +5348,44 @@
           <a:bodyPr/>
           <a:lstStyle/>
           <a:p>
-            <a:endParaRPr lang="en-US" dirty="0"/>
+            <a:pPr>
+              <a:buFont typeface="Arial" panose="020B0604020202020204" pitchFamily="34" charset="0"/>
+              <a:buChar char="•"/>
+            </a:pPr>
+            <a:r>
+              <a:rPr lang="en-US" dirty="0"/>
+              <a:t> Splitting document into smaller chunks, but retaining </a:t>
+            </a:r>
+            <a:r>
+              <a:rPr lang="en-US" b="1" dirty="0">
+                <a:solidFill>
+                  <a:schemeClr val="accent3"/>
+                </a:solidFill>
+              </a:rPr>
+              <a:t>meaningful relationships</a:t>
+            </a:r>
+          </a:p>
+          <a:p>
+            <a:pPr>
+              <a:buFont typeface="Arial" panose="020B0604020202020204" pitchFamily="34" charset="0"/>
+              <a:buChar char="•"/>
+            </a:pPr>
+            <a:endParaRPr lang="en-US" b="1">
+              <a:solidFill>
+                <a:schemeClr val="accent3"/>
+              </a:solidFill>
+            </a:endParaRPr>
+          </a:p>
+          <a:p>
+            <a:pPr>
+              <a:buFont typeface="Arial" panose="020B0604020202020204" pitchFamily="34" charset="0"/>
+              <a:buChar char="•"/>
+            </a:pPr>
+            <a:endParaRPr lang="en-US" b="1" dirty="0">
+              <a:solidFill>
+                <a:schemeClr val="accent3"/>
+              </a:solidFill>
+            </a:endParaRPr>
           </a:p>
         </p:txBody>
       </p:sp>

</xml_diff>

<commit_message>
Updated slides only a few pages left
</commit_message>
<xml_diff>
--- a/Presentation/Slides/Presentation.pptx
+++ b/Presentation/Slides/Presentation.pptx
@@ -4,6 +4,9 @@
   <p:sldMasterIdLst>
     <p:sldMasterId id="2147483726" r:id="rId1"/>
   </p:sldMasterIdLst>
+  <p:notesMasterIdLst>
+    <p:notesMasterId r:id="rId24"/>
+  </p:notesMasterIdLst>
   <p:sldIdLst>
     <p:sldId id="256" r:id="rId2"/>
     <p:sldId id="257" r:id="rId3"/>
@@ -21,10 +24,12 @@
     <p:sldId id="264" r:id="rId15"/>
     <p:sldId id="275" r:id="rId16"/>
     <p:sldId id="265" r:id="rId17"/>
-    <p:sldId id="266" r:id="rId18"/>
-    <p:sldId id="267" r:id="rId19"/>
-    <p:sldId id="269" r:id="rId20"/>
-    <p:sldId id="268" r:id="rId21"/>
+    <p:sldId id="276" r:id="rId18"/>
+    <p:sldId id="266" r:id="rId19"/>
+    <p:sldId id="277" r:id="rId20"/>
+    <p:sldId id="267" r:id="rId21"/>
+    <p:sldId id="269" r:id="rId22"/>
+    <p:sldId id="268" r:id="rId23"/>
   </p:sldIdLst>
   <p:sldSz cx="12192000" cy="6858000"/>
   <p:notesSz cx="6858000" cy="9144000"/>
@@ -129,6 +134,523 @@
     </p:ext>
   </p:extLst>
 </p:presentation>
+</file>
+
+<file path=ppt/notesMasters/notesMaster1.xml><?xml version="1.0" encoding="utf-8"?>
+<p:notesMaster xmlns:a="http://schemas.openxmlformats.org/drawingml/2006/main" xmlns:r="http://schemas.openxmlformats.org/officeDocument/2006/relationships" xmlns:p="http://schemas.openxmlformats.org/presentationml/2006/main">
+  <p:cSld>
+    <p:bg>
+      <p:bgRef idx="1001">
+        <a:schemeClr val="bg1"/>
+      </p:bgRef>
+    </p:bg>
+    <p:spTree>
+      <p:nvGrpSpPr>
+        <p:cNvPr id="1" name=""/>
+        <p:cNvGrpSpPr/>
+        <p:nvPr/>
+      </p:nvGrpSpPr>
+      <p:grpSpPr>
+        <a:xfrm>
+          <a:off x="0" y="0"/>
+          <a:ext cx="0" cy="0"/>
+          <a:chOff x="0" y="0"/>
+          <a:chExt cx="0" cy="0"/>
+        </a:xfrm>
+      </p:grpSpPr>
+      <p:sp>
+        <p:nvSpPr>
+          <p:cNvPr id="2" name="Header Placeholder 1"/>
+          <p:cNvSpPr>
+            <a:spLocks noGrp="1"/>
+          </p:cNvSpPr>
+          <p:nvPr>
+            <p:ph type="hdr" sz="quarter"/>
+          </p:nvPr>
+        </p:nvSpPr>
+        <p:spPr>
+          <a:xfrm>
+            <a:off x="0" y="0"/>
+            <a:ext cx="2971800" cy="458788"/>
+          </a:xfrm>
+          <a:prstGeom prst="rect">
+            <a:avLst/>
+          </a:prstGeom>
+        </p:spPr>
+        <p:txBody>
+          <a:bodyPr vert="horz" lIns="91440" tIns="45720" rIns="91440" bIns="45720" rtlCol="0"/>
+          <a:lstStyle>
+            <a:lvl1pPr algn="l">
+              <a:defRPr sz="1200"/>
+            </a:lvl1pPr>
+          </a:lstStyle>
+          <a:p>
+            <a:endParaRPr lang="en-US"/>
+          </a:p>
+        </p:txBody>
+      </p:sp>
+      <p:sp>
+        <p:nvSpPr>
+          <p:cNvPr id="3" name="Date Placeholder 2"/>
+          <p:cNvSpPr>
+            <a:spLocks noGrp="1"/>
+          </p:cNvSpPr>
+          <p:nvPr>
+            <p:ph type="dt" idx="1"/>
+          </p:nvPr>
+        </p:nvSpPr>
+        <p:spPr>
+          <a:xfrm>
+            <a:off x="3884613" y="0"/>
+            <a:ext cx="2971800" cy="458788"/>
+          </a:xfrm>
+          <a:prstGeom prst="rect">
+            <a:avLst/>
+          </a:prstGeom>
+        </p:spPr>
+        <p:txBody>
+          <a:bodyPr vert="horz" lIns="91440" tIns="45720" rIns="91440" bIns="45720" rtlCol="0"/>
+          <a:lstStyle>
+            <a:lvl1pPr algn="r">
+              <a:defRPr sz="1200"/>
+            </a:lvl1pPr>
+          </a:lstStyle>
+          <a:p>
+            <a:fld id="{6C69A80F-60D7-41D0-BB24-CA645B816DD2}" type="datetimeFigureOut">
+              <a:rPr lang="en-US" smtClean="0"/>
+              <a:t>2024-07-05</a:t>
+            </a:fld>
+            <a:endParaRPr lang="en-US"/>
+          </a:p>
+        </p:txBody>
+      </p:sp>
+      <p:sp>
+        <p:nvSpPr>
+          <p:cNvPr id="4" name="Slide Image Placeholder 3"/>
+          <p:cNvSpPr>
+            <a:spLocks noGrp="1" noRot="1" noChangeAspect="1"/>
+          </p:cNvSpPr>
+          <p:nvPr>
+            <p:ph type="sldImg" idx="2"/>
+          </p:nvPr>
+        </p:nvSpPr>
+        <p:spPr>
+          <a:xfrm>
+            <a:off x="685800" y="1143000"/>
+            <a:ext cx="5486400" cy="3086100"/>
+          </a:xfrm>
+          <a:prstGeom prst="rect">
+            <a:avLst/>
+          </a:prstGeom>
+          <a:noFill/>
+          <a:ln w="12700">
+            <a:solidFill>
+              <a:prstClr val="black"/>
+            </a:solidFill>
+          </a:ln>
+        </p:spPr>
+        <p:txBody>
+          <a:bodyPr vert="horz" lIns="91440" tIns="45720" rIns="91440" bIns="45720" rtlCol="0" anchor="ctr"/>
+          <a:lstStyle/>
+          <a:p>
+            <a:endParaRPr lang="en-US"/>
+          </a:p>
+        </p:txBody>
+      </p:sp>
+      <p:sp>
+        <p:nvSpPr>
+          <p:cNvPr id="5" name="Notes Placeholder 4"/>
+          <p:cNvSpPr>
+            <a:spLocks noGrp="1"/>
+          </p:cNvSpPr>
+          <p:nvPr>
+            <p:ph type="body" sz="quarter" idx="3"/>
+          </p:nvPr>
+        </p:nvSpPr>
+        <p:spPr>
+          <a:xfrm>
+            <a:off x="685800" y="4400550"/>
+            <a:ext cx="5486400" cy="3600450"/>
+          </a:xfrm>
+          <a:prstGeom prst="rect">
+            <a:avLst/>
+          </a:prstGeom>
+        </p:spPr>
+        <p:txBody>
+          <a:bodyPr vert="horz" lIns="91440" tIns="45720" rIns="91440" bIns="45720" rtlCol="0"/>
+          <a:lstStyle/>
+          <a:p>
+            <a:pPr lvl="0"/>
+            <a:r>
+              <a:rPr lang="en-US"/>
+              <a:t>Click to edit Master text styles</a:t>
+            </a:r>
+          </a:p>
+          <a:p>
+            <a:pPr lvl="1"/>
+            <a:r>
+              <a:rPr lang="en-US"/>
+              <a:t>Second level</a:t>
+            </a:r>
+          </a:p>
+          <a:p>
+            <a:pPr lvl="2"/>
+            <a:r>
+              <a:rPr lang="en-US"/>
+              <a:t>Third level</a:t>
+            </a:r>
+          </a:p>
+          <a:p>
+            <a:pPr lvl="3"/>
+            <a:r>
+              <a:rPr lang="en-US"/>
+              <a:t>Fourth level</a:t>
+            </a:r>
+          </a:p>
+          <a:p>
+            <a:pPr lvl="4"/>
+            <a:r>
+              <a:rPr lang="en-US"/>
+              <a:t>Fifth level</a:t>
+            </a:r>
+          </a:p>
+        </p:txBody>
+      </p:sp>
+      <p:sp>
+        <p:nvSpPr>
+          <p:cNvPr id="6" name="Footer Placeholder 5"/>
+          <p:cNvSpPr>
+            <a:spLocks noGrp="1"/>
+          </p:cNvSpPr>
+          <p:nvPr>
+            <p:ph type="ftr" sz="quarter" idx="4"/>
+          </p:nvPr>
+        </p:nvSpPr>
+        <p:spPr>
+          <a:xfrm>
+            <a:off x="0" y="8685213"/>
+            <a:ext cx="2971800" cy="458787"/>
+          </a:xfrm>
+          <a:prstGeom prst="rect">
+            <a:avLst/>
+          </a:prstGeom>
+        </p:spPr>
+        <p:txBody>
+          <a:bodyPr vert="horz" lIns="91440" tIns="45720" rIns="91440" bIns="45720" rtlCol="0" anchor="b"/>
+          <a:lstStyle>
+            <a:lvl1pPr algn="l">
+              <a:defRPr sz="1200"/>
+            </a:lvl1pPr>
+          </a:lstStyle>
+          <a:p>
+            <a:endParaRPr lang="en-US"/>
+          </a:p>
+        </p:txBody>
+      </p:sp>
+      <p:sp>
+        <p:nvSpPr>
+          <p:cNvPr id="7" name="Slide Number Placeholder 6"/>
+          <p:cNvSpPr>
+            <a:spLocks noGrp="1"/>
+          </p:cNvSpPr>
+          <p:nvPr>
+            <p:ph type="sldNum" sz="quarter" idx="5"/>
+          </p:nvPr>
+        </p:nvSpPr>
+        <p:spPr>
+          <a:xfrm>
+            <a:off x="3884613" y="8685213"/>
+            <a:ext cx="2971800" cy="458787"/>
+          </a:xfrm>
+          <a:prstGeom prst="rect">
+            <a:avLst/>
+          </a:prstGeom>
+        </p:spPr>
+        <p:txBody>
+          <a:bodyPr vert="horz" lIns="91440" tIns="45720" rIns="91440" bIns="45720" rtlCol="0" anchor="b"/>
+          <a:lstStyle>
+            <a:lvl1pPr algn="r">
+              <a:defRPr sz="1200"/>
+            </a:lvl1pPr>
+          </a:lstStyle>
+          <a:p>
+            <a:fld id="{63BCEE46-9938-4DF8-86E2-FD3EC901F7AF}" type="slidenum">
+              <a:rPr lang="en-US" smtClean="0"/>
+              <a:t>‹#›</a:t>
+            </a:fld>
+            <a:endParaRPr lang="en-US"/>
+          </a:p>
+        </p:txBody>
+      </p:sp>
+    </p:spTree>
+    <p:extLst>
+      <p:ext uri="{BB962C8B-B14F-4D97-AF65-F5344CB8AC3E}">
+        <p14:creationId xmlns:p14="http://schemas.microsoft.com/office/powerpoint/2010/main" val="3762444239"/>
+      </p:ext>
+    </p:extLst>
+  </p:cSld>
+  <p:clrMap bg1="lt1" tx1="dk1" bg2="lt2" tx2="dk2" accent1="accent1" accent2="accent2" accent3="accent3" accent4="accent4" accent5="accent5" accent6="accent6" hlink="hlink" folHlink="folHlink"/>
+  <p:notesStyle>
+    <a:lvl1pPr marL="0" algn="l" defTabSz="914400" rtl="0" eaLnBrk="1" latinLnBrk="0" hangingPunct="1">
+      <a:defRPr sz="1200" kern="1200">
+        <a:solidFill>
+          <a:schemeClr val="tx1"/>
+        </a:solidFill>
+        <a:latin typeface="+mn-lt"/>
+        <a:ea typeface="+mn-ea"/>
+        <a:cs typeface="+mn-cs"/>
+      </a:defRPr>
+    </a:lvl1pPr>
+    <a:lvl2pPr marL="457200" algn="l" defTabSz="914400" rtl="0" eaLnBrk="1" latinLnBrk="0" hangingPunct="1">
+      <a:defRPr sz="1200" kern="1200">
+        <a:solidFill>
+          <a:schemeClr val="tx1"/>
+        </a:solidFill>
+        <a:latin typeface="+mn-lt"/>
+        <a:ea typeface="+mn-ea"/>
+        <a:cs typeface="+mn-cs"/>
+      </a:defRPr>
+    </a:lvl2pPr>
+    <a:lvl3pPr marL="914400" algn="l" defTabSz="914400" rtl="0" eaLnBrk="1" latinLnBrk="0" hangingPunct="1">
+      <a:defRPr sz="1200" kern="1200">
+        <a:solidFill>
+          <a:schemeClr val="tx1"/>
+        </a:solidFill>
+        <a:latin typeface="+mn-lt"/>
+        <a:ea typeface="+mn-ea"/>
+        <a:cs typeface="+mn-cs"/>
+      </a:defRPr>
+    </a:lvl3pPr>
+    <a:lvl4pPr marL="1371600" algn="l" defTabSz="914400" rtl="0" eaLnBrk="1" latinLnBrk="0" hangingPunct="1">
+      <a:defRPr sz="1200" kern="1200">
+        <a:solidFill>
+          <a:schemeClr val="tx1"/>
+        </a:solidFill>
+        <a:latin typeface="+mn-lt"/>
+        <a:ea typeface="+mn-ea"/>
+        <a:cs typeface="+mn-cs"/>
+      </a:defRPr>
+    </a:lvl4pPr>
+    <a:lvl5pPr marL="1828800" algn="l" defTabSz="914400" rtl="0" eaLnBrk="1" latinLnBrk="0" hangingPunct="1">
+      <a:defRPr sz="1200" kern="1200">
+        <a:solidFill>
+          <a:schemeClr val="tx1"/>
+        </a:solidFill>
+        <a:latin typeface="+mn-lt"/>
+        <a:ea typeface="+mn-ea"/>
+        <a:cs typeface="+mn-cs"/>
+      </a:defRPr>
+    </a:lvl5pPr>
+    <a:lvl6pPr marL="2286000" algn="l" defTabSz="914400" rtl="0" eaLnBrk="1" latinLnBrk="0" hangingPunct="1">
+      <a:defRPr sz="1200" kern="1200">
+        <a:solidFill>
+          <a:schemeClr val="tx1"/>
+        </a:solidFill>
+        <a:latin typeface="+mn-lt"/>
+        <a:ea typeface="+mn-ea"/>
+        <a:cs typeface="+mn-cs"/>
+      </a:defRPr>
+    </a:lvl6pPr>
+    <a:lvl7pPr marL="2743200" algn="l" defTabSz="914400" rtl="0" eaLnBrk="1" latinLnBrk="0" hangingPunct="1">
+      <a:defRPr sz="1200" kern="1200">
+        <a:solidFill>
+          <a:schemeClr val="tx1"/>
+        </a:solidFill>
+        <a:latin typeface="+mn-lt"/>
+        <a:ea typeface="+mn-ea"/>
+        <a:cs typeface="+mn-cs"/>
+      </a:defRPr>
+    </a:lvl7pPr>
+    <a:lvl8pPr marL="3200400" algn="l" defTabSz="914400" rtl="0" eaLnBrk="1" latinLnBrk="0" hangingPunct="1">
+      <a:defRPr sz="1200" kern="1200">
+        <a:solidFill>
+          <a:schemeClr val="tx1"/>
+        </a:solidFill>
+        <a:latin typeface="+mn-lt"/>
+        <a:ea typeface="+mn-ea"/>
+        <a:cs typeface="+mn-cs"/>
+      </a:defRPr>
+    </a:lvl8pPr>
+    <a:lvl9pPr marL="3657600" algn="l" defTabSz="914400" rtl="0" eaLnBrk="1" latinLnBrk="0" hangingPunct="1">
+      <a:defRPr sz="1200" kern="1200">
+        <a:solidFill>
+          <a:schemeClr val="tx1"/>
+        </a:solidFill>
+        <a:latin typeface="+mn-lt"/>
+        <a:ea typeface="+mn-ea"/>
+        <a:cs typeface="+mn-cs"/>
+      </a:defRPr>
+    </a:lvl9pPr>
+  </p:notesStyle>
+</p:notesMaster>
+</file>
+
+<file path=ppt/notesSlides/notesSlide1.xml><?xml version="1.0" encoding="utf-8"?>
+<p:notes xmlns:a="http://schemas.openxmlformats.org/drawingml/2006/main" xmlns:r="http://schemas.openxmlformats.org/officeDocument/2006/relationships" xmlns:p="http://schemas.openxmlformats.org/presentationml/2006/main">
+  <p:cSld>
+    <p:spTree>
+      <p:nvGrpSpPr>
+        <p:cNvPr id="1" name=""/>
+        <p:cNvGrpSpPr/>
+        <p:nvPr/>
+      </p:nvGrpSpPr>
+      <p:grpSpPr>
+        <a:xfrm>
+          <a:off x="0" y="0"/>
+          <a:ext cx="0" cy="0"/>
+          <a:chOff x="0" y="0"/>
+          <a:chExt cx="0" cy="0"/>
+        </a:xfrm>
+      </p:grpSpPr>
+      <p:sp>
+        <p:nvSpPr>
+          <p:cNvPr id="2" name="Slide Image Placeholder 1"/>
+          <p:cNvSpPr>
+            <a:spLocks noGrp="1" noRot="1" noChangeAspect="1"/>
+          </p:cNvSpPr>
+          <p:nvPr>
+            <p:ph type="sldImg"/>
+          </p:nvPr>
+        </p:nvSpPr>
+        <p:spPr/>
+      </p:sp>
+      <p:sp>
+        <p:nvSpPr>
+          <p:cNvPr id="3" name="Notes Placeholder 2"/>
+          <p:cNvSpPr>
+            <a:spLocks noGrp="1"/>
+          </p:cNvSpPr>
+          <p:nvPr>
+            <p:ph type="body" idx="1"/>
+          </p:nvPr>
+        </p:nvSpPr>
+        <p:spPr/>
+        <p:txBody>
+          <a:bodyPr/>
+          <a:lstStyle/>
+          <a:p>
+            <a:endParaRPr lang="en-US" dirty="0"/>
+          </a:p>
+        </p:txBody>
+      </p:sp>
+      <p:sp>
+        <p:nvSpPr>
+          <p:cNvPr id="4" name="Slide Number Placeholder 3"/>
+          <p:cNvSpPr>
+            <a:spLocks noGrp="1"/>
+          </p:cNvSpPr>
+          <p:nvPr>
+            <p:ph type="sldNum" sz="quarter" idx="5"/>
+          </p:nvPr>
+        </p:nvSpPr>
+        <p:spPr/>
+        <p:txBody>
+          <a:bodyPr/>
+          <a:lstStyle/>
+          <a:p>
+            <a:fld id="{63BCEE46-9938-4DF8-86E2-FD3EC901F7AF}" type="slidenum">
+              <a:rPr lang="en-US" smtClean="0"/>
+              <a:t>16</a:t>
+            </a:fld>
+            <a:endParaRPr lang="en-US"/>
+          </a:p>
+        </p:txBody>
+      </p:sp>
+    </p:spTree>
+    <p:extLst>
+      <p:ext uri="{BB962C8B-B14F-4D97-AF65-F5344CB8AC3E}">
+        <p14:creationId xmlns:p14="http://schemas.microsoft.com/office/powerpoint/2010/main" val="426753702"/>
+      </p:ext>
+    </p:extLst>
+  </p:cSld>
+  <p:clrMapOvr>
+    <a:masterClrMapping/>
+  </p:clrMapOvr>
+</p:notes>
+</file>
+
+<file path=ppt/notesSlides/notesSlide2.xml><?xml version="1.0" encoding="utf-8"?>
+<p:notes xmlns:a="http://schemas.openxmlformats.org/drawingml/2006/main" xmlns:r="http://schemas.openxmlformats.org/officeDocument/2006/relationships" xmlns:p="http://schemas.openxmlformats.org/presentationml/2006/main">
+  <p:cSld>
+    <p:spTree>
+      <p:nvGrpSpPr>
+        <p:cNvPr id="1" name=""/>
+        <p:cNvGrpSpPr/>
+        <p:nvPr/>
+      </p:nvGrpSpPr>
+      <p:grpSpPr>
+        <a:xfrm>
+          <a:off x="0" y="0"/>
+          <a:ext cx="0" cy="0"/>
+          <a:chOff x="0" y="0"/>
+          <a:chExt cx="0" cy="0"/>
+        </a:xfrm>
+      </p:grpSpPr>
+      <p:sp>
+        <p:nvSpPr>
+          <p:cNvPr id="2" name="Slide Image Placeholder 1"/>
+          <p:cNvSpPr>
+            <a:spLocks noGrp="1" noRot="1" noChangeAspect="1"/>
+          </p:cNvSpPr>
+          <p:nvPr>
+            <p:ph type="sldImg"/>
+          </p:nvPr>
+        </p:nvSpPr>
+        <p:spPr/>
+      </p:sp>
+      <p:sp>
+        <p:nvSpPr>
+          <p:cNvPr id="3" name="Notes Placeholder 2"/>
+          <p:cNvSpPr>
+            <a:spLocks noGrp="1"/>
+          </p:cNvSpPr>
+          <p:nvPr>
+            <p:ph type="body" idx="1"/>
+          </p:nvPr>
+        </p:nvSpPr>
+        <p:spPr/>
+        <p:txBody>
+          <a:bodyPr/>
+          <a:lstStyle/>
+          <a:p>
+            <a:endParaRPr lang="en-US" dirty="0"/>
+          </a:p>
+        </p:txBody>
+      </p:sp>
+      <p:sp>
+        <p:nvSpPr>
+          <p:cNvPr id="4" name="Slide Number Placeholder 3"/>
+          <p:cNvSpPr>
+            <a:spLocks noGrp="1"/>
+          </p:cNvSpPr>
+          <p:nvPr>
+            <p:ph type="sldNum" sz="quarter" idx="5"/>
+          </p:nvPr>
+        </p:nvSpPr>
+        <p:spPr/>
+        <p:txBody>
+          <a:bodyPr/>
+          <a:lstStyle/>
+          <a:p>
+            <a:fld id="{63BCEE46-9938-4DF8-86E2-FD3EC901F7AF}" type="slidenum">
+              <a:rPr lang="en-US" smtClean="0"/>
+              <a:t>17</a:t>
+            </a:fld>
+            <a:endParaRPr lang="en-US"/>
+          </a:p>
+        </p:txBody>
+      </p:sp>
+    </p:spTree>
+    <p:extLst>
+      <p:ext uri="{BB962C8B-B14F-4D97-AF65-F5344CB8AC3E}">
+        <p14:creationId xmlns:p14="http://schemas.microsoft.com/office/powerpoint/2010/main" val="2067630104"/>
+      </p:ext>
+    </p:extLst>
+  </p:cSld>
+  <p:clrMapOvr>
+    <a:masterClrMapping/>
+  </p:clrMapOvr>
+</p:notes>
 </file>
 
 <file path=ppt/slideLayouts/slideLayout1.xml><?xml version="1.0" encoding="utf-8"?>
@@ -5370,7 +5892,29 @@
               <a:buFont typeface="Arial" panose="020B0604020202020204" pitchFamily="34" charset="0"/>
               <a:buChar char="•"/>
             </a:pPr>
-            <a:endParaRPr lang="en-US" b="1">
+            <a:endParaRPr lang="en-US" b="1" dirty="0">
+              <a:solidFill>
+                <a:schemeClr val="accent3"/>
+              </a:solidFill>
+            </a:endParaRPr>
+          </a:p>
+          <a:p>
+            <a:pPr>
+              <a:buFont typeface="Arial" panose="020B0604020202020204" pitchFamily="34" charset="0"/>
+              <a:buChar char="•"/>
+            </a:pPr>
+            <a:endParaRPr lang="en-US" b="1" dirty="0">
+              <a:solidFill>
+                <a:schemeClr val="accent3"/>
+              </a:solidFill>
+            </a:endParaRPr>
+          </a:p>
+          <a:p>
+            <a:pPr>
+              <a:buFont typeface="Arial" panose="020B0604020202020204" pitchFamily="34" charset="0"/>
+              <a:buChar char="•"/>
+            </a:pPr>
+            <a:endParaRPr lang="en-US" b="1" dirty="0">
               <a:solidFill>
                 <a:schemeClr val="accent3"/>
               </a:solidFill>
@@ -5425,6 +5969,36 @@
           </a:p>
         </p:txBody>
       </p:sp>
+      <p:pic>
+        <p:nvPicPr>
+          <p:cNvPr id="8" name="Picture 7">
+            <a:extLst>
+              <a:ext uri="{FF2B5EF4-FFF2-40B4-BE49-F238E27FC236}">
+                <a16:creationId xmlns:a16="http://schemas.microsoft.com/office/drawing/2014/main" id="{C988E6E1-4F10-485C-BF98-76094AB13C50}"/>
+              </a:ext>
+            </a:extLst>
+          </p:cNvPr>
+          <p:cNvPicPr>
+            <a:picLocks noChangeAspect="1"/>
+          </p:cNvPicPr>
+          <p:nvPr/>
+        </p:nvPicPr>
+        <p:blipFill>
+          <a:blip r:embed="rId3"/>
+          <a:stretch>
+            <a:fillRect/>
+          </a:stretch>
+        </p:blipFill>
+        <p:spPr>
+          <a:xfrm>
+            <a:off x="2988445" y="2276807"/>
+            <a:ext cx="6215110" cy="4066320"/>
+          </a:xfrm>
+          <a:prstGeom prst="rect">
+            <a:avLst/>
+          </a:prstGeom>
+        </p:spPr>
+      </p:pic>
     </p:spTree>
     <p:extLst>
       <p:ext uri="{BB962C8B-B14F-4D97-AF65-F5344CB8AC3E}">
@@ -5478,7 +6052,11 @@
           <a:p>
             <a:r>
               <a:rPr lang="fr-FR" b="1" dirty="0"/>
-              <a:t>RAG: Storage</a:t>
+              <a:t>RAG: Document </a:t>
+            </a:r>
+            <a:r>
+              <a:rPr lang="fr-FR" b="1" dirty="0" err="1"/>
+              <a:t>Splitting</a:t>
             </a:r>
             <a:endParaRPr lang="en-US" b="1" dirty="0"/>
           </a:p>
@@ -5502,10 +6080,358 @@
         </p:nvSpPr>
         <p:spPr/>
         <p:txBody>
-          <a:bodyPr/>
-          <a:lstStyle/>
-          <a:p>
-            <a:endParaRPr lang="en-US" dirty="0"/>
+          <a:bodyPr>
+            <a:normAutofit fontScale="85000" lnSpcReduction="20000"/>
+          </a:bodyPr>
+          <a:lstStyle/>
+          <a:p>
+            <a:pPr>
+              <a:buFont typeface="Arial" panose="020B0604020202020204" pitchFamily="34" charset="0"/>
+              <a:buChar char="•"/>
+            </a:pPr>
+            <a:r>
+              <a:rPr lang="en-US" b="1" dirty="0"/>
+              <a:t> Types of text splitters in LangChain:</a:t>
+            </a:r>
+          </a:p>
+          <a:p>
+            <a:pPr marL="0" indent="0">
+              <a:buNone/>
+            </a:pPr>
+            <a:endParaRPr lang="en-US" sz="400" dirty="0"/>
+          </a:p>
+          <a:p>
+            <a:pPr lvl="1">
+              <a:buFont typeface="Arial" panose="020B0604020202020204" pitchFamily="34" charset="0"/>
+              <a:buChar char="•"/>
+            </a:pPr>
+            <a:r>
+              <a:rPr lang="en-US" b="1" dirty="0" err="1">
+                <a:solidFill>
+                  <a:schemeClr val="accent3"/>
+                </a:solidFill>
+              </a:rPr>
+              <a:t>CharacterTextSplitter</a:t>
+            </a:r>
+            <a:r>
+              <a:rPr lang="en-US" b="1" dirty="0">
+                <a:solidFill>
+                  <a:schemeClr val="accent3"/>
+                </a:solidFill>
+              </a:rPr>
+              <a:t>()</a:t>
+            </a:r>
+          </a:p>
+          <a:p>
+            <a:pPr lvl="1">
+              <a:buFont typeface="Arial" panose="020B0604020202020204" pitchFamily="34" charset="0"/>
+              <a:buChar char="•"/>
+            </a:pPr>
+            <a:r>
+              <a:rPr lang="en-US" b="1" dirty="0" err="1">
+                <a:solidFill>
+                  <a:schemeClr val="accent3"/>
+                </a:solidFill>
+              </a:rPr>
+              <a:t>MarkdownHeaderTextSplitter</a:t>
+            </a:r>
+            <a:r>
+              <a:rPr lang="en-US" b="1" dirty="0">
+                <a:solidFill>
+                  <a:schemeClr val="accent3"/>
+                </a:solidFill>
+              </a:rPr>
+              <a:t>()</a:t>
+            </a:r>
+          </a:p>
+          <a:p>
+            <a:pPr lvl="2">
+              <a:buFont typeface="Arial" panose="020B0604020202020204" pitchFamily="34" charset="0"/>
+              <a:buChar char="•"/>
+            </a:pPr>
+            <a:r>
+              <a:rPr lang="en-US" sz="1600" dirty="0">
+                <a:solidFill>
+                  <a:schemeClr val="tx1"/>
+                </a:solidFill>
+              </a:rPr>
+              <a:t>Context Aware Splitter</a:t>
+            </a:r>
+          </a:p>
+          <a:p>
+            <a:pPr lvl="2">
+              <a:buFont typeface="Arial" panose="020B0604020202020204" pitchFamily="34" charset="0"/>
+              <a:buChar char="•"/>
+            </a:pPr>
+            <a:endParaRPr lang="en-US" b="1" dirty="0">
+              <a:solidFill>
+                <a:schemeClr val="tx1"/>
+              </a:solidFill>
+            </a:endParaRPr>
+          </a:p>
+          <a:p>
+            <a:pPr lvl="1">
+              <a:buFont typeface="Arial" panose="020B0604020202020204" pitchFamily="34" charset="0"/>
+              <a:buChar char="•"/>
+            </a:pPr>
+            <a:r>
+              <a:rPr lang="en-US" b="1" dirty="0" err="1">
+                <a:solidFill>
+                  <a:schemeClr val="accent3"/>
+                </a:solidFill>
+              </a:rPr>
+              <a:t>TokenTextSplitter</a:t>
+            </a:r>
+            <a:r>
+              <a:rPr lang="en-US" b="1" dirty="0">
+                <a:solidFill>
+                  <a:schemeClr val="accent3"/>
+                </a:solidFill>
+              </a:rPr>
+              <a:t>()</a:t>
+            </a:r>
+          </a:p>
+          <a:p>
+            <a:pPr lvl="2">
+              <a:buFont typeface="Arial" panose="020B0604020202020204" pitchFamily="34" charset="0"/>
+              <a:buChar char="•"/>
+            </a:pPr>
+            <a:r>
+              <a:rPr lang="en-US" sz="1600" b="0" i="0" dirty="0">
+                <a:solidFill>
+                  <a:schemeClr val="tx1"/>
+                </a:solidFill>
+                <a:effectLst/>
+              </a:rPr>
+              <a:t>Tokens are often ~4 characters</a:t>
+            </a:r>
+            <a:endParaRPr lang="en-US" sz="1600" b="1" i="0" dirty="0">
+              <a:solidFill>
+                <a:schemeClr val="tx1"/>
+              </a:solidFill>
+              <a:effectLst/>
+            </a:endParaRPr>
+          </a:p>
+          <a:p>
+            <a:pPr lvl="2">
+              <a:buFont typeface="Arial" panose="020B0604020202020204" pitchFamily="34" charset="0"/>
+              <a:buChar char="•"/>
+            </a:pPr>
+            <a:r>
+              <a:rPr lang="en-US" sz="1600" dirty="0">
+                <a:solidFill>
+                  <a:schemeClr val="tx1"/>
+                </a:solidFill>
+              </a:rPr>
+              <a:t>U</a:t>
+            </a:r>
+            <a:r>
+              <a:rPr lang="en-US" sz="1600" b="0" i="0" dirty="0">
+                <a:solidFill>
+                  <a:schemeClr val="tx1"/>
+                </a:solidFill>
+                <a:effectLst/>
+              </a:rPr>
+              <a:t>seful because LLMs often have context windows designated in tokens</a:t>
+            </a:r>
+          </a:p>
+          <a:p>
+            <a:pPr marL="384048" lvl="2" indent="0">
+              <a:buNone/>
+            </a:pPr>
+            <a:endParaRPr lang="en-US" b="1" dirty="0">
+              <a:solidFill>
+                <a:schemeClr val="tx1"/>
+              </a:solidFill>
+            </a:endParaRPr>
+          </a:p>
+          <a:p>
+            <a:pPr lvl="1">
+              <a:buFont typeface="Arial" panose="020B0604020202020204" pitchFamily="34" charset="0"/>
+              <a:buChar char="•"/>
+            </a:pPr>
+            <a:r>
+              <a:rPr lang="en-US" b="1" dirty="0" err="1">
+                <a:solidFill>
+                  <a:schemeClr val="accent3"/>
+                </a:solidFill>
+              </a:rPr>
+              <a:t>SentencesTransformersTokenTextSplitter</a:t>
+            </a:r>
+            <a:r>
+              <a:rPr lang="en-US" b="1" dirty="0">
+                <a:solidFill>
+                  <a:schemeClr val="accent3"/>
+                </a:solidFill>
+              </a:rPr>
+              <a:t>()</a:t>
+            </a:r>
+          </a:p>
+          <a:p>
+            <a:pPr lvl="1">
+              <a:buFont typeface="Arial" panose="020B0604020202020204" pitchFamily="34" charset="0"/>
+              <a:buChar char="•"/>
+            </a:pPr>
+            <a:r>
+              <a:rPr lang="en-US" b="1" dirty="0" err="1">
+                <a:solidFill>
+                  <a:schemeClr val="accent3"/>
+                </a:solidFill>
+              </a:rPr>
+              <a:t>RecursiveCharacterTextSplitter</a:t>
+            </a:r>
+            <a:r>
+              <a:rPr lang="en-US" b="1" dirty="0">
+                <a:solidFill>
+                  <a:schemeClr val="accent3"/>
+                </a:solidFill>
+              </a:rPr>
+              <a:t>()</a:t>
+            </a:r>
+          </a:p>
+          <a:p>
+            <a:pPr lvl="2">
+              <a:buFont typeface="Arial" panose="020B0604020202020204" pitchFamily="34" charset="0"/>
+              <a:buChar char="•"/>
+            </a:pPr>
+            <a:r>
+              <a:rPr lang="en-US" sz="1600" b="1" dirty="0">
+                <a:solidFill>
+                  <a:schemeClr val="tx1"/>
+                </a:solidFill>
+              </a:rPr>
+              <a:t> </a:t>
+            </a:r>
+            <a:r>
+              <a:rPr lang="en-US" sz="1600" dirty="0">
+                <a:solidFill>
+                  <a:schemeClr val="tx1"/>
+                </a:solidFill>
+              </a:rPr>
+              <a:t>R</a:t>
+            </a:r>
+            <a:r>
+              <a:rPr lang="en-US" sz="1600" b="0" i="0" dirty="0">
+                <a:solidFill>
+                  <a:schemeClr val="tx1"/>
+                </a:solidFill>
+                <a:effectLst/>
+              </a:rPr>
+              <a:t>ecommended for generic text</a:t>
+            </a:r>
+          </a:p>
+          <a:p>
+            <a:pPr lvl="2">
+              <a:buFont typeface="Arial" panose="020B0604020202020204" pitchFamily="34" charset="0"/>
+              <a:buChar char="•"/>
+            </a:pPr>
+            <a:endParaRPr lang="en-US" b="1" dirty="0">
+              <a:solidFill>
+                <a:schemeClr val="tx1"/>
+              </a:solidFill>
+            </a:endParaRPr>
+          </a:p>
+          <a:p>
+            <a:pPr lvl="1">
+              <a:buFont typeface="Arial" panose="020B0604020202020204" pitchFamily="34" charset="0"/>
+              <a:buChar char="•"/>
+            </a:pPr>
+            <a:r>
+              <a:rPr lang="en-US" b="1" dirty="0">
+                <a:solidFill>
+                  <a:schemeClr val="accent3"/>
+                </a:solidFill>
+              </a:rPr>
+              <a:t>Language()</a:t>
+            </a:r>
+          </a:p>
+          <a:p>
+            <a:pPr lvl="1">
+              <a:buFont typeface="Arial" panose="020B0604020202020204" pitchFamily="34" charset="0"/>
+              <a:buChar char="•"/>
+            </a:pPr>
+            <a:r>
+              <a:rPr lang="en-US" b="1" dirty="0" err="1">
+                <a:solidFill>
+                  <a:schemeClr val="accent3"/>
+                </a:solidFill>
+              </a:rPr>
+              <a:t>NLTKTextSplitter</a:t>
+            </a:r>
+            <a:r>
+              <a:rPr lang="en-US" b="1" dirty="0">
+                <a:solidFill>
+                  <a:schemeClr val="accent3"/>
+                </a:solidFill>
+              </a:rPr>
+              <a:t>()</a:t>
+            </a:r>
+          </a:p>
+          <a:p>
+            <a:pPr lvl="1">
+              <a:buFont typeface="Arial" panose="020B0604020202020204" pitchFamily="34" charset="0"/>
+              <a:buChar char="•"/>
+            </a:pPr>
+            <a:r>
+              <a:rPr lang="en-US" b="1" dirty="0" err="1">
+                <a:solidFill>
+                  <a:schemeClr val="accent3"/>
+                </a:solidFill>
+              </a:rPr>
+              <a:t>SpacyTextSplitter</a:t>
+            </a:r>
+            <a:r>
+              <a:rPr lang="en-US" b="1" dirty="0">
+                <a:solidFill>
+                  <a:schemeClr val="accent3"/>
+                </a:solidFill>
+              </a:rPr>
+              <a:t>()</a:t>
+            </a:r>
+          </a:p>
+          <a:p>
+            <a:pPr>
+              <a:buFont typeface="Arial" panose="020B0604020202020204" pitchFamily="34" charset="0"/>
+              <a:buChar char="•"/>
+            </a:pPr>
+            <a:endParaRPr lang="en-US" b="1" dirty="0">
+              <a:solidFill>
+                <a:schemeClr val="accent3"/>
+              </a:solidFill>
+            </a:endParaRPr>
+          </a:p>
+          <a:p>
+            <a:pPr>
+              <a:buFont typeface="Arial" panose="020B0604020202020204" pitchFamily="34" charset="0"/>
+              <a:buChar char="•"/>
+            </a:pPr>
+            <a:endParaRPr lang="en-US" b="1" dirty="0">
+              <a:solidFill>
+                <a:schemeClr val="accent3"/>
+              </a:solidFill>
+            </a:endParaRPr>
+          </a:p>
+          <a:p>
+            <a:pPr>
+              <a:buFont typeface="Arial" panose="020B0604020202020204" pitchFamily="34" charset="0"/>
+              <a:buChar char="•"/>
+            </a:pPr>
+            <a:endParaRPr lang="en-US" b="1" dirty="0">
+              <a:solidFill>
+                <a:schemeClr val="accent3"/>
+              </a:solidFill>
+            </a:endParaRPr>
+          </a:p>
+          <a:p>
+            <a:pPr>
+              <a:buFont typeface="Arial" panose="020B0604020202020204" pitchFamily="34" charset="0"/>
+              <a:buChar char="•"/>
+            </a:pPr>
+            <a:endParaRPr lang="en-US" b="1" dirty="0">
+              <a:solidFill>
+                <a:schemeClr val="accent3"/>
+              </a:solidFill>
+            </a:endParaRPr>
           </a:p>
         </p:txBody>
       </p:sp>
@@ -5540,7 +6466,7 @@
             <a:pPr algn="ctr"/>
             <a:r>
               <a:rPr lang="en-US" dirty="0"/>
-              <a:t>10 of n</a:t>
+              <a:t>9 of n</a:t>
             </a:r>
           </a:p>
         </p:txBody>
@@ -5548,7 +6474,7 @@
     </p:spTree>
     <p:extLst>
       <p:ext uri="{BB962C8B-B14F-4D97-AF65-F5344CB8AC3E}">
-        <p14:creationId xmlns:p14="http://schemas.microsoft.com/office/powerpoint/2010/main" val="1364780128"/>
+        <p14:creationId xmlns:p14="http://schemas.microsoft.com/office/powerpoint/2010/main" val="356789611"/>
       </p:ext>
     </p:extLst>
   </p:cSld>
@@ -5598,11 +6524,7 @@
           <a:p>
             <a:r>
               <a:rPr lang="fr-FR" b="1" dirty="0"/>
-              <a:t>RAG: </a:t>
-            </a:r>
-            <a:r>
-              <a:rPr lang="fr-FR" b="1" dirty="0" err="1"/>
-              <a:t>Retrieval</a:t>
+              <a:t>RAG: Storage</a:t>
             </a:r>
             <a:endParaRPr lang="en-US" b="1" dirty="0"/>
           </a:p>
@@ -5626,10 +6548,46 @@
         </p:nvSpPr>
         <p:spPr/>
         <p:txBody>
-          <a:bodyPr/>
-          <a:lstStyle/>
-          <a:p>
-            <a:endParaRPr lang="en-US" dirty="0"/>
+          <a:bodyPr>
+            <a:normAutofit/>
+          </a:bodyPr>
+          <a:lstStyle/>
+          <a:p>
+            <a:pPr>
+              <a:buFont typeface="Arial" panose="020B0604020202020204" pitchFamily="34" charset="0"/>
+              <a:buChar char="•"/>
+            </a:pPr>
+            <a:r>
+              <a:rPr lang="en-US" sz="2800" dirty="0"/>
+              <a:t> Embeddings</a:t>
+            </a:r>
+          </a:p>
+          <a:p>
+            <a:pPr lvl="1">
+              <a:buFont typeface="Arial" panose="020B0604020202020204" pitchFamily="34" charset="0"/>
+              <a:buChar char="•"/>
+            </a:pPr>
+            <a:r>
+              <a:rPr lang="en-US" sz="2000" dirty="0"/>
+              <a:t>Embedding vector captures context/meaning</a:t>
+            </a:r>
+          </a:p>
+          <a:p>
+            <a:pPr lvl="1">
+              <a:buFont typeface="Arial" panose="020B0604020202020204" pitchFamily="34" charset="0"/>
+              <a:buChar char="•"/>
+            </a:pPr>
+            <a:r>
+              <a:rPr lang="en-US" sz="2000" dirty="0"/>
+              <a:t>Text with similar contexts will have similar vectors</a:t>
+            </a:r>
+          </a:p>
+          <a:p>
+            <a:pPr>
+              <a:buFont typeface="Arial" panose="020B0604020202020204" pitchFamily="34" charset="0"/>
+              <a:buChar char="•"/>
+            </a:pPr>
+            <a:endParaRPr lang="en-US" sz="2800" dirty="0"/>
           </a:p>
         </p:txBody>
       </p:sp>
@@ -5664,15 +6622,45 @@
             <a:pPr algn="ctr"/>
             <a:r>
               <a:rPr lang="en-US" dirty="0"/>
-              <a:t>11 of n</a:t>
-            </a:r>
-          </a:p>
-        </p:txBody>
-      </p:sp>
+              <a:t>10 of n</a:t>
+            </a:r>
+          </a:p>
+        </p:txBody>
+      </p:sp>
+      <p:pic>
+        <p:nvPicPr>
+          <p:cNvPr id="10" name="Picture 9">
+            <a:extLst>
+              <a:ext uri="{FF2B5EF4-FFF2-40B4-BE49-F238E27FC236}">
+                <a16:creationId xmlns:a16="http://schemas.microsoft.com/office/drawing/2014/main" id="{3AA6C2E3-A4A5-4002-96D3-12EBECF8141A}"/>
+              </a:ext>
+            </a:extLst>
+          </p:cNvPr>
+          <p:cNvPicPr>
+            <a:picLocks noChangeAspect="1"/>
+          </p:cNvPicPr>
+          <p:nvPr/>
+        </p:nvPicPr>
+        <p:blipFill>
+          <a:blip r:embed="rId2"/>
+          <a:stretch>
+            <a:fillRect/>
+          </a:stretch>
+        </p:blipFill>
+        <p:spPr>
+          <a:xfrm>
+            <a:off x="5531433" y="3264442"/>
+            <a:ext cx="5563287" cy="2713026"/>
+          </a:xfrm>
+          <a:prstGeom prst="rect">
+            <a:avLst/>
+          </a:prstGeom>
+        </p:spPr>
+      </p:pic>
     </p:spTree>
     <p:extLst>
       <p:ext uri="{BB962C8B-B14F-4D97-AF65-F5344CB8AC3E}">
-        <p14:creationId xmlns:p14="http://schemas.microsoft.com/office/powerpoint/2010/main" val="644614161"/>
+        <p14:creationId xmlns:p14="http://schemas.microsoft.com/office/powerpoint/2010/main" val="1364780128"/>
       </p:ext>
     </p:extLst>
   </p:cSld>
@@ -5722,15 +6710,7 @@
           <a:p>
             <a:r>
               <a:rPr lang="fr-FR" b="1" dirty="0"/>
-              <a:t>RAG: Chat </a:t>
-            </a:r>
-            <a:r>
-              <a:rPr lang="fr-FR" b="1" dirty="0" err="1"/>
-              <a:t>with</a:t>
-            </a:r>
-            <a:r>
-              <a:rPr lang="fr-FR" b="1" dirty="0"/>
-              <a:t> Data</a:t>
+              <a:t>RAG: Storage</a:t>
             </a:r>
             <a:endParaRPr lang="en-US" b="1" dirty="0"/>
           </a:p>
@@ -5754,10 +6734,117 @@
         </p:nvSpPr>
         <p:spPr/>
         <p:txBody>
-          <a:bodyPr/>
-          <a:lstStyle/>
-          <a:p>
-            <a:endParaRPr lang="en-US" dirty="0"/>
+          <a:bodyPr>
+            <a:normAutofit/>
+          </a:bodyPr>
+          <a:lstStyle/>
+          <a:p>
+            <a:pPr>
+              <a:buFont typeface="Arial" panose="020B0604020202020204" pitchFamily="34" charset="0"/>
+              <a:buChar char="•"/>
+            </a:pPr>
+            <a:r>
+              <a:rPr lang="en-US" sz="2800" dirty="0"/>
+              <a:t> Vector Store</a:t>
+            </a:r>
+            <a:endParaRPr lang="en-US" sz="2400" dirty="0"/>
+          </a:p>
+          <a:p>
+            <a:pPr lvl="1">
+              <a:buFont typeface="Arial" panose="020B0604020202020204" pitchFamily="34" charset="0"/>
+              <a:buChar char="•"/>
+            </a:pPr>
+            <a:r>
+              <a:rPr lang="en-US" sz="2000" dirty="0"/>
+              <a:t>A storage where all splits are converted</a:t>
+            </a:r>
+          </a:p>
+          <a:p>
+            <a:pPr marL="201168" lvl="1" indent="0">
+              <a:buNone/>
+            </a:pPr>
+            <a:r>
+              <a:rPr lang="en-US" sz="2000" dirty="0"/>
+              <a:t>   into embedding vectors</a:t>
+            </a:r>
+          </a:p>
+          <a:p>
+            <a:pPr marL="201168" lvl="1" indent="0">
+              <a:buNone/>
+            </a:pPr>
+            <a:endParaRPr lang="en-US" sz="2000" dirty="0"/>
+          </a:p>
+          <a:p>
+            <a:pPr lvl="1">
+              <a:buFont typeface="Arial" panose="020B0604020202020204" pitchFamily="34" charset="0"/>
+              <a:buChar char="•"/>
+            </a:pPr>
+            <a:r>
+              <a:rPr lang="en-US" sz="2000" dirty="0"/>
+              <a:t>Can find and return top `n` similar</a:t>
+            </a:r>
+          </a:p>
+          <a:p>
+            <a:pPr marL="201168" lvl="1" indent="0">
+              <a:buNone/>
+            </a:pPr>
+            <a:r>
+              <a:rPr lang="en-US" sz="2000" dirty="0"/>
+              <a:t>   embeddings to the entry</a:t>
+            </a:r>
+          </a:p>
+          <a:p>
+            <a:pPr marL="201168" lvl="1" indent="0">
+              <a:buNone/>
+            </a:pPr>
+            <a:endParaRPr lang="en-US" sz="2000" dirty="0"/>
+          </a:p>
+          <a:p>
+            <a:pPr lvl="1">
+              <a:buFont typeface="Arial" panose="020B0604020202020204" pitchFamily="34" charset="0"/>
+              <a:buChar char="•"/>
+            </a:pPr>
+            <a:r>
+              <a:rPr lang="en-US" sz="2000" dirty="0"/>
+              <a:t>Failure Modes</a:t>
+            </a:r>
+          </a:p>
+          <a:p>
+            <a:pPr lvl="2">
+              <a:buFont typeface="Arial" panose="020B0604020202020204" pitchFamily="34" charset="0"/>
+              <a:buChar char="•"/>
+            </a:pPr>
+            <a:r>
+              <a:rPr lang="en-US" sz="1600" dirty="0"/>
+              <a:t>Duplicate data will cause the vector store return</a:t>
+            </a:r>
+          </a:p>
+          <a:p>
+            <a:pPr marL="384048" lvl="2" indent="0">
+              <a:buNone/>
+            </a:pPr>
+            <a:r>
+              <a:rPr lang="en-US" sz="1600" dirty="0"/>
+              <a:t>    duplicate answer</a:t>
+            </a:r>
+          </a:p>
+          <a:p>
+            <a:pPr marL="201168" lvl="1" indent="0">
+              <a:buNone/>
+            </a:pPr>
+            <a:endParaRPr lang="en-US" sz="2000" dirty="0"/>
+          </a:p>
+          <a:p>
+            <a:pPr marL="201168" lvl="1" indent="0">
+              <a:buNone/>
+            </a:pPr>
+            <a:endParaRPr lang="en-US" sz="2000" dirty="0"/>
+          </a:p>
+          <a:p>
+            <a:pPr marL="201168" lvl="1" indent="0">
+              <a:buNone/>
+            </a:pPr>
+            <a:endParaRPr lang="en-US" sz="2000" dirty="0"/>
           </a:p>
         </p:txBody>
       </p:sp>
@@ -5792,15 +6879,45 @@
             <a:pPr algn="ctr"/>
             <a:r>
               <a:rPr lang="en-US" dirty="0"/>
-              <a:t>12 of n</a:t>
-            </a:r>
-          </a:p>
-        </p:txBody>
-      </p:sp>
+              <a:t>10 of n</a:t>
+            </a:r>
+          </a:p>
+        </p:txBody>
+      </p:sp>
+      <p:pic>
+        <p:nvPicPr>
+          <p:cNvPr id="6" name="Picture 5">
+            <a:extLst>
+              <a:ext uri="{FF2B5EF4-FFF2-40B4-BE49-F238E27FC236}">
+                <a16:creationId xmlns:a16="http://schemas.microsoft.com/office/drawing/2014/main" id="{A0D34FB6-1667-4772-9601-70127F2683E7}"/>
+              </a:ext>
+            </a:extLst>
+          </p:cNvPr>
+          <p:cNvPicPr>
+            <a:picLocks noChangeAspect="1"/>
+          </p:cNvPicPr>
+          <p:nvPr/>
+        </p:nvPicPr>
+        <p:blipFill>
+          <a:blip r:embed="rId2"/>
+          <a:stretch>
+            <a:fillRect/>
+          </a:stretch>
+        </p:blipFill>
+        <p:spPr>
+          <a:xfrm>
+            <a:off x="6671703" y="1922857"/>
+            <a:ext cx="4969102" cy="4054611"/>
+          </a:xfrm>
+          <a:prstGeom prst="rect">
+            <a:avLst/>
+          </a:prstGeom>
+        </p:spPr>
+      </p:pic>
     </p:spTree>
     <p:extLst>
       <p:ext uri="{BB962C8B-B14F-4D97-AF65-F5344CB8AC3E}">
-        <p14:creationId xmlns:p14="http://schemas.microsoft.com/office/powerpoint/2010/main" val="2686710233"/>
+        <p14:creationId xmlns:p14="http://schemas.microsoft.com/office/powerpoint/2010/main" val="647396915"/>
       </p:ext>
     </p:extLst>
   </p:cSld>
@@ -6101,6 +7218,258 @@
 </file>
 
 <file path=ppt/slides/slide20.xml><?xml version="1.0" encoding="utf-8"?>
+<p:sld xmlns:a="http://schemas.openxmlformats.org/drawingml/2006/main" xmlns:r="http://schemas.openxmlformats.org/officeDocument/2006/relationships" xmlns:p="http://schemas.openxmlformats.org/presentationml/2006/main">
+  <p:cSld>
+    <p:spTree>
+      <p:nvGrpSpPr>
+        <p:cNvPr id="1" name=""/>
+        <p:cNvGrpSpPr/>
+        <p:nvPr/>
+      </p:nvGrpSpPr>
+      <p:grpSpPr>
+        <a:xfrm>
+          <a:off x="0" y="0"/>
+          <a:ext cx="0" cy="0"/>
+          <a:chOff x="0" y="0"/>
+          <a:chExt cx="0" cy="0"/>
+        </a:xfrm>
+      </p:grpSpPr>
+      <p:sp>
+        <p:nvSpPr>
+          <p:cNvPr id="2" name="Title 1">
+            <a:extLst>
+              <a:ext uri="{FF2B5EF4-FFF2-40B4-BE49-F238E27FC236}">
+                <a16:creationId xmlns:a16="http://schemas.microsoft.com/office/drawing/2014/main" id="{496A992F-F5B0-4546-9577-213FDA0B45F9}"/>
+              </a:ext>
+            </a:extLst>
+          </p:cNvPr>
+          <p:cNvSpPr>
+            <a:spLocks noGrp="1"/>
+          </p:cNvSpPr>
+          <p:nvPr>
+            <p:ph type="title"/>
+          </p:nvPr>
+        </p:nvSpPr>
+        <p:spPr/>
+        <p:txBody>
+          <a:bodyPr/>
+          <a:lstStyle/>
+          <a:p>
+            <a:r>
+              <a:rPr lang="fr-FR" b="1" dirty="0"/>
+              <a:t>RAG: </a:t>
+            </a:r>
+            <a:r>
+              <a:rPr lang="fr-FR" b="1" dirty="0" err="1"/>
+              <a:t>Retrieval</a:t>
+            </a:r>
+            <a:endParaRPr lang="en-US" b="1" dirty="0"/>
+          </a:p>
+        </p:txBody>
+      </p:sp>
+      <p:sp>
+        <p:nvSpPr>
+          <p:cNvPr id="3" name="Content Placeholder 2">
+            <a:extLst>
+              <a:ext uri="{FF2B5EF4-FFF2-40B4-BE49-F238E27FC236}">
+                <a16:creationId xmlns:a16="http://schemas.microsoft.com/office/drawing/2014/main" id="{27634627-5020-42B4-8CFD-1B158C53CCAF}"/>
+              </a:ext>
+            </a:extLst>
+          </p:cNvPr>
+          <p:cNvSpPr>
+            <a:spLocks noGrp="1"/>
+          </p:cNvSpPr>
+          <p:nvPr>
+            <p:ph idx="1"/>
+          </p:nvPr>
+        </p:nvSpPr>
+        <p:spPr/>
+        <p:txBody>
+          <a:bodyPr/>
+          <a:lstStyle/>
+          <a:p>
+            <a:endParaRPr lang="en-US" dirty="0"/>
+          </a:p>
+        </p:txBody>
+      </p:sp>
+      <p:sp>
+        <p:nvSpPr>
+          <p:cNvPr id="4" name="TextBox 3">
+            <a:extLst>
+              <a:ext uri="{FF2B5EF4-FFF2-40B4-BE49-F238E27FC236}">
+                <a16:creationId xmlns:a16="http://schemas.microsoft.com/office/drawing/2014/main" id="{9ED3D534-BBDF-481B-B958-084DF4878A72}"/>
+              </a:ext>
+            </a:extLst>
+          </p:cNvPr>
+          <p:cNvSpPr txBox="1"/>
+          <p:nvPr/>
+        </p:nvSpPr>
+        <p:spPr>
+          <a:xfrm>
+            <a:off x="5650230" y="6451501"/>
+            <a:ext cx="1021473" cy="369332"/>
+          </a:xfrm>
+          <a:prstGeom prst="rect">
+            <a:avLst/>
+          </a:prstGeom>
+          <a:noFill/>
+        </p:spPr>
+        <p:txBody>
+          <a:bodyPr wrap="square" rtlCol="0">
+            <a:spAutoFit/>
+          </a:bodyPr>
+          <a:lstStyle/>
+          <a:p>
+            <a:pPr algn="ctr"/>
+            <a:r>
+              <a:rPr lang="en-US" dirty="0"/>
+              <a:t>11 of n</a:t>
+            </a:r>
+          </a:p>
+        </p:txBody>
+      </p:sp>
+    </p:spTree>
+    <p:extLst>
+      <p:ext uri="{BB962C8B-B14F-4D97-AF65-F5344CB8AC3E}">
+        <p14:creationId xmlns:p14="http://schemas.microsoft.com/office/powerpoint/2010/main" val="644614161"/>
+      </p:ext>
+    </p:extLst>
+  </p:cSld>
+  <p:clrMapOvr>
+    <a:masterClrMapping/>
+  </p:clrMapOvr>
+</p:sld>
+</file>
+
+<file path=ppt/slides/slide21.xml><?xml version="1.0" encoding="utf-8"?>
+<p:sld xmlns:a="http://schemas.openxmlformats.org/drawingml/2006/main" xmlns:r="http://schemas.openxmlformats.org/officeDocument/2006/relationships" xmlns:p="http://schemas.openxmlformats.org/presentationml/2006/main">
+  <p:cSld>
+    <p:spTree>
+      <p:nvGrpSpPr>
+        <p:cNvPr id="1" name=""/>
+        <p:cNvGrpSpPr/>
+        <p:nvPr/>
+      </p:nvGrpSpPr>
+      <p:grpSpPr>
+        <a:xfrm>
+          <a:off x="0" y="0"/>
+          <a:ext cx="0" cy="0"/>
+          <a:chOff x="0" y="0"/>
+          <a:chExt cx="0" cy="0"/>
+        </a:xfrm>
+      </p:grpSpPr>
+      <p:sp>
+        <p:nvSpPr>
+          <p:cNvPr id="2" name="Title 1">
+            <a:extLst>
+              <a:ext uri="{FF2B5EF4-FFF2-40B4-BE49-F238E27FC236}">
+                <a16:creationId xmlns:a16="http://schemas.microsoft.com/office/drawing/2014/main" id="{496A992F-F5B0-4546-9577-213FDA0B45F9}"/>
+              </a:ext>
+            </a:extLst>
+          </p:cNvPr>
+          <p:cNvSpPr>
+            <a:spLocks noGrp="1"/>
+          </p:cNvSpPr>
+          <p:nvPr>
+            <p:ph type="title"/>
+          </p:nvPr>
+        </p:nvSpPr>
+        <p:spPr/>
+        <p:txBody>
+          <a:bodyPr/>
+          <a:lstStyle/>
+          <a:p>
+            <a:r>
+              <a:rPr lang="fr-FR" b="1" dirty="0"/>
+              <a:t>RAG: Chat </a:t>
+            </a:r>
+            <a:r>
+              <a:rPr lang="fr-FR" b="1" dirty="0" err="1"/>
+              <a:t>with</a:t>
+            </a:r>
+            <a:r>
+              <a:rPr lang="fr-FR" b="1" dirty="0"/>
+              <a:t> Data</a:t>
+            </a:r>
+            <a:endParaRPr lang="en-US" b="1" dirty="0"/>
+          </a:p>
+        </p:txBody>
+      </p:sp>
+      <p:sp>
+        <p:nvSpPr>
+          <p:cNvPr id="3" name="Content Placeholder 2">
+            <a:extLst>
+              <a:ext uri="{FF2B5EF4-FFF2-40B4-BE49-F238E27FC236}">
+                <a16:creationId xmlns:a16="http://schemas.microsoft.com/office/drawing/2014/main" id="{27634627-5020-42B4-8CFD-1B158C53CCAF}"/>
+              </a:ext>
+            </a:extLst>
+          </p:cNvPr>
+          <p:cNvSpPr>
+            <a:spLocks noGrp="1"/>
+          </p:cNvSpPr>
+          <p:nvPr>
+            <p:ph idx="1"/>
+          </p:nvPr>
+        </p:nvSpPr>
+        <p:spPr/>
+        <p:txBody>
+          <a:bodyPr/>
+          <a:lstStyle/>
+          <a:p>
+            <a:endParaRPr lang="en-US" dirty="0"/>
+          </a:p>
+        </p:txBody>
+      </p:sp>
+      <p:sp>
+        <p:nvSpPr>
+          <p:cNvPr id="4" name="TextBox 3">
+            <a:extLst>
+              <a:ext uri="{FF2B5EF4-FFF2-40B4-BE49-F238E27FC236}">
+                <a16:creationId xmlns:a16="http://schemas.microsoft.com/office/drawing/2014/main" id="{9ED3D534-BBDF-481B-B958-084DF4878A72}"/>
+              </a:ext>
+            </a:extLst>
+          </p:cNvPr>
+          <p:cNvSpPr txBox="1"/>
+          <p:nvPr/>
+        </p:nvSpPr>
+        <p:spPr>
+          <a:xfrm>
+            <a:off x="5650230" y="6451501"/>
+            <a:ext cx="1021473" cy="369332"/>
+          </a:xfrm>
+          <a:prstGeom prst="rect">
+            <a:avLst/>
+          </a:prstGeom>
+          <a:noFill/>
+        </p:spPr>
+        <p:txBody>
+          <a:bodyPr wrap="square" rtlCol="0">
+            <a:spAutoFit/>
+          </a:bodyPr>
+          <a:lstStyle/>
+          <a:p>
+            <a:pPr algn="ctr"/>
+            <a:r>
+              <a:rPr lang="en-US" dirty="0"/>
+              <a:t>12 of n</a:t>
+            </a:r>
+          </a:p>
+        </p:txBody>
+      </p:sp>
+    </p:spTree>
+    <p:extLst>
+      <p:ext uri="{BB962C8B-B14F-4D97-AF65-F5344CB8AC3E}">
+        <p14:creationId xmlns:p14="http://schemas.microsoft.com/office/powerpoint/2010/main" val="2686710233"/>
+      </p:ext>
+    </p:extLst>
+  </p:cSld>
+  <p:clrMapOvr>
+    <a:masterClrMapping/>
+  </p:clrMapOvr>
+</p:sld>
+</file>
+
+<file path=ppt/slides/slide22.xml><?xml version="1.0" encoding="utf-8"?>
 <p:sld xmlns:a="http://schemas.openxmlformats.org/drawingml/2006/main" xmlns:r="http://schemas.openxmlformats.org/officeDocument/2006/relationships" xmlns:p="http://schemas.openxmlformats.org/presentationml/2006/main">
   <p:cSld>
     <p:spTree>
@@ -7500,4 +8869,299 @@
     </a:ext>
   </a:extLst>
 </a:theme>
+</file>
+
+<file path=ppt/theme/theme2.xml><?xml version="1.0" encoding="utf-8"?>
+<a:theme xmlns:a="http://schemas.openxmlformats.org/drawingml/2006/main" name="Office Theme">
+  <a:themeElements>
+    <a:clrScheme name="Office">
+      <a:dk1>
+        <a:sysClr val="windowText" lastClr="000000"/>
+      </a:dk1>
+      <a:lt1>
+        <a:sysClr val="window" lastClr="FFFFFF"/>
+      </a:lt1>
+      <a:dk2>
+        <a:srgbClr val="44546A"/>
+      </a:dk2>
+      <a:lt2>
+        <a:srgbClr val="E7E6E6"/>
+      </a:lt2>
+      <a:accent1>
+        <a:srgbClr val="4472C4"/>
+      </a:accent1>
+      <a:accent2>
+        <a:srgbClr val="ED7D31"/>
+      </a:accent2>
+      <a:accent3>
+        <a:srgbClr val="A5A5A5"/>
+      </a:accent3>
+      <a:accent4>
+        <a:srgbClr val="FFC000"/>
+      </a:accent4>
+      <a:accent5>
+        <a:srgbClr val="5B9BD5"/>
+      </a:accent5>
+      <a:accent6>
+        <a:srgbClr val="70AD47"/>
+      </a:accent6>
+      <a:hlink>
+        <a:srgbClr val="0563C1"/>
+      </a:hlink>
+      <a:folHlink>
+        <a:srgbClr val="954F72"/>
+      </a:folHlink>
+    </a:clrScheme>
+    <a:fontScheme name="Office">
+      <a:majorFont>
+        <a:latin typeface="Calibri Light" panose="020F0302020204030204"/>
+        <a:ea typeface=""/>
+        <a:cs typeface=""/>
+        <a:font script="Jpan" typeface="游ゴシック Light"/>
+        <a:font script="Hang" typeface="맑은 고딕"/>
+        <a:font script="Hans" typeface="等线 Light"/>
+        <a:font script="Hant" typeface="新細明體"/>
+        <a:font script="Arab" typeface="Times New Roman"/>
+        <a:font script="Hebr" typeface="Times New Roman"/>
+        <a:font script="Thai" typeface="Angsana New"/>
+        <a:font script="Ethi" typeface="Nyala"/>
+        <a:font script="Beng" typeface="Vrinda"/>
+        <a:font script="Gujr" typeface="Shruti"/>
+        <a:font script="Khmr" typeface="MoolBoran"/>
+        <a:font script="Knda" typeface="Tunga"/>
+        <a:font script="Guru" typeface="Raavi"/>
+        <a:font script="Cans" typeface="Euphemia"/>
+        <a:font script="Cher" typeface="Plantagenet Cherokee"/>
+        <a:font script="Yiii" typeface="Microsoft Yi Baiti"/>
+        <a:font script="Tibt" typeface="Microsoft Himalaya"/>
+        <a:font script="Thaa" typeface="MV Boli"/>
+        <a:font script="Deva" typeface="Mangal"/>
+        <a:font script="Telu" typeface="Gautami"/>
+        <a:font script="Taml" typeface="Latha"/>
+        <a:font script="Syrc" typeface="Estrangelo Edessa"/>
+        <a:font script="Orya" typeface="Kalinga"/>
+        <a:font script="Mlym" typeface="Kartika"/>
+        <a:font script="Laoo" typeface="DokChampa"/>
+        <a:font script="Sinh" typeface="Iskoola Pota"/>
+        <a:font script="Mong" typeface="Mongolian Baiti"/>
+        <a:font script="Viet" typeface="Times New Roman"/>
+        <a:font script="Uigh" typeface="Microsoft Uighur"/>
+        <a:font script="Geor" typeface="Sylfaen"/>
+        <a:font script="Armn" typeface="Arial"/>
+        <a:font script="Bugi" typeface="Leelawadee UI"/>
+        <a:font script="Bopo" typeface="Microsoft JhengHei"/>
+        <a:font script="Java" typeface="Javanese Text"/>
+        <a:font script="Lisu" typeface="Segoe UI"/>
+        <a:font script="Mymr" typeface="Myanmar Text"/>
+        <a:font script="Nkoo" typeface="Ebrima"/>
+        <a:font script="Olck" typeface="Nirmala UI"/>
+        <a:font script="Osma" typeface="Ebrima"/>
+        <a:font script="Phag" typeface="Phagspa"/>
+        <a:font script="Syrn" typeface="Estrangelo Edessa"/>
+        <a:font script="Syrj" typeface="Estrangelo Edessa"/>
+        <a:font script="Syre" typeface="Estrangelo Edessa"/>
+        <a:font script="Sora" typeface="Nirmala UI"/>
+        <a:font script="Tale" typeface="Microsoft Tai Le"/>
+        <a:font script="Talu" typeface="Microsoft New Tai Lue"/>
+        <a:font script="Tfng" typeface="Ebrima"/>
+      </a:majorFont>
+      <a:minorFont>
+        <a:latin typeface="Calibri" panose="020F0502020204030204"/>
+        <a:ea typeface=""/>
+        <a:cs typeface=""/>
+        <a:font script="Jpan" typeface="游ゴシック"/>
+        <a:font script="Hang" typeface="맑은 고딕"/>
+        <a:font script="Hans" typeface="等线"/>
+        <a:font script="Hant" typeface="新細明體"/>
+        <a:font script="Arab" typeface="Arial"/>
+        <a:font script="Hebr" typeface="Arial"/>
+        <a:font script="Thai" typeface="Cordia New"/>
+        <a:font script="Ethi" typeface="Nyala"/>
+        <a:font script="Beng" typeface="Vrinda"/>
+        <a:font script="Gujr" typeface="Shruti"/>
+        <a:font script="Khmr" typeface="DaunPenh"/>
+        <a:font script="Knda" typeface="Tunga"/>
+        <a:font script="Guru" typeface="Raavi"/>
+        <a:font script="Cans" typeface="Euphemia"/>
+        <a:font script="Cher" typeface="Plantagenet Cherokee"/>
+        <a:font script="Yiii" typeface="Microsoft Yi Baiti"/>
+        <a:font script="Tibt" typeface="Microsoft Himalaya"/>
+        <a:font script="Thaa" typeface="MV Boli"/>
+        <a:font script="Deva" typeface="Mangal"/>
+        <a:font script="Telu" typeface="Gautami"/>
+        <a:font script="Taml" typeface="Latha"/>
+        <a:font script="Syrc" typeface="Estrangelo Edessa"/>
+        <a:font script="Orya" typeface="Kalinga"/>
+        <a:font script="Mlym" typeface="Kartika"/>
+        <a:font script="Laoo" typeface="DokChampa"/>
+        <a:font script="Sinh" typeface="Iskoola Pota"/>
+        <a:font script="Mong" typeface="Mongolian Baiti"/>
+        <a:font script="Viet" typeface="Arial"/>
+        <a:font script="Uigh" typeface="Microsoft Uighur"/>
+        <a:font script="Geor" typeface="Sylfaen"/>
+        <a:font script="Armn" typeface="Arial"/>
+        <a:font script="Bugi" typeface="Leelawadee UI"/>
+        <a:font script="Bopo" typeface="Microsoft JhengHei"/>
+        <a:font script="Java" typeface="Javanese Text"/>
+        <a:font script="Lisu" typeface="Segoe UI"/>
+        <a:font script="Mymr" typeface="Myanmar Text"/>
+        <a:font script="Nkoo" typeface="Ebrima"/>
+        <a:font script="Olck" typeface="Nirmala UI"/>
+        <a:font script="Osma" typeface="Ebrima"/>
+        <a:font script="Phag" typeface="Phagspa"/>
+        <a:font script="Syrn" typeface="Estrangelo Edessa"/>
+        <a:font script="Syrj" typeface="Estrangelo Edessa"/>
+        <a:font script="Syre" typeface="Estrangelo Edessa"/>
+        <a:font script="Sora" typeface="Nirmala UI"/>
+        <a:font script="Tale" typeface="Microsoft Tai Le"/>
+        <a:font script="Talu" typeface="Microsoft New Tai Lue"/>
+        <a:font script="Tfng" typeface="Ebrima"/>
+      </a:minorFont>
+    </a:fontScheme>
+    <a:fmtScheme name="Office">
+      <a:fillStyleLst>
+        <a:solidFill>
+          <a:schemeClr val="phClr"/>
+        </a:solidFill>
+        <a:gradFill rotWithShape="1">
+          <a:gsLst>
+            <a:gs pos="0">
+              <a:schemeClr val="phClr">
+                <a:lumMod val="110000"/>
+                <a:satMod val="105000"/>
+                <a:tint val="67000"/>
+              </a:schemeClr>
+            </a:gs>
+            <a:gs pos="50000">
+              <a:schemeClr val="phClr">
+                <a:lumMod val="105000"/>
+                <a:satMod val="103000"/>
+                <a:tint val="73000"/>
+              </a:schemeClr>
+            </a:gs>
+            <a:gs pos="100000">
+              <a:schemeClr val="phClr">
+                <a:lumMod val="105000"/>
+                <a:satMod val="109000"/>
+                <a:tint val="81000"/>
+              </a:schemeClr>
+            </a:gs>
+          </a:gsLst>
+          <a:lin ang="5400000" scaled="0"/>
+        </a:gradFill>
+        <a:gradFill rotWithShape="1">
+          <a:gsLst>
+            <a:gs pos="0">
+              <a:schemeClr val="phClr">
+                <a:satMod val="103000"/>
+                <a:lumMod val="102000"/>
+                <a:tint val="94000"/>
+              </a:schemeClr>
+            </a:gs>
+            <a:gs pos="50000">
+              <a:schemeClr val="phClr">
+                <a:satMod val="110000"/>
+                <a:lumMod val="100000"/>
+                <a:shade val="100000"/>
+              </a:schemeClr>
+            </a:gs>
+            <a:gs pos="100000">
+              <a:schemeClr val="phClr">
+                <a:lumMod val="99000"/>
+                <a:satMod val="120000"/>
+                <a:shade val="78000"/>
+              </a:schemeClr>
+            </a:gs>
+          </a:gsLst>
+          <a:lin ang="5400000" scaled="0"/>
+        </a:gradFill>
+      </a:fillStyleLst>
+      <a:lnStyleLst>
+        <a:ln w="6350" cap="flat" cmpd="sng" algn="ctr">
+          <a:solidFill>
+            <a:schemeClr val="phClr"/>
+          </a:solidFill>
+          <a:prstDash val="solid"/>
+          <a:miter lim="800000"/>
+        </a:ln>
+        <a:ln w="12700" cap="flat" cmpd="sng" algn="ctr">
+          <a:solidFill>
+            <a:schemeClr val="phClr"/>
+          </a:solidFill>
+          <a:prstDash val="solid"/>
+          <a:miter lim="800000"/>
+        </a:ln>
+        <a:ln w="19050" cap="flat" cmpd="sng" algn="ctr">
+          <a:solidFill>
+            <a:schemeClr val="phClr"/>
+          </a:solidFill>
+          <a:prstDash val="solid"/>
+          <a:miter lim="800000"/>
+        </a:ln>
+      </a:lnStyleLst>
+      <a:effectStyleLst>
+        <a:effectStyle>
+          <a:effectLst/>
+        </a:effectStyle>
+        <a:effectStyle>
+          <a:effectLst/>
+        </a:effectStyle>
+        <a:effectStyle>
+          <a:effectLst>
+            <a:outerShdw blurRad="57150" dist="19050" dir="5400000" algn="ctr" rotWithShape="0">
+              <a:srgbClr val="000000">
+                <a:alpha val="63000"/>
+              </a:srgbClr>
+            </a:outerShdw>
+          </a:effectLst>
+        </a:effectStyle>
+      </a:effectStyleLst>
+      <a:bgFillStyleLst>
+        <a:solidFill>
+          <a:schemeClr val="phClr"/>
+        </a:solidFill>
+        <a:solidFill>
+          <a:schemeClr val="phClr">
+            <a:tint val="95000"/>
+            <a:satMod val="170000"/>
+          </a:schemeClr>
+        </a:solidFill>
+        <a:gradFill rotWithShape="1">
+          <a:gsLst>
+            <a:gs pos="0">
+              <a:schemeClr val="phClr">
+                <a:tint val="93000"/>
+                <a:satMod val="150000"/>
+                <a:shade val="98000"/>
+                <a:lumMod val="102000"/>
+              </a:schemeClr>
+            </a:gs>
+            <a:gs pos="50000">
+              <a:schemeClr val="phClr">
+                <a:tint val="98000"/>
+                <a:satMod val="130000"/>
+                <a:shade val="90000"/>
+                <a:lumMod val="103000"/>
+              </a:schemeClr>
+            </a:gs>
+            <a:gs pos="100000">
+              <a:schemeClr val="phClr">
+                <a:shade val="63000"/>
+                <a:satMod val="120000"/>
+              </a:schemeClr>
+            </a:gs>
+          </a:gsLst>
+          <a:lin ang="5400000" scaled="0"/>
+        </a:gradFill>
+      </a:bgFillStyleLst>
+    </a:fmtScheme>
+  </a:themeElements>
+  <a:objectDefaults/>
+  <a:extraClrSchemeLst/>
+  <a:extLst>
+    <a:ext uri="{05A4C25C-085E-4340-85A3-A5531E510DB2}">
+      <thm15:themeFamily xmlns:thm15="http://schemas.microsoft.com/office/thememl/2012/main" name="Office Theme" id="{62F939B6-93AF-4DB8-9C6B-D6C7DFDC589F}" vid="{4A3C46E8-61CC-4603-A589-7422A47A8E4A}"/>
+    </a:ext>
+  </a:extLst>
+</a:theme>
 </file>
</xml_diff>

<commit_message>
Added chat bot code and completed powerpoint slides
</commit_message>
<xml_diff>
--- a/Presentation/Slides/Presentation.pptx
+++ b/Presentation/Slides/Presentation.pptx
@@ -5,7 +5,7 @@
     <p:sldMasterId id="2147483726" r:id="rId1"/>
   </p:sldMasterIdLst>
   <p:notesMasterIdLst>
-    <p:notesMasterId r:id="rId24"/>
+    <p:notesMasterId r:id="rId26"/>
   </p:notesMasterIdLst>
   <p:sldIdLst>
     <p:sldId id="256" r:id="rId2"/>
@@ -16,20 +16,22 @@
     <p:sldId id="271" r:id="rId7"/>
     <p:sldId id="259" r:id="rId8"/>
     <p:sldId id="260" r:id="rId9"/>
-    <p:sldId id="261" r:id="rId10"/>
-    <p:sldId id="262" r:id="rId11"/>
-    <p:sldId id="273" r:id="rId12"/>
-    <p:sldId id="263" r:id="rId13"/>
-    <p:sldId id="274" r:id="rId14"/>
-    <p:sldId id="264" r:id="rId15"/>
-    <p:sldId id="275" r:id="rId16"/>
-    <p:sldId id="265" r:id="rId17"/>
-    <p:sldId id="276" r:id="rId18"/>
-    <p:sldId id="266" r:id="rId19"/>
-    <p:sldId id="277" r:id="rId20"/>
-    <p:sldId id="267" r:id="rId21"/>
-    <p:sldId id="269" r:id="rId22"/>
-    <p:sldId id="268" r:id="rId23"/>
+    <p:sldId id="278" r:id="rId10"/>
+    <p:sldId id="261" r:id="rId11"/>
+    <p:sldId id="262" r:id="rId12"/>
+    <p:sldId id="273" r:id="rId13"/>
+    <p:sldId id="263" r:id="rId14"/>
+    <p:sldId id="274" r:id="rId15"/>
+    <p:sldId id="264" r:id="rId16"/>
+    <p:sldId id="275" r:id="rId17"/>
+    <p:sldId id="265" r:id="rId18"/>
+    <p:sldId id="276" r:id="rId19"/>
+    <p:sldId id="266" r:id="rId20"/>
+    <p:sldId id="277" r:id="rId21"/>
+    <p:sldId id="267" r:id="rId22"/>
+    <p:sldId id="269" r:id="rId23"/>
+    <p:sldId id="279" r:id="rId24"/>
+    <p:sldId id="268" r:id="rId25"/>
   </p:sldIdLst>
   <p:sldSz cx="12192000" cy="6858000"/>
   <p:notesSz cx="6858000" cy="9144000"/>
@@ -550,7 +552,7 @@
           <a:p>
             <a:fld id="{63BCEE46-9938-4DF8-86E2-FD3EC901F7AF}" type="slidenum">
               <a:rPr lang="en-US" smtClean="0"/>
-              <a:t>16</a:t>
+              <a:t>17</a:t>
             </a:fld>
             <a:endParaRPr lang="en-US"/>
           </a:p>
@@ -634,7 +636,7 @@
           <a:p>
             <a:fld id="{63BCEE46-9938-4DF8-86E2-FD3EC901F7AF}" type="slidenum">
               <a:rPr lang="en-US" smtClean="0"/>
-              <a:t>17</a:t>
+              <a:t>18</a:t>
             </a:fld>
             <a:endParaRPr lang="en-US"/>
           </a:p>
@@ -4549,6 +4551,130 @@
           <a:p>
             <a:r>
               <a:rPr lang="fr-FR" b="1" dirty="0"/>
+              <a:t>LangChain: Q&amp;A over Documents</a:t>
+            </a:r>
+            <a:endParaRPr lang="en-US" b="1" dirty="0"/>
+          </a:p>
+        </p:txBody>
+      </p:sp>
+      <p:pic>
+        <p:nvPicPr>
+          <p:cNvPr id="6" name="Content Placeholder 5">
+            <a:extLst>
+              <a:ext uri="{FF2B5EF4-FFF2-40B4-BE49-F238E27FC236}">
+                <a16:creationId xmlns:a16="http://schemas.microsoft.com/office/drawing/2014/main" id="{4DDE3E10-FEC4-4890-A560-453DD34D6CBE}"/>
+              </a:ext>
+            </a:extLst>
+          </p:cNvPr>
+          <p:cNvPicPr>
+            <a:picLocks noGrp="1" noChangeAspect="1"/>
+          </p:cNvPicPr>
+          <p:nvPr>
+            <p:ph idx="1"/>
+          </p:nvPr>
+        </p:nvPicPr>
+        <p:blipFill>
+          <a:blip r:embed="rId2"/>
+          <a:stretch>
+            <a:fillRect/>
+          </a:stretch>
+        </p:blipFill>
+        <p:spPr>
+          <a:xfrm>
+            <a:off x="2006494" y="1788160"/>
+            <a:ext cx="4154472" cy="4516830"/>
+          </a:xfrm>
+        </p:spPr>
+      </p:pic>
+      <p:sp>
+        <p:nvSpPr>
+          <p:cNvPr id="4" name="TextBox 3">
+            <a:extLst>
+              <a:ext uri="{FF2B5EF4-FFF2-40B4-BE49-F238E27FC236}">
+                <a16:creationId xmlns:a16="http://schemas.microsoft.com/office/drawing/2014/main" id="{9ED3D534-BBDF-481B-B958-084DF4878A72}"/>
+              </a:ext>
+            </a:extLst>
+          </p:cNvPr>
+          <p:cNvSpPr txBox="1"/>
+          <p:nvPr/>
+        </p:nvSpPr>
+        <p:spPr>
+          <a:xfrm>
+            <a:off x="5650230" y="6451501"/>
+            <a:ext cx="1021473" cy="369332"/>
+          </a:xfrm>
+          <a:prstGeom prst="rect">
+            <a:avLst/>
+          </a:prstGeom>
+          <a:noFill/>
+        </p:spPr>
+        <p:txBody>
+          <a:bodyPr wrap="square" rtlCol="0">
+            <a:spAutoFit/>
+          </a:bodyPr>
+          <a:lstStyle/>
+          <a:p>
+            <a:pPr algn="ctr"/>
+            <a:r>
+              <a:rPr lang="en-US" dirty="0"/>
+              <a:t>5 of n</a:t>
+            </a:r>
+          </a:p>
+        </p:txBody>
+      </p:sp>
+    </p:spTree>
+    <p:extLst>
+      <p:ext uri="{BB962C8B-B14F-4D97-AF65-F5344CB8AC3E}">
+        <p14:creationId xmlns:p14="http://schemas.microsoft.com/office/powerpoint/2010/main" val="3095798474"/>
+      </p:ext>
+    </p:extLst>
+  </p:cSld>
+  <p:clrMapOvr>
+    <a:masterClrMapping/>
+  </p:clrMapOvr>
+</p:sld>
+</file>
+
+<file path=ppt/slides/slide11.xml><?xml version="1.0" encoding="utf-8"?>
+<p:sld xmlns:a="http://schemas.openxmlformats.org/drawingml/2006/main" xmlns:r="http://schemas.openxmlformats.org/officeDocument/2006/relationships" xmlns:p="http://schemas.openxmlformats.org/presentationml/2006/main">
+  <p:cSld>
+    <p:spTree>
+      <p:nvGrpSpPr>
+        <p:cNvPr id="1" name=""/>
+        <p:cNvGrpSpPr/>
+        <p:nvPr/>
+      </p:nvGrpSpPr>
+      <p:grpSpPr>
+        <a:xfrm>
+          <a:off x="0" y="0"/>
+          <a:ext cx="0" cy="0"/>
+          <a:chOff x="0" y="0"/>
+          <a:chExt cx="0" cy="0"/>
+        </a:xfrm>
+      </p:grpSpPr>
+      <p:sp>
+        <p:nvSpPr>
+          <p:cNvPr id="2" name="Title 1">
+            <a:extLst>
+              <a:ext uri="{FF2B5EF4-FFF2-40B4-BE49-F238E27FC236}">
+                <a16:creationId xmlns:a16="http://schemas.microsoft.com/office/drawing/2014/main" id="{496A992F-F5B0-4546-9577-213FDA0B45F9}"/>
+              </a:ext>
+            </a:extLst>
+          </p:cNvPr>
+          <p:cNvSpPr>
+            <a:spLocks noGrp="1"/>
+          </p:cNvSpPr>
+          <p:nvPr>
+            <p:ph type="title"/>
+          </p:nvPr>
+        </p:nvSpPr>
+        <p:spPr/>
+        <p:txBody>
+          <a:bodyPr/>
+          <a:lstStyle/>
+          <a:p>
+            <a:r>
+              <a:rPr lang="fr-FR" b="1" dirty="0"/>
               <a:t>LangChain: Evaluation</a:t>
             </a:r>
             <a:endParaRPr lang="en-US" b="1" dirty="0"/>
@@ -4686,7 +4812,7 @@
 </p:sld>
 </file>
 
-<file path=ppt/slides/slide11.xml><?xml version="1.0" encoding="utf-8"?>
+<file path=ppt/slides/slide12.xml><?xml version="1.0" encoding="utf-8"?>
 <p:sld xmlns:a="http://schemas.openxmlformats.org/drawingml/2006/main" xmlns:r="http://schemas.openxmlformats.org/officeDocument/2006/relationships" xmlns:p="http://schemas.openxmlformats.org/presentationml/2006/main">
   <p:cSld>
     <p:spTree>
@@ -4913,7 +5039,7 @@
 </p:sld>
 </file>
 
-<file path=ppt/slides/slide12.xml><?xml version="1.0" encoding="utf-8"?>
+<file path=ppt/slides/slide13.xml><?xml version="1.0" encoding="utf-8"?>
 <p:sld xmlns:a="http://schemas.openxmlformats.org/drawingml/2006/main" xmlns:r="http://schemas.openxmlformats.org/officeDocument/2006/relationships" xmlns:p="http://schemas.openxmlformats.org/presentationml/2006/main">
   <p:cSld>
     <p:spTree>
@@ -5184,7 +5310,7 @@
 </p:sld>
 </file>
 
-<file path=ppt/slides/slide13.xml><?xml version="1.0" encoding="utf-8"?>
+<file path=ppt/slides/slide14.xml><?xml version="1.0" encoding="utf-8"?>
 <p:sld xmlns:a="http://schemas.openxmlformats.org/drawingml/2006/main" xmlns:r="http://schemas.openxmlformats.org/officeDocument/2006/relationships" xmlns:p="http://schemas.openxmlformats.org/presentationml/2006/main">
   <p:cSld>
     <p:spTree>
@@ -5271,7 +5397,7 @@
 </p:sld>
 </file>
 
-<file path=ppt/slides/slide14.xml><?xml version="1.0" encoding="utf-8"?>
+<file path=ppt/slides/slide15.xml><?xml version="1.0" encoding="utf-8"?>
 <p:sld xmlns:a="http://schemas.openxmlformats.org/drawingml/2006/main" xmlns:r="http://schemas.openxmlformats.org/officeDocument/2006/relationships" xmlns:p="http://schemas.openxmlformats.org/presentationml/2006/main">
   <p:cSld>
     <p:spTree>
@@ -5540,7 +5666,7 @@
 </p:sld>
 </file>
 
-<file path=ppt/slides/slide15.xml><?xml version="1.0" encoding="utf-8"?>
+<file path=ppt/slides/slide16.xml><?xml version="1.0" encoding="utf-8"?>
 <p:sld xmlns:a="http://schemas.openxmlformats.org/drawingml/2006/main" xmlns:r="http://schemas.openxmlformats.org/officeDocument/2006/relationships" xmlns:p="http://schemas.openxmlformats.org/presentationml/2006/main">
   <p:cSld>
     <p:spTree>
@@ -5799,7 +5925,7 @@
 </p:sld>
 </file>
 
-<file path=ppt/slides/slide16.xml><?xml version="1.0" encoding="utf-8"?>
+<file path=ppt/slides/slide17.xml><?xml version="1.0" encoding="utf-8"?>
 <p:sld xmlns:a="http://schemas.openxmlformats.org/drawingml/2006/main" xmlns:r="http://schemas.openxmlformats.org/officeDocument/2006/relationships" xmlns:p="http://schemas.openxmlformats.org/presentationml/2006/main">
   <p:cSld>
     <p:spTree>
@@ -6012,7 +6138,7 @@
 </p:sld>
 </file>
 
-<file path=ppt/slides/slide17.xml><?xml version="1.0" encoding="utf-8"?>
+<file path=ppt/slides/slide18.xml><?xml version="1.0" encoding="utf-8"?>
 <p:sld xmlns:a="http://schemas.openxmlformats.org/drawingml/2006/main" xmlns:r="http://schemas.openxmlformats.org/officeDocument/2006/relationships" xmlns:p="http://schemas.openxmlformats.org/presentationml/2006/main">
   <p:cSld>
     <p:spTree>
@@ -6484,7 +6610,7 @@
 </p:sld>
 </file>
 
-<file path=ppt/slides/slide18.xml><?xml version="1.0" encoding="utf-8"?>
+<file path=ppt/slides/slide19.xml><?xml version="1.0" encoding="utf-8"?>
 <p:sld xmlns:a="http://schemas.openxmlformats.org/drawingml/2006/main" xmlns:r="http://schemas.openxmlformats.org/officeDocument/2006/relationships" xmlns:p="http://schemas.openxmlformats.org/presentationml/2006/main">
   <p:cSld>
     <p:spTree>
@@ -6670,7 +6796,297 @@
 </p:sld>
 </file>
 
-<file path=ppt/slides/slide19.xml><?xml version="1.0" encoding="utf-8"?>
+<file path=ppt/slides/slide2.xml><?xml version="1.0" encoding="utf-8"?>
+<p:sld xmlns:a="http://schemas.openxmlformats.org/drawingml/2006/main" xmlns:r="http://schemas.openxmlformats.org/officeDocument/2006/relationships" xmlns:p="http://schemas.openxmlformats.org/presentationml/2006/main">
+  <p:cSld>
+    <p:spTree>
+      <p:nvGrpSpPr>
+        <p:cNvPr id="1" name=""/>
+        <p:cNvGrpSpPr/>
+        <p:nvPr/>
+      </p:nvGrpSpPr>
+      <p:grpSpPr>
+        <a:xfrm>
+          <a:off x="0" y="0"/>
+          <a:ext cx="0" cy="0"/>
+          <a:chOff x="0" y="0"/>
+          <a:chExt cx="0" cy="0"/>
+        </a:xfrm>
+      </p:grpSpPr>
+      <p:sp>
+        <p:nvSpPr>
+          <p:cNvPr id="2" name="Title 1">
+            <a:extLst>
+              <a:ext uri="{FF2B5EF4-FFF2-40B4-BE49-F238E27FC236}">
+                <a16:creationId xmlns:a16="http://schemas.microsoft.com/office/drawing/2014/main" id="{08B9207A-2521-4E26-A588-906B5CC6B659}"/>
+              </a:ext>
+            </a:extLst>
+          </p:cNvPr>
+          <p:cNvSpPr>
+            <a:spLocks noGrp="1"/>
+          </p:cNvSpPr>
+          <p:nvPr>
+            <p:ph type="title"/>
+          </p:nvPr>
+        </p:nvSpPr>
+        <p:spPr/>
+        <p:txBody>
+          <a:bodyPr/>
+          <a:lstStyle/>
+          <a:p>
+            <a:r>
+              <a:rPr lang="en-US" b="1" dirty="0">
+                <a:solidFill>
+                  <a:schemeClr val="tx1"/>
+                </a:solidFill>
+              </a:rPr>
+              <a:t>Context</a:t>
+            </a:r>
+          </a:p>
+        </p:txBody>
+      </p:sp>
+      <p:sp>
+        <p:nvSpPr>
+          <p:cNvPr id="4" name="Rectangle 1">
+            <a:extLst>
+              <a:ext uri="{FF2B5EF4-FFF2-40B4-BE49-F238E27FC236}">
+                <a16:creationId xmlns:a16="http://schemas.microsoft.com/office/drawing/2014/main" id="{E58BCE96-B8ED-4EDE-830A-0084C58A6630}"/>
+              </a:ext>
+            </a:extLst>
+          </p:cNvPr>
+          <p:cNvSpPr>
+            <a:spLocks noGrp="1" noChangeArrowheads="1"/>
+          </p:cNvSpPr>
+          <p:nvPr>
+            <p:ph idx="1"/>
+          </p:nvPr>
+        </p:nvSpPr>
+        <p:spPr bwMode="auto">
+          <a:xfrm>
+            <a:off x="1483151" y="2242689"/>
+            <a:ext cx="7817837" cy="2239844"/>
+          </a:xfrm>
+          <a:prstGeom prst="rect">
+            <a:avLst/>
+          </a:prstGeom>
+          <a:noFill/>
+          <a:ln>
+            <a:noFill/>
+          </a:ln>
+          <a:effectLst/>
+          <a:extLst>
+            <a:ext uri="{909E8E84-426E-40DD-AFC4-6F175D3DCCD1}">
+              <a14:hiddenFill xmlns:a14="http://schemas.microsoft.com/office/drawing/2010/main">
+                <a:solidFill>
+                  <a:schemeClr val="accent1"/>
+                </a:solidFill>
+              </a14:hiddenFill>
+            </a:ext>
+            <a:ext uri="{91240B29-F687-4F45-9708-019B960494DF}">
+              <a14:hiddenLine xmlns:a14="http://schemas.microsoft.com/office/drawing/2010/main" w="9525">
+                <a:solidFill>
+                  <a:schemeClr val="tx1"/>
+                </a:solidFill>
+                <a:miter lim="800000"/>
+                <a:headEnd/>
+                <a:tailEnd/>
+              </a14:hiddenLine>
+            </a:ext>
+            <a:ext uri="{AF507438-7753-43E0-B8FC-AC1667EBCBE1}">
+              <a14:hiddenEffects xmlns:a14="http://schemas.microsoft.com/office/drawing/2010/main">
+                <a:effectLst>
+                  <a:outerShdw dist="35921" dir="2700000" algn="ctr" rotWithShape="0">
+                    <a:schemeClr val="bg2"/>
+                  </a:outerShdw>
+                </a:effectLst>
+              </a14:hiddenEffects>
+            </a:ext>
+          </a:extLst>
+        </p:spPr>
+        <p:txBody>
+          <a:bodyPr vert="horz" wrap="square" lIns="91440" tIns="45720" rIns="91440" bIns="45720" numCol="1" anchor="ctr" anchorCtr="0" compatLnSpc="1">
+            <a:prstTxWarp prst="textNoShape">
+              <a:avLst/>
+            </a:prstTxWarp>
+            <a:spAutoFit/>
+          </a:bodyPr>
+          <a:lstStyle/>
+          <a:p>
+            <a:pPr marL="0" marR="0" lvl="0" indent="0" algn="l" defTabSz="914400" rtl="0" eaLnBrk="0" fontAlgn="base" latinLnBrk="0" hangingPunct="0">
+              <a:lnSpc>
+                <a:spcPct val="150000"/>
+              </a:lnSpc>
+              <a:spcBef>
+                <a:spcPct val="0"/>
+              </a:spcBef>
+              <a:spcAft>
+                <a:spcPct val="0"/>
+              </a:spcAft>
+              <a:buClrTx/>
+              <a:buSzTx/>
+              <a:buFontTx/>
+              <a:buChar char="•"/>
+              <a:tabLst/>
+            </a:pPr>
+            <a:r>
+              <a:rPr kumimoji="0" lang="en-US" altLang="en-US" sz="2400" b="0" i="0" u="none" strike="noStrike" cap="none" normalizeH="0" baseline="0" dirty="0">
+                <a:ln>
+                  <a:noFill/>
+                </a:ln>
+                <a:solidFill>
+                  <a:schemeClr val="tx1"/>
+                </a:solidFill>
+                <a:effectLst/>
+                <a:latin typeface="Arial" panose="020B0604020202020204" pitchFamily="34" charset="0"/>
+              </a:rPr>
+              <a:t> LangChain Framework</a:t>
+            </a:r>
+          </a:p>
+          <a:p>
+            <a:pPr marL="0" marR="0" lvl="0" indent="0" algn="l" defTabSz="914400" rtl="0" eaLnBrk="0" fontAlgn="base" latinLnBrk="0" hangingPunct="0">
+              <a:lnSpc>
+                <a:spcPct val="150000"/>
+              </a:lnSpc>
+              <a:spcBef>
+                <a:spcPct val="0"/>
+              </a:spcBef>
+              <a:spcAft>
+                <a:spcPct val="0"/>
+              </a:spcAft>
+              <a:buClrTx/>
+              <a:buSzTx/>
+              <a:buFontTx/>
+              <a:buChar char="•"/>
+              <a:tabLst/>
+            </a:pPr>
+            <a:r>
+              <a:rPr kumimoji="0" lang="en-US" altLang="en-US" sz="2400" b="0" i="0" u="none" strike="noStrike" cap="none" normalizeH="0" baseline="0" dirty="0">
+                <a:ln>
+                  <a:noFill/>
+                </a:ln>
+                <a:solidFill>
+                  <a:schemeClr val="tx1"/>
+                </a:solidFill>
+                <a:effectLst/>
+                <a:latin typeface="Arial" panose="020B0604020202020204" pitchFamily="34" charset="0"/>
+              </a:rPr>
+              <a:t> Retrieval-Augmented Generation (RAG)</a:t>
+            </a:r>
+          </a:p>
+          <a:p>
+            <a:pPr marL="0" marR="0" lvl="0" indent="0" algn="l" defTabSz="914400" rtl="0" eaLnBrk="0" fontAlgn="base" latinLnBrk="0" hangingPunct="0">
+              <a:lnSpc>
+                <a:spcPct val="150000"/>
+              </a:lnSpc>
+              <a:spcBef>
+                <a:spcPct val="0"/>
+              </a:spcBef>
+              <a:spcAft>
+                <a:spcPct val="0"/>
+              </a:spcAft>
+              <a:buClrTx/>
+              <a:buSzTx/>
+              <a:buFontTx/>
+              <a:buChar char="•"/>
+              <a:tabLst/>
+            </a:pPr>
+            <a:r>
+              <a:rPr kumimoji="0" lang="en-US" altLang="en-US" sz="2400" b="0" i="0" u="none" strike="noStrike" cap="none" normalizeH="0" baseline="0" dirty="0">
+                <a:ln>
+                  <a:noFill/>
+                </a:ln>
+                <a:solidFill>
+                  <a:schemeClr val="tx1"/>
+                </a:solidFill>
+                <a:effectLst/>
+                <a:latin typeface="Arial" panose="020B0604020202020204" pitchFamily="34" charset="0"/>
+              </a:rPr>
+              <a:t> Using LangChain for RAG</a:t>
+            </a:r>
+          </a:p>
+          <a:p>
+            <a:pPr marL="0" marR="0" lvl="0" indent="0" algn="l" defTabSz="914400" rtl="0" eaLnBrk="0" fontAlgn="base" latinLnBrk="0" hangingPunct="0">
+              <a:lnSpc>
+                <a:spcPct val="150000"/>
+              </a:lnSpc>
+              <a:spcBef>
+                <a:spcPct val="0"/>
+              </a:spcBef>
+              <a:spcAft>
+                <a:spcPct val="0"/>
+              </a:spcAft>
+              <a:buClrTx/>
+              <a:buSzTx/>
+              <a:buFontTx/>
+              <a:buChar char="•"/>
+              <a:tabLst/>
+            </a:pPr>
+            <a:r>
+              <a:rPr kumimoji="0" lang="en-US" altLang="en-US" sz="2400" b="0" i="0" u="none" strike="noStrike" cap="none" normalizeH="0" baseline="0" dirty="0">
+                <a:ln>
+                  <a:noFill/>
+                </a:ln>
+                <a:solidFill>
+                  <a:schemeClr val="tx1"/>
+                </a:solidFill>
+                <a:effectLst/>
+                <a:latin typeface="Arial" panose="020B0604020202020204" pitchFamily="34" charset="0"/>
+              </a:rPr>
+              <a:t> Chatting with Data</a:t>
+            </a:r>
+          </a:p>
+        </p:txBody>
+      </p:sp>
+      <p:sp>
+        <p:nvSpPr>
+          <p:cNvPr id="7" name="TextBox 6">
+            <a:extLst>
+              <a:ext uri="{FF2B5EF4-FFF2-40B4-BE49-F238E27FC236}">
+                <a16:creationId xmlns:a16="http://schemas.microsoft.com/office/drawing/2014/main" id="{CE25349C-89FE-4450-9EA4-59939B8D3826}"/>
+              </a:ext>
+            </a:extLst>
+          </p:cNvPr>
+          <p:cNvSpPr txBox="1"/>
+          <p:nvPr/>
+        </p:nvSpPr>
+        <p:spPr>
+          <a:xfrm>
+            <a:off x="5650230" y="6451501"/>
+            <a:ext cx="1021473" cy="369332"/>
+          </a:xfrm>
+          <a:prstGeom prst="rect">
+            <a:avLst/>
+          </a:prstGeom>
+          <a:noFill/>
+        </p:spPr>
+        <p:txBody>
+          <a:bodyPr wrap="square" rtlCol="0">
+            <a:spAutoFit/>
+          </a:bodyPr>
+          <a:lstStyle/>
+          <a:p>
+            <a:pPr algn="ctr"/>
+            <a:r>
+              <a:rPr lang="en-US" dirty="0"/>
+              <a:t>1 of n</a:t>
+            </a:r>
+          </a:p>
+        </p:txBody>
+      </p:sp>
+    </p:spTree>
+    <p:extLst>
+      <p:ext uri="{BB962C8B-B14F-4D97-AF65-F5344CB8AC3E}">
+        <p14:creationId xmlns:p14="http://schemas.microsoft.com/office/powerpoint/2010/main" val="891073715"/>
+      </p:ext>
+    </p:extLst>
+  </p:cSld>
+  <p:clrMapOvr>
+    <a:masterClrMapping/>
+  </p:clrMapOvr>
+</p:sld>
+</file>
+
+<file path=ppt/slides/slide20.xml><?xml version="1.0" encoding="utf-8"?>
 <p:sld xmlns:a="http://schemas.openxmlformats.org/drawingml/2006/main" xmlns:r="http://schemas.openxmlformats.org/officeDocument/2006/relationships" xmlns:p="http://schemas.openxmlformats.org/presentationml/2006/main">
   <p:cSld>
     <p:spTree>
@@ -6927,420 +7343,6 @@
 </p:sld>
 </file>
 
-<file path=ppt/slides/slide2.xml><?xml version="1.0" encoding="utf-8"?>
-<p:sld xmlns:a="http://schemas.openxmlformats.org/drawingml/2006/main" xmlns:r="http://schemas.openxmlformats.org/officeDocument/2006/relationships" xmlns:p="http://schemas.openxmlformats.org/presentationml/2006/main">
-  <p:cSld>
-    <p:spTree>
-      <p:nvGrpSpPr>
-        <p:cNvPr id="1" name=""/>
-        <p:cNvGrpSpPr/>
-        <p:nvPr/>
-      </p:nvGrpSpPr>
-      <p:grpSpPr>
-        <a:xfrm>
-          <a:off x="0" y="0"/>
-          <a:ext cx="0" cy="0"/>
-          <a:chOff x="0" y="0"/>
-          <a:chExt cx="0" cy="0"/>
-        </a:xfrm>
-      </p:grpSpPr>
-      <p:sp>
-        <p:nvSpPr>
-          <p:cNvPr id="2" name="Title 1">
-            <a:extLst>
-              <a:ext uri="{FF2B5EF4-FFF2-40B4-BE49-F238E27FC236}">
-                <a16:creationId xmlns:a16="http://schemas.microsoft.com/office/drawing/2014/main" id="{08B9207A-2521-4E26-A588-906B5CC6B659}"/>
-              </a:ext>
-            </a:extLst>
-          </p:cNvPr>
-          <p:cNvSpPr>
-            <a:spLocks noGrp="1"/>
-          </p:cNvSpPr>
-          <p:nvPr>
-            <p:ph type="title"/>
-          </p:nvPr>
-        </p:nvSpPr>
-        <p:spPr/>
-        <p:txBody>
-          <a:bodyPr/>
-          <a:lstStyle/>
-          <a:p>
-            <a:r>
-              <a:rPr lang="en-US" b="1" dirty="0">
-                <a:solidFill>
-                  <a:schemeClr val="tx1"/>
-                </a:solidFill>
-              </a:rPr>
-              <a:t>Context</a:t>
-            </a:r>
-          </a:p>
-        </p:txBody>
-      </p:sp>
-      <p:sp>
-        <p:nvSpPr>
-          <p:cNvPr id="4" name="Rectangle 1">
-            <a:extLst>
-              <a:ext uri="{FF2B5EF4-FFF2-40B4-BE49-F238E27FC236}">
-                <a16:creationId xmlns:a16="http://schemas.microsoft.com/office/drawing/2014/main" id="{E58BCE96-B8ED-4EDE-830A-0084C58A6630}"/>
-              </a:ext>
-            </a:extLst>
-          </p:cNvPr>
-          <p:cNvSpPr>
-            <a:spLocks noGrp="1" noChangeArrowheads="1"/>
-          </p:cNvSpPr>
-          <p:nvPr>
-            <p:ph idx="1"/>
-          </p:nvPr>
-        </p:nvSpPr>
-        <p:spPr bwMode="auto">
-          <a:xfrm>
-            <a:off x="1483151" y="2242689"/>
-            <a:ext cx="7817837" cy="2239844"/>
-          </a:xfrm>
-          <a:prstGeom prst="rect">
-            <a:avLst/>
-          </a:prstGeom>
-          <a:noFill/>
-          <a:ln>
-            <a:noFill/>
-          </a:ln>
-          <a:effectLst/>
-          <a:extLst>
-            <a:ext uri="{909E8E84-426E-40DD-AFC4-6F175D3DCCD1}">
-              <a14:hiddenFill xmlns:a14="http://schemas.microsoft.com/office/drawing/2010/main">
-                <a:solidFill>
-                  <a:schemeClr val="accent1"/>
-                </a:solidFill>
-              </a14:hiddenFill>
-            </a:ext>
-            <a:ext uri="{91240B29-F687-4F45-9708-019B960494DF}">
-              <a14:hiddenLine xmlns:a14="http://schemas.microsoft.com/office/drawing/2010/main" w="9525">
-                <a:solidFill>
-                  <a:schemeClr val="tx1"/>
-                </a:solidFill>
-                <a:miter lim="800000"/>
-                <a:headEnd/>
-                <a:tailEnd/>
-              </a14:hiddenLine>
-            </a:ext>
-            <a:ext uri="{AF507438-7753-43E0-B8FC-AC1667EBCBE1}">
-              <a14:hiddenEffects xmlns:a14="http://schemas.microsoft.com/office/drawing/2010/main">
-                <a:effectLst>
-                  <a:outerShdw dist="35921" dir="2700000" algn="ctr" rotWithShape="0">
-                    <a:schemeClr val="bg2"/>
-                  </a:outerShdw>
-                </a:effectLst>
-              </a14:hiddenEffects>
-            </a:ext>
-          </a:extLst>
-        </p:spPr>
-        <p:txBody>
-          <a:bodyPr vert="horz" wrap="square" lIns="91440" tIns="45720" rIns="91440" bIns="45720" numCol="1" anchor="ctr" anchorCtr="0" compatLnSpc="1">
-            <a:prstTxWarp prst="textNoShape">
-              <a:avLst/>
-            </a:prstTxWarp>
-            <a:spAutoFit/>
-          </a:bodyPr>
-          <a:lstStyle/>
-          <a:p>
-            <a:pPr marL="0" marR="0" lvl="0" indent="0" algn="l" defTabSz="914400" rtl="0" eaLnBrk="0" fontAlgn="base" latinLnBrk="0" hangingPunct="0">
-              <a:lnSpc>
-                <a:spcPct val="150000"/>
-              </a:lnSpc>
-              <a:spcBef>
-                <a:spcPct val="0"/>
-              </a:spcBef>
-              <a:spcAft>
-                <a:spcPct val="0"/>
-              </a:spcAft>
-              <a:buClrTx/>
-              <a:buSzTx/>
-              <a:buFontTx/>
-              <a:buChar char="•"/>
-              <a:tabLst/>
-            </a:pPr>
-            <a:r>
-              <a:rPr kumimoji="0" lang="en-US" altLang="en-US" sz="2400" b="0" i="0" u="none" strike="noStrike" cap="none" normalizeH="0" baseline="0" dirty="0">
-                <a:ln>
-                  <a:noFill/>
-                </a:ln>
-                <a:solidFill>
-                  <a:schemeClr val="tx1"/>
-                </a:solidFill>
-                <a:effectLst/>
-                <a:latin typeface="Arial" panose="020B0604020202020204" pitchFamily="34" charset="0"/>
-              </a:rPr>
-              <a:t> LangChain Framework</a:t>
-            </a:r>
-          </a:p>
-          <a:p>
-            <a:pPr marL="0" marR="0" lvl="0" indent="0" algn="l" defTabSz="914400" rtl="0" eaLnBrk="0" fontAlgn="base" latinLnBrk="0" hangingPunct="0">
-              <a:lnSpc>
-                <a:spcPct val="150000"/>
-              </a:lnSpc>
-              <a:spcBef>
-                <a:spcPct val="0"/>
-              </a:spcBef>
-              <a:spcAft>
-                <a:spcPct val="0"/>
-              </a:spcAft>
-              <a:buClrTx/>
-              <a:buSzTx/>
-              <a:buFontTx/>
-              <a:buChar char="•"/>
-              <a:tabLst/>
-            </a:pPr>
-            <a:r>
-              <a:rPr kumimoji="0" lang="en-US" altLang="en-US" sz="2400" b="0" i="0" u="none" strike="noStrike" cap="none" normalizeH="0" baseline="0" dirty="0">
-                <a:ln>
-                  <a:noFill/>
-                </a:ln>
-                <a:solidFill>
-                  <a:schemeClr val="tx1"/>
-                </a:solidFill>
-                <a:effectLst/>
-                <a:latin typeface="Arial" panose="020B0604020202020204" pitchFamily="34" charset="0"/>
-              </a:rPr>
-              <a:t> Retrieval-Augmented Generation (RAG)</a:t>
-            </a:r>
-          </a:p>
-          <a:p>
-            <a:pPr marL="0" marR="0" lvl="0" indent="0" algn="l" defTabSz="914400" rtl="0" eaLnBrk="0" fontAlgn="base" latinLnBrk="0" hangingPunct="0">
-              <a:lnSpc>
-                <a:spcPct val="150000"/>
-              </a:lnSpc>
-              <a:spcBef>
-                <a:spcPct val="0"/>
-              </a:spcBef>
-              <a:spcAft>
-                <a:spcPct val="0"/>
-              </a:spcAft>
-              <a:buClrTx/>
-              <a:buSzTx/>
-              <a:buFontTx/>
-              <a:buChar char="•"/>
-              <a:tabLst/>
-            </a:pPr>
-            <a:r>
-              <a:rPr kumimoji="0" lang="en-US" altLang="en-US" sz="2400" b="0" i="0" u="none" strike="noStrike" cap="none" normalizeH="0" baseline="0" dirty="0">
-                <a:ln>
-                  <a:noFill/>
-                </a:ln>
-                <a:solidFill>
-                  <a:schemeClr val="tx1"/>
-                </a:solidFill>
-                <a:effectLst/>
-                <a:latin typeface="Arial" panose="020B0604020202020204" pitchFamily="34" charset="0"/>
-              </a:rPr>
-              <a:t> Using LangChain for RAG</a:t>
-            </a:r>
-          </a:p>
-          <a:p>
-            <a:pPr marL="0" marR="0" lvl="0" indent="0" algn="l" defTabSz="914400" rtl="0" eaLnBrk="0" fontAlgn="base" latinLnBrk="0" hangingPunct="0">
-              <a:lnSpc>
-                <a:spcPct val="150000"/>
-              </a:lnSpc>
-              <a:spcBef>
-                <a:spcPct val="0"/>
-              </a:spcBef>
-              <a:spcAft>
-                <a:spcPct val="0"/>
-              </a:spcAft>
-              <a:buClrTx/>
-              <a:buSzTx/>
-              <a:buFontTx/>
-              <a:buChar char="•"/>
-              <a:tabLst/>
-            </a:pPr>
-            <a:r>
-              <a:rPr kumimoji="0" lang="en-US" altLang="en-US" sz="2400" b="0" i="0" u="none" strike="noStrike" cap="none" normalizeH="0" baseline="0" dirty="0">
-                <a:ln>
-                  <a:noFill/>
-                </a:ln>
-                <a:solidFill>
-                  <a:schemeClr val="tx1"/>
-                </a:solidFill>
-                <a:effectLst/>
-                <a:latin typeface="Arial" panose="020B0604020202020204" pitchFamily="34" charset="0"/>
-              </a:rPr>
-              <a:t> Chatting with Data</a:t>
-            </a:r>
-          </a:p>
-        </p:txBody>
-      </p:sp>
-      <p:sp>
-        <p:nvSpPr>
-          <p:cNvPr id="7" name="TextBox 6">
-            <a:extLst>
-              <a:ext uri="{FF2B5EF4-FFF2-40B4-BE49-F238E27FC236}">
-                <a16:creationId xmlns:a16="http://schemas.microsoft.com/office/drawing/2014/main" id="{CE25349C-89FE-4450-9EA4-59939B8D3826}"/>
-              </a:ext>
-            </a:extLst>
-          </p:cNvPr>
-          <p:cNvSpPr txBox="1"/>
-          <p:nvPr/>
-        </p:nvSpPr>
-        <p:spPr>
-          <a:xfrm>
-            <a:off x="5650230" y="6451501"/>
-            <a:ext cx="1021473" cy="369332"/>
-          </a:xfrm>
-          <a:prstGeom prst="rect">
-            <a:avLst/>
-          </a:prstGeom>
-          <a:noFill/>
-        </p:spPr>
-        <p:txBody>
-          <a:bodyPr wrap="square" rtlCol="0">
-            <a:spAutoFit/>
-          </a:bodyPr>
-          <a:lstStyle/>
-          <a:p>
-            <a:pPr algn="ctr"/>
-            <a:r>
-              <a:rPr lang="en-US" dirty="0"/>
-              <a:t>1 of n</a:t>
-            </a:r>
-          </a:p>
-        </p:txBody>
-      </p:sp>
-    </p:spTree>
-    <p:extLst>
-      <p:ext uri="{BB962C8B-B14F-4D97-AF65-F5344CB8AC3E}">
-        <p14:creationId xmlns:p14="http://schemas.microsoft.com/office/powerpoint/2010/main" val="891073715"/>
-      </p:ext>
-    </p:extLst>
-  </p:cSld>
-  <p:clrMapOvr>
-    <a:masterClrMapping/>
-  </p:clrMapOvr>
-</p:sld>
-</file>
-
-<file path=ppt/slides/slide20.xml><?xml version="1.0" encoding="utf-8"?>
-<p:sld xmlns:a="http://schemas.openxmlformats.org/drawingml/2006/main" xmlns:r="http://schemas.openxmlformats.org/officeDocument/2006/relationships" xmlns:p="http://schemas.openxmlformats.org/presentationml/2006/main">
-  <p:cSld>
-    <p:spTree>
-      <p:nvGrpSpPr>
-        <p:cNvPr id="1" name=""/>
-        <p:cNvGrpSpPr/>
-        <p:nvPr/>
-      </p:nvGrpSpPr>
-      <p:grpSpPr>
-        <a:xfrm>
-          <a:off x="0" y="0"/>
-          <a:ext cx="0" cy="0"/>
-          <a:chOff x="0" y="0"/>
-          <a:chExt cx="0" cy="0"/>
-        </a:xfrm>
-      </p:grpSpPr>
-      <p:sp>
-        <p:nvSpPr>
-          <p:cNvPr id="2" name="Title 1">
-            <a:extLst>
-              <a:ext uri="{FF2B5EF4-FFF2-40B4-BE49-F238E27FC236}">
-                <a16:creationId xmlns:a16="http://schemas.microsoft.com/office/drawing/2014/main" id="{496A992F-F5B0-4546-9577-213FDA0B45F9}"/>
-              </a:ext>
-            </a:extLst>
-          </p:cNvPr>
-          <p:cNvSpPr>
-            <a:spLocks noGrp="1"/>
-          </p:cNvSpPr>
-          <p:nvPr>
-            <p:ph type="title"/>
-          </p:nvPr>
-        </p:nvSpPr>
-        <p:spPr/>
-        <p:txBody>
-          <a:bodyPr/>
-          <a:lstStyle/>
-          <a:p>
-            <a:r>
-              <a:rPr lang="fr-FR" b="1" dirty="0"/>
-              <a:t>RAG: </a:t>
-            </a:r>
-            <a:r>
-              <a:rPr lang="fr-FR" b="1" dirty="0" err="1"/>
-              <a:t>Retrieval</a:t>
-            </a:r>
-            <a:endParaRPr lang="en-US" b="1" dirty="0"/>
-          </a:p>
-        </p:txBody>
-      </p:sp>
-      <p:sp>
-        <p:nvSpPr>
-          <p:cNvPr id="3" name="Content Placeholder 2">
-            <a:extLst>
-              <a:ext uri="{FF2B5EF4-FFF2-40B4-BE49-F238E27FC236}">
-                <a16:creationId xmlns:a16="http://schemas.microsoft.com/office/drawing/2014/main" id="{27634627-5020-42B4-8CFD-1B158C53CCAF}"/>
-              </a:ext>
-            </a:extLst>
-          </p:cNvPr>
-          <p:cNvSpPr>
-            <a:spLocks noGrp="1"/>
-          </p:cNvSpPr>
-          <p:nvPr>
-            <p:ph idx="1"/>
-          </p:nvPr>
-        </p:nvSpPr>
-        <p:spPr/>
-        <p:txBody>
-          <a:bodyPr/>
-          <a:lstStyle/>
-          <a:p>
-            <a:endParaRPr lang="en-US" dirty="0"/>
-          </a:p>
-        </p:txBody>
-      </p:sp>
-      <p:sp>
-        <p:nvSpPr>
-          <p:cNvPr id="4" name="TextBox 3">
-            <a:extLst>
-              <a:ext uri="{FF2B5EF4-FFF2-40B4-BE49-F238E27FC236}">
-                <a16:creationId xmlns:a16="http://schemas.microsoft.com/office/drawing/2014/main" id="{9ED3D534-BBDF-481B-B958-084DF4878A72}"/>
-              </a:ext>
-            </a:extLst>
-          </p:cNvPr>
-          <p:cNvSpPr txBox="1"/>
-          <p:nvPr/>
-        </p:nvSpPr>
-        <p:spPr>
-          <a:xfrm>
-            <a:off x="5650230" y="6451501"/>
-            <a:ext cx="1021473" cy="369332"/>
-          </a:xfrm>
-          <a:prstGeom prst="rect">
-            <a:avLst/>
-          </a:prstGeom>
-          <a:noFill/>
-        </p:spPr>
-        <p:txBody>
-          <a:bodyPr wrap="square" rtlCol="0">
-            <a:spAutoFit/>
-          </a:bodyPr>
-          <a:lstStyle/>
-          <a:p>
-            <a:pPr algn="ctr"/>
-            <a:r>
-              <a:rPr lang="en-US" dirty="0"/>
-              <a:t>11 of n</a:t>
-            </a:r>
-          </a:p>
-        </p:txBody>
-      </p:sp>
-    </p:spTree>
-    <p:extLst>
-      <p:ext uri="{BB962C8B-B14F-4D97-AF65-F5344CB8AC3E}">
-        <p14:creationId xmlns:p14="http://schemas.microsoft.com/office/powerpoint/2010/main" val="644614161"/>
-      </p:ext>
-    </p:extLst>
-  </p:cSld>
-  <p:clrMapOvr>
-    <a:masterClrMapping/>
-  </p:clrMapOvr>
-</p:sld>
-</file>
-
 <file path=ppt/slides/slide21.xml><?xml version="1.0" encoding="utf-8"?>
 <p:sld xmlns:a="http://schemas.openxmlformats.org/drawingml/2006/main" xmlns:r="http://schemas.openxmlformats.org/officeDocument/2006/relationships" xmlns:p="http://schemas.openxmlformats.org/presentationml/2006/main">
   <p:cSld>
@@ -7381,15 +7383,11 @@
           <a:p>
             <a:r>
               <a:rPr lang="fr-FR" b="1" dirty="0"/>
-              <a:t>RAG: Chat </a:t>
+              <a:t>RAG: </a:t>
             </a:r>
             <a:r>
               <a:rPr lang="fr-FR" b="1" dirty="0" err="1"/>
-              <a:t>with</a:t>
-            </a:r>
-            <a:r>
-              <a:rPr lang="fr-FR" b="1" dirty="0"/>
-              <a:t> Data</a:t>
+              <a:t>Retrieval</a:t>
             </a:r>
             <a:endParaRPr lang="en-US" b="1" dirty="0"/>
           </a:p>
@@ -7416,7 +7414,124 @@
           <a:bodyPr/>
           <a:lstStyle/>
           <a:p>
+            <a:pPr>
+              <a:buFont typeface="Arial" panose="020B0604020202020204" pitchFamily="34" charset="0"/>
+              <a:buChar char="•"/>
+            </a:pPr>
+            <a:r>
+              <a:rPr lang="en-US" dirty="0"/>
+              <a:t> Retrieval is the centerpiece of our retrieval augmented generation (RAG) flow</a:t>
+            </a:r>
+          </a:p>
+          <a:p>
+            <a:pPr marL="0" indent="0">
+              <a:buNone/>
+            </a:pPr>
             <a:endParaRPr lang="en-US" dirty="0"/>
+          </a:p>
+          <a:p>
+            <a:pPr>
+              <a:buFont typeface="Arial" panose="020B0604020202020204" pitchFamily="34" charset="0"/>
+              <a:buChar char="•"/>
+            </a:pPr>
+            <a:r>
+              <a:rPr lang="en-US" dirty="0"/>
+              <a:t> </a:t>
+            </a:r>
+            <a:r>
+              <a:rPr lang="en-US" dirty="0">
+                <a:solidFill>
+                  <a:schemeClr val="accent3"/>
+                </a:solidFill>
+              </a:rPr>
+              <a:t>Addressing Diversity:</a:t>
+            </a:r>
+            <a:r>
+              <a:rPr lang="en-US" dirty="0"/>
+              <a:t> Maximum marginal relevance (k, </a:t>
+            </a:r>
+            <a:r>
+              <a:rPr lang="en-US" dirty="0" err="1"/>
+              <a:t>fetch_k</a:t>
+            </a:r>
+            <a:r>
+              <a:rPr lang="en-US" dirty="0"/>
+              <a:t>)</a:t>
+            </a:r>
+          </a:p>
+          <a:p>
+            <a:pPr>
+              <a:buFont typeface="Arial" panose="020B0604020202020204" pitchFamily="34" charset="0"/>
+              <a:buChar char="•"/>
+            </a:pPr>
+            <a:r>
+              <a:rPr lang="en-US" dirty="0">
+                <a:solidFill>
+                  <a:schemeClr val="accent3"/>
+                </a:solidFill>
+              </a:rPr>
+              <a:t> Addressing Specificity:</a:t>
+            </a:r>
+            <a:r>
+              <a:rPr lang="en-US" dirty="0"/>
+              <a:t> Working with metadata (Filter)</a:t>
+            </a:r>
+          </a:p>
+          <a:p>
+            <a:pPr>
+              <a:buFont typeface="Arial" panose="020B0604020202020204" pitchFamily="34" charset="0"/>
+              <a:buChar char="•"/>
+            </a:pPr>
+            <a:r>
+              <a:rPr lang="en-US" dirty="0">
+                <a:solidFill>
+                  <a:schemeClr val="accent3"/>
+                </a:solidFill>
+              </a:rPr>
+              <a:t> Addressing Specificity:</a:t>
+            </a:r>
+            <a:r>
+              <a:rPr lang="en-US" dirty="0"/>
+              <a:t> Working with metadata using self-query retriever (</a:t>
+            </a:r>
+            <a:r>
+              <a:rPr lang="en-US" dirty="0" err="1"/>
+              <a:t>SelfQueryRetriever</a:t>
+            </a:r>
+            <a:r>
+              <a:rPr lang="en-US" dirty="0"/>
+              <a:t>)</a:t>
+            </a:r>
+          </a:p>
+          <a:p>
+            <a:pPr>
+              <a:buFont typeface="Arial" panose="020B0604020202020204" pitchFamily="34" charset="0"/>
+              <a:buChar char="•"/>
+            </a:pPr>
+            <a:r>
+              <a:rPr lang="en-US" dirty="0"/>
+              <a:t> </a:t>
+            </a:r>
+            <a:r>
+              <a:rPr lang="en-US" dirty="0">
+                <a:solidFill>
+                  <a:schemeClr val="accent3"/>
+                </a:solidFill>
+              </a:rPr>
+              <a:t>Additional tricks:</a:t>
+            </a:r>
+            <a:r>
+              <a:rPr lang="en-US" dirty="0"/>
+              <a:t> Compression (</a:t>
+            </a:r>
+            <a:r>
+              <a:rPr lang="en-US" dirty="0" err="1"/>
+              <a:t>ContextualCompressionRetriever</a:t>
+            </a:r>
+            <a:r>
+              <a:rPr lang="en-US" dirty="0"/>
+              <a:t>)</a:t>
+            </a:r>
           </a:p>
         </p:txBody>
       </p:sp>
@@ -7451,11 +7566,282 @@
             <a:pPr algn="ctr"/>
             <a:r>
               <a:rPr lang="en-US" dirty="0"/>
+              <a:t>11 of n</a:t>
+            </a:r>
+          </a:p>
+        </p:txBody>
+      </p:sp>
+    </p:spTree>
+    <p:extLst>
+      <p:ext uri="{BB962C8B-B14F-4D97-AF65-F5344CB8AC3E}">
+        <p14:creationId xmlns:p14="http://schemas.microsoft.com/office/powerpoint/2010/main" val="644614161"/>
+      </p:ext>
+    </p:extLst>
+  </p:cSld>
+  <p:clrMapOvr>
+    <a:masterClrMapping/>
+  </p:clrMapOvr>
+</p:sld>
+</file>
+
+<file path=ppt/slides/slide22.xml><?xml version="1.0" encoding="utf-8"?>
+<p:sld xmlns:a="http://schemas.openxmlformats.org/drawingml/2006/main" xmlns:r="http://schemas.openxmlformats.org/officeDocument/2006/relationships" xmlns:p="http://schemas.openxmlformats.org/presentationml/2006/main">
+  <p:cSld>
+    <p:spTree>
+      <p:nvGrpSpPr>
+        <p:cNvPr id="1" name=""/>
+        <p:cNvGrpSpPr/>
+        <p:nvPr/>
+      </p:nvGrpSpPr>
+      <p:grpSpPr>
+        <a:xfrm>
+          <a:off x="0" y="0"/>
+          <a:ext cx="0" cy="0"/>
+          <a:chOff x="0" y="0"/>
+          <a:chExt cx="0" cy="0"/>
+        </a:xfrm>
+      </p:grpSpPr>
+      <p:sp>
+        <p:nvSpPr>
+          <p:cNvPr id="2" name="Title 1">
+            <a:extLst>
+              <a:ext uri="{FF2B5EF4-FFF2-40B4-BE49-F238E27FC236}">
+                <a16:creationId xmlns:a16="http://schemas.microsoft.com/office/drawing/2014/main" id="{496A992F-F5B0-4546-9577-213FDA0B45F9}"/>
+              </a:ext>
+            </a:extLst>
+          </p:cNvPr>
+          <p:cNvSpPr>
+            <a:spLocks noGrp="1"/>
+          </p:cNvSpPr>
+          <p:nvPr>
+            <p:ph type="title"/>
+          </p:nvPr>
+        </p:nvSpPr>
+        <p:spPr/>
+        <p:txBody>
+          <a:bodyPr/>
+          <a:lstStyle/>
+          <a:p>
+            <a:r>
+              <a:rPr lang="fr-FR" b="1" dirty="0"/>
+              <a:t>RAG: Chat </a:t>
+            </a:r>
+            <a:r>
+              <a:rPr lang="fr-FR" b="1" dirty="0" err="1"/>
+              <a:t>with</a:t>
+            </a:r>
+            <a:r>
+              <a:rPr lang="fr-FR" b="1" dirty="0"/>
+              <a:t> Data</a:t>
+            </a:r>
+            <a:endParaRPr lang="en-US" b="1" dirty="0"/>
+          </a:p>
+        </p:txBody>
+      </p:sp>
+      <p:sp>
+        <p:nvSpPr>
+          <p:cNvPr id="3" name="Content Placeholder 2">
+            <a:extLst>
+              <a:ext uri="{FF2B5EF4-FFF2-40B4-BE49-F238E27FC236}">
+                <a16:creationId xmlns:a16="http://schemas.microsoft.com/office/drawing/2014/main" id="{27634627-5020-42B4-8CFD-1B158C53CCAF}"/>
+              </a:ext>
+            </a:extLst>
+          </p:cNvPr>
+          <p:cNvSpPr>
+            <a:spLocks noGrp="1"/>
+          </p:cNvSpPr>
+          <p:nvPr>
+            <p:ph idx="1"/>
+          </p:nvPr>
+        </p:nvSpPr>
+        <p:spPr/>
+        <p:txBody>
+          <a:bodyPr/>
+          <a:lstStyle/>
+          <a:p>
+            <a:pPr>
+              <a:buFont typeface="Arial" panose="020B0604020202020204" pitchFamily="34" charset="0"/>
+              <a:buChar char="•"/>
+            </a:pPr>
+            <a:r>
+              <a:rPr lang="en-US" dirty="0"/>
+              <a:t> </a:t>
+            </a:r>
+            <a:r>
+              <a:rPr lang="en-US" dirty="0" err="1"/>
+              <a:t>RetrievalQA</a:t>
+            </a:r>
+            <a:r>
+              <a:rPr lang="en-US" dirty="0"/>
+              <a:t> chain</a:t>
+            </a:r>
+          </a:p>
+          <a:p>
+            <a:pPr lvl="1">
+              <a:buFont typeface="Arial" panose="020B0604020202020204" pitchFamily="34" charset="0"/>
+              <a:buChar char="•"/>
+            </a:pPr>
+            <a:r>
+              <a:rPr lang="en-US" dirty="0"/>
+              <a:t>Can use </a:t>
+            </a:r>
+            <a:r>
+              <a:rPr lang="en-US" dirty="0" err="1">
+                <a:solidFill>
+                  <a:schemeClr val="accent3"/>
+                </a:solidFill>
+              </a:rPr>
+              <a:t>PromptTemplate</a:t>
+            </a:r>
+            <a:r>
+              <a:rPr lang="en-US" dirty="0"/>
+              <a:t> from </a:t>
+            </a:r>
+            <a:r>
+              <a:rPr lang="en-US" dirty="0" err="1">
+                <a:solidFill>
+                  <a:schemeClr val="accent3"/>
+                </a:solidFill>
+              </a:rPr>
+              <a:t>langchain.prompts</a:t>
+            </a:r>
+            <a:endParaRPr lang="en-US" dirty="0">
+              <a:solidFill>
+                <a:schemeClr val="accent3"/>
+              </a:solidFill>
+            </a:endParaRPr>
+          </a:p>
+          <a:p>
+            <a:pPr lvl="1">
+              <a:buFont typeface="Arial" panose="020B0604020202020204" pitchFamily="34" charset="0"/>
+              <a:buChar char="•"/>
+            </a:pPr>
+            <a:r>
+              <a:rPr lang="en-US" dirty="0">
+                <a:solidFill>
+                  <a:schemeClr val="tx1"/>
+                </a:solidFill>
+              </a:rPr>
+              <a:t>It must be passed to </a:t>
+            </a:r>
+            <a:r>
+              <a:rPr lang="en-US" dirty="0" err="1">
+                <a:solidFill>
+                  <a:schemeClr val="tx1"/>
+                </a:solidFill>
+              </a:rPr>
+              <a:t>RetreivalQA</a:t>
+            </a:r>
+            <a:endParaRPr lang="en-US" dirty="0">
+              <a:solidFill>
+                <a:schemeClr val="tx1"/>
+              </a:solidFill>
+            </a:endParaRPr>
+          </a:p>
+          <a:p>
+            <a:pPr>
+              <a:buFont typeface="Arial" panose="020B0604020202020204" pitchFamily="34" charset="0"/>
+              <a:buChar char="•"/>
+            </a:pPr>
+            <a:endParaRPr lang="en-US" dirty="0"/>
+          </a:p>
+        </p:txBody>
+      </p:sp>
+      <p:sp>
+        <p:nvSpPr>
+          <p:cNvPr id="4" name="TextBox 3">
+            <a:extLst>
+              <a:ext uri="{FF2B5EF4-FFF2-40B4-BE49-F238E27FC236}">
+                <a16:creationId xmlns:a16="http://schemas.microsoft.com/office/drawing/2014/main" id="{9ED3D534-BBDF-481B-B958-084DF4878A72}"/>
+              </a:ext>
+            </a:extLst>
+          </p:cNvPr>
+          <p:cNvSpPr txBox="1"/>
+          <p:nvPr/>
+        </p:nvSpPr>
+        <p:spPr>
+          <a:xfrm>
+            <a:off x="5650230" y="6451501"/>
+            <a:ext cx="1021473" cy="369332"/>
+          </a:xfrm>
+          <a:prstGeom prst="rect">
+            <a:avLst/>
+          </a:prstGeom>
+          <a:noFill/>
+        </p:spPr>
+        <p:txBody>
+          <a:bodyPr wrap="square" rtlCol="0">
+            <a:spAutoFit/>
+          </a:bodyPr>
+          <a:lstStyle/>
+          <a:p>
+            <a:pPr algn="ctr"/>
+            <a:r>
+              <a:rPr lang="en-US" dirty="0"/>
               <a:t>12 of n</a:t>
             </a:r>
           </a:p>
         </p:txBody>
       </p:sp>
+      <p:pic>
+        <p:nvPicPr>
+          <p:cNvPr id="6" name="Picture 5">
+            <a:extLst>
+              <a:ext uri="{FF2B5EF4-FFF2-40B4-BE49-F238E27FC236}">
+                <a16:creationId xmlns:a16="http://schemas.microsoft.com/office/drawing/2014/main" id="{4241600A-005D-4902-B1B8-9EE57B195CF9}"/>
+              </a:ext>
+            </a:extLst>
+          </p:cNvPr>
+          <p:cNvPicPr>
+            <a:picLocks noChangeAspect="1"/>
+          </p:cNvPicPr>
+          <p:nvPr/>
+        </p:nvPicPr>
+        <p:blipFill>
+          <a:blip r:embed="rId2"/>
+          <a:stretch>
+            <a:fillRect/>
+          </a:stretch>
+        </p:blipFill>
+        <p:spPr>
+          <a:xfrm>
+            <a:off x="2252219" y="2995819"/>
+            <a:ext cx="4547885" cy="2981649"/>
+          </a:xfrm>
+          <a:prstGeom prst="rect">
+            <a:avLst/>
+          </a:prstGeom>
+        </p:spPr>
+      </p:pic>
+      <p:pic>
+        <p:nvPicPr>
+          <p:cNvPr id="7" name="Picture 6">
+            <a:extLst>
+              <a:ext uri="{FF2B5EF4-FFF2-40B4-BE49-F238E27FC236}">
+                <a16:creationId xmlns:a16="http://schemas.microsoft.com/office/drawing/2014/main" id="{2BA2135D-7548-47B6-8690-DC02A13A0A31}"/>
+              </a:ext>
+            </a:extLst>
+          </p:cNvPr>
+          <p:cNvPicPr>
+            <a:picLocks noChangeAspect="1"/>
+          </p:cNvPicPr>
+          <p:nvPr/>
+        </p:nvPicPr>
+        <p:blipFill rotWithShape="1">
+          <a:blip r:embed="rId3"/>
+          <a:srcRect l="25052" t="25333" r="48938" b="8591"/>
+          <a:stretch/>
+        </p:blipFill>
+        <p:spPr>
+          <a:xfrm>
+            <a:off x="8531258" y="1974450"/>
+            <a:ext cx="2827413" cy="4040245"/>
+          </a:xfrm>
+          <a:prstGeom prst="rect">
+            <a:avLst/>
+          </a:prstGeom>
+        </p:spPr>
+      </p:pic>
     </p:spTree>
     <p:extLst>
       <p:ext uri="{BB962C8B-B14F-4D97-AF65-F5344CB8AC3E}">
@@ -7469,7 +7855,208 @@
 </p:sld>
 </file>
 
-<file path=ppt/slides/slide22.xml><?xml version="1.0" encoding="utf-8"?>
+<file path=ppt/slides/slide23.xml><?xml version="1.0" encoding="utf-8"?>
+<p:sld xmlns:a="http://schemas.openxmlformats.org/drawingml/2006/main" xmlns:r="http://schemas.openxmlformats.org/officeDocument/2006/relationships" xmlns:p="http://schemas.openxmlformats.org/presentationml/2006/main">
+  <p:cSld>
+    <p:spTree>
+      <p:nvGrpSpPr>
+        <p:cNvPr id="1" name=""/>
+        <p:cNvGrpSpPr/>
+        <p:nvPr/>
+      </p:nvGrpSpPr>
+      <p:grpSpPr>
+        <a:xfrm>
+          <a:off x="0" y="0"/>
+          <a:ext cx="0" cy="0"/>
+          <a:chOff x="0" y="0"/>
+          <a:chExt cx="0" cy="0"/>
+        </a:xfrm>
+      </p:grpSpPr>
+      <p:sp>
+        <p:nvSpPr>
+          <p:cNvPr id="2" name="Title 1">
+            <a:extLst>
+              <a:ext uri="{FF2B5EF4-FFF2-40B4-BE49-F238E27FC236}">
+                <a16:creationId xmlns:a16="http://schemas.microsoft.com/office/drawing/2014/main" id="{FECE94B4-9FCD-4936-AB10-429B513473E6}"/>
+              </a:ext>
+            </a:extLst>
+          </p:cNvPr>
+          <p:cNvSpPr>
+            <a:spLocks noGrp="1"/>
+          </p:cNvSpPr>
+          <p:nvPr>
+            <p:ph type="title"/>
+          </p:nvPr>
+        </p:nvSpPr>
+        <p:spPr/>
+        <p:txBody>
+          <a:bodyPr/>
+          <a:lstStyle/>
+          <a:p>
+            <a:r>
+              <a:rPr lang="fr-FR" b="1" dirty="0"/>
+              <a:t>RAG: Chat </a:t>
+            </a:r>
+            <a:r>
+              <a:rPr lang="fr-FR" b="1" dirty="0" err="1"/>
+              <a:t>with</a:t>
+            </a:r>
+            <a:r>
+              <a:rPr lang="fr-FR" b="1" dirty="0"/>
+              <a:t> Data</a:t>
+            </a:r>
+            <a:endParaRPr lang="en-US" dirty="0"/>
+          </a:p>
+        </p:txBody>
+      </p:sp>
+      <p:sp>
+        <p:nvSpPr>
+          <p:cNvPr id="3" name="Content Placeholder 2">
+            <a:extLst>
+              <a:ext uri="{FF2B5EF4-FFF2-40B4-BE49-F238E27FC236}">
+                <a16:creationId xmlns:a16="http://schemas.microsoft.com/office/drawing/2014/main" id="{7271CD0D-ED05-4AB8-819D-63620E717487}"/>
+              </a:ext>
+            </a:extLst>
+          </p:cNvPr>
+          <p:cNvSpPr>
+            <a:spLocks noGrp="1"/>
+          </p:cNvSpPr>
+          <p:nvPr>
+            <p:ph idx="1"/>
+          </p:nvPr>
+        </p:nvSpPr>
+        <p:spPr/>
+        <p:txBody>
+          <a:bodyPr/>
+          <a:lstStyle/>
+          <a:p>
+            <a:pPr>
+              <a:buFont typeface="Arial" panose="020B0604020202020204" pitchFamily="34" charset="0"/>
+              <a:buChar char="•"/>
+            </a:pPr>
+            <a:r>
+              <a:rPr lang="en-US" sz="2400" dirty="0"/>
+              <a:t> Methods to resolve short context issues:</a:t>
+            </a:r>
+          </a:p>
+          <a:p>
+            <a:pPr>
+              <a:buFont typeface="Arial" panose="020B0604020202020204" pitchFamily="34" charset="0"/>
+              <a:buChar char="•"/>
+            </a:pPr>
+            <a:endParaRPr lang="en-US" sz="700" dirty="0"/>
+          </a:p>
+          <a:p>
+            <a:pPr lvl="1">
+              <a:buFont typeface="Arial" panose="020B0604020202020204" pitchFamily="34" charset="0"/>
+              <a:buChar char="•"/>
+            </a:pPr>
+            <a:r>
+              <a:rPr lang="en-US" dirty="0"/>
+              <a:t>Map Reduce</a:t>
+            </a:r>
+          </a:p>
+          <a:p>
+            <a:pPr marL="201168" lvl="1" indent="0">
+              <a:buNone/>
+            </a:pPr>
+            <a:endParaRPr lang="en-US" dirty="0"/>
+          </a:p>
+          <a:p>
+            <a:pPr lvl="1">
+              <a:buFont typeface="Arial" panose="020B0604020202020204" pitchFamily="34" charset="0"/>
+              <a:buChar char="•"/>
+            </a:pPr>
+            <a:r>
+              <a:rPr lang="en-US" dirty="0"/>
+              <a:t>Refine</a:t>
+            </a:r>
+          </a:p>
+          <a:p>
+            <a:pPr marL="201168" lvl="1" indent="0">
+              <a:buNone/>
+            </a:pPr>
+            <a:endParaRPr lang="en-US" dirty="0"/>
+          </a:p>
+          <a:p>
+            <a:pPr lvl="1">
+              <a:buFont typeface="Arial" panose="020B0604020202020204" pitchFamily="34" charset="0"/>
+              <a:buChar char="•"/>
+            </a:pPr>
+            <a:r>
+              <a:rPr lang="en-US" dirty="0"/>
+              <a:t>Map Re-rank</a:t>
+            </a:r>
+          </a:p>
+          <a:p>
+            <a:endParaRPr lang="en-US" dirty="0"/>
+          </a:p>
+          <a:p>
+            <a:endParaRPr lang="en-US" dirty="0"/>
+          </a:p>
+        </p:txBody>
+      </p:sp>
+      <p:pic>
+        <p:nvPicPr>
+          <p:cNvPr id="1026" name="Picture 2" descr="Speak to your Data using LangChain and LLMs | by Hamza El Fergougui | Medium">
+            <a:extLst>
+              <a:ext uri="{FF2B5EF4-FFF2-40B4-BE49-F238E27FC236}">
+                <a16:creationId xmlns:a16="http://schemas.microsoft.com/office/drawing/2014/main" id="{F5B15231-04E7-477E-9AA5-59D4693B948B}"/>
+              </a:ext>
+            </a:extLst>
+          </p:cNvPr>
+          <p:cNvPicPr>
+            <a:picLocks noChangeAspect="1" noChangeArrowheads="1"/>
+          </p:cNvPicPr>
+          <p:nvPr/>
+        </p:nvPicPr>
+        <p:blipFill>
+          <a:blip r:embed="rId2">
+            <a:extLst>
+              <a:ext uri="{28A0092B-C50C-407E-A947-70E740481C1C}">
+                <a14:useLocalDpi xmlns:a14="http://schemas.microsoft.com/office/drawing/2010/main" val="0"/>
+              </a:ext>
+            </a:extLst>
+          </a:blip>
+          <a:srcRect/>
+          <a:stretch>
+            <a:fillRect/>
+          </a:stretch>
+        </p:blipFill>
+        <p:spPr bwMode="auto">
+          <a:xfrm>
+            <a:off x="6897868" y="1845734"/>
+            <a:ext cx="4681822" cy="4458878"/>
+          </a:xfrm>
+          <a:prstGeom prst="rect">
+            <a:avLst/>
+          </a:prstGeom>
+          <a:noFill/>
+          <a:extLst>
+            <a:ext uri="{909E8E84-426E-40DD-AFC4-6F175D3DCCD1}">
+              <a14:hiddenFill xmlns:a14="http://schemas.microsoft.com/office/drawing/2010/main">
+                <a:solidFill>
+                  <a:srgbClr val="FFFFFF"/>
+                </a:solidFill>
+              </a14:hiddenFill>
+            </a:ext>
+          </a:extLst>
+        </p:spPr>
+      </p:pic>
+    </p:spTree>
+    <p:extLst>
+      <p:ext uri="{BB962C8B-B14F-4D97-AF65-F5344CB8AC3E}">
+        <p14:creationId xmlns:p14="http://schemas.microsoft.com/office/powerpoint/2010/main" val="2742942880"/>
+      </p:ext>
+    </p:extLst>
+  </p:cSld>
+  <p:clrMapOvr>
+    <a:masterClrMapping/>
+  </p:clrMapOvr>
+</p:sld>
+</file>
+
+<file path=ppt/slides/slide24.xml><?xml version="1.0" encoding="utf-8"?>
 <p:sld xmlns:a="http://schemas.openxmlformats.org/drawingml/2006/main" xmlns:r="http://schemas.openxmlformats.org/officeDocument/2006/relationships" xmlns:p="http://schemas.openxmlformats.org/presentationml/2006/main">
   <p:cSld>
     <p:spTree>
@@ -8160,7 +8747,10 @@
               <a:rPr lang="en-US" dirty="0" err="1"/>
               <a:t>ConversationBufferWindowMemory</a:t>
             </a:r>
-            <a:endParaRPr lang="en-US" dirty="0"/>
+            <a:r>
+              <a:rPr lang="en-US" dirty="0"/>
+              <a:t> (k)</a:t>
+            </a:r>
           </a:p>
           <a:p>
             <a:pPr lvl="1">
@@ -8189,6 +8779,28 @@
             <a:r>
               <a:rPr lang="en-US" dirty="0" err="1"/>
               <a:t>ConversationSummaryMemory</a:t>
+            </a:r>
+            <a:endParaRPr lang="en-US" dirty="0"/>
+          </a:p>
+          <a:p>
+            <a:pPr lvl="2">
+              <a:buFont typeface="Arial" panose="020B0604020202020204" pitchFamily="34" charset="0"/>
+              <a:buChar char="•"/>
+            </a:pPr>
+            <a:r>
+              <a:rPr lang="en-US" dirty="0" err="1"/>
+              <a:t>llm</a:t>
+            </a:r>
+            <a:endParaRPr lang="en-US" dirty="0"/>
+          </a:p>
+          <a:p>
+            <a:pPr lvl="2">
+              <a:buFont typeface="Arial" panose="020B0604020202020204" pitchFamily="34" charset="0"/>
+              <a:buChar char="•"/>
+            </a:pPr>
+            <a:r>
+              <a:rPr lang="en-US" dirty="0" err="1"/>
+              <a:t>max_token_limit</a:t>
             </a:r>
             <a:endParaRPr lang="en-US" dirty="0"/>
           </a:p>
@@ -8344,6 +8956,10 @@
               <a:buChar char="•"/>
             </a:pPr>
             <a:r>
+              <a:rPr lang="en-US" dirty="0"/>
+              <a:t> </a:t>
+            </a:r>
+            <a:r>
               <a:rPr lang="en-US" dirty="0" err="1"/>
               <a:t>LLMChain</a:t>
             </a:r>
@@ -8363,7 +8979,7 @@
             </a:pPr>
             <a:r>
               <a:rPr lang="en-US" dirty="0"/>
-              <a:t>Sequential Chains</a:t>
+              <a:t> Sequential Chains</a:t>
             </a:r>
           </a:p>
           <a:p>
@@ -8410,7 +9026,7 @@
             </a:pPr>
             <a:r>
               <a:rPr lang="en-US" dirty="0"/>
-              <a:t>Router Chain</a:t>
+              <a:t> Router Chain</a:t>
             </a:r>
           </a:p>
         </p:txBody>
@@ -8451,6 +9067,144 @@
           </a:p>
         </p:txBody>
       </p:sp>
+      <p:pic>
+        <p:nvPicPr>
+          <p:cNvPr id="6" name="Picture 5">
+            <a:extLst>
+              <a:ext uri="{FF2B5EF4-FFF2-40B4-BE49-F238E27FC236}">
+                <a16:creationId xmlns:a16="http://schemas.microsoft.com/office/drawing/2014/main" id="{DD8A96A8-D877-45A3-AD65-52901A2433F6}"/>
+              </a:ext>
+            </a:extLst>
+          </p:cNvPr>
+          <p:cNvPicPr>
+            <a:picLocks noChangeAspect="1"/>
+          </p:cNvPicPr>
+          <p:nvPr/>
+        </p:nvPicPr>
+        <p:blipFill rotWithShape="1">
+          <a:blip r:embed="rId2"/>
+          <a:srcRect l="25129" t="35327" r="25309" b="38694"/>
+          <a:stretch/>
+        </p:blipFill>
+        <p:spPr>
+          <a:xfrm>
+            <a:off x="5246016" y="1795568"/>
+            <a:ext cx="6042582" cy="1781666"/>
+          </a:xfrm>
+          <a:prstGeom prst="rect">
+            <a:avLst/>
+          </a:prstGeom>
+        </p:spPr>
+      </p:pic>
+      <p:pic>
+        <p:nvPicPr>
+          <p:cNvPr id="8" name="Picture 7">
+            <a:extLst>
+              <a:ext uri="{FF2B5EF4-FFF2-40B4-BE49-F238E27FC236}">
+                <a16:creationId xmlns:a16="http://schemas.microsoft.com/office/drawing/2014/main" id="{563AE89F-C642-4CAA-823E-CF9162929EB8}"/>
+              </a:ext>
+            </a:extLst>
+          </p:cNvPr>
+          <p:cNvPicPr>
+            <a:picLocks noChangeAspect="1"/>
+          </p:cNvPicPr>
+          <p:nvPr/>
+        </p:nvPicPr>
+        <p:blipFill rotWithShape="1">
+          <a:blip r:embed="rId3"/>
+          <a:srcRect l="25361" t="35326" r="25077" b="27148"/>
+          <a:stretch/>
+        </p:blipFill>
+        <p:spPr>
+          <a:xfrm>
+            <a:off x="5246016" y="3685608"/>
+            <a:ext cx="6042582" cy="2573517"/>
+          </a:xfrm>
+          <a:prstGeom prst="rect">
+            <a:avLst/>
+          </a:prstGeom>
+        </p:spPr>
+      </p:pic>
+      <p:cxnSp>
+        <p:nvCxnSpPr>
+          <p:cNvPr id="10" name="Straight Arrow Connector 9">
+            <a:extLst>
+              <a:ext uri="{FF2B5EF4-FFF2-40B4-BE49-F238E27FC236}">
+                <a16:creationId xmlns:a16="http://schemas.microsoft.com/office/drawing/2014/main" id="{AA483700-0343-4491-ADB3-89724936FC2A}"/>
+              </a:ext>
+            </a:extLst>
+          </p:cNvPr>
+          <p:cNvCxnSpPr/>
+          <p:nvPr/>
+        </p:nvCxnSpPr>
+        <p:spPr>
+          <a:xfrm flipV="1">
+            <a:off x="3827282" y="2545237"/>
+            <a:ext cx="1102937" cy="461914"/>
+          </a:xfrm>
+          <a:prstGeom prst="straightConnector1">
+            <a:avLst/>
+          </a:prstGeom>
+          <a:ln>
+            <a:tailEnd type="triangle"/>
+          </a:ln>
+        </p:spPr>
+        <p:style>
+          <a:lnRef idx="1">
+            <a:schemeClr val="accent1"/>
+          </a:lnRef>
+          <a:fillRef idx="0">
+            <a:schemeClr val="accent1"/>
+          </a:fillRef>
+          <a:effectRef idx="0">
+            <a:schemeClr val="accent1"/>
+          </a:effectRef>
+          <a:fontRef idx="minor">
+            <a:schemeClr val="tx1"/>
+          </a:fontRef>
+        </p:style>
+      </p:cxnSp>
+      <p:cxnSp>
+        <p:nvCxnSpPr>
+          <p:cNvPr id="13" name="Straight Arrow Connector 12">
+            <a:extLst>
+              <a:ext uri="{FF2B5EF4-FFF2-40B4-BE49-F238E27FC236}">
+                <a16:creationId xmlns:a16="http://schemas.microsoft.com/office/drawing/2014/main" id="{8235B503-77DF-45FF-BB9C-92AFF5F89B94}"/>
+              </a:ext>
+            </a:extLst>
+          </p:cNvPr>
+          <p:cNvCxnSpPr>
+            <a:cxnSpLocks/>
+          </p:cNvCxnSpPr>
+          <p:nvPr/>
+        </p:nvCxnSpPr>
+        <p:spPr>
+          <a:xfrm>
+            <a:off x="3346986" y="3409641"/>
+            <a:ext cx="1583233" cy="1011530"/>
+          </a:xfrm>
+          <a:prstGeom prst="straightConnector1">
+            <a:avLst/>
+          </a:prstGeom>
+          <a:ln>
+            <a:tailEnd type="triangle"/>
+          </a:ln>
+        </p:spPr>
+        <p:style>
+          <a:lnRef idx="1">
+            <a:schemeClr val="accent1"/>
+          </a:lnRef>
+          <a:fillRef idx="0">
+            <a:schemeClr val="accent1"/>
+          </a:fillRef>
+          <a:effectRef idx="0">
+            <a:schemeClr val="accent1"/>
+          </a:effectRef>
+          <a:fontRef idx="minor">
+            <a:schemeClr val="tx1"/>
+          </a:fontRef>
+        </p:style>
+      </p:cxnSp>
     </p:spTree>
     <p:extLst>
       <p:ext uri="{BB962C8B-B14F-4D97-AF65-F5344CB8AC3E}">
@@ -8503,42 +9257,113 @@
           <a:lstStyle/>
           <a:p>
             <a:r>
-              <a:rPr lang="fr-FR" b="1" dirty="0"/>
-              <a:t>LangChain: Q&amp;A over Documents</a:t>
-            </a:r>
-            <a:endParaRPr lang="en-US" b="1" dirty="0"/>
-          </a:p>
-        </p:txBody>
-      </p:sp>
-      <p:pic>
-        <p:nvPicPr>
-          <p:cNvPr id="6" name="Content Placeholder 5">
+              <a:rPr lang="en-US" b="1" dirty="0"/>
+              <a:t>LangChain: Chains</a:t>
+            </a:r>
+          </a:p>
+        </p:txBody>
+      </p:sp>
+      <p:sp>
+        <p:nvSpPr>
+          <p:cNvPr id="3" name="Content Placeholder 2">
             <a:extLst>
               <a:ext uri="{FF2B5EF4-FFF2-40B4-BE49-F238E27FC236}">
-                <a16:creationId xmlns:a16="http://schemas.microsoft.com/office/drawing/2014/main" id="{4DDE3E10-FEC4-4890-A560-453DD34D6CBE}"/>
+                <a16:creationId xmlns:a16="http://schemas.microsoft.com/office/drawing/2014/main" id="{27634627-5020-42B4-8CFD-1B158C53CCAF}"/>
               </a:ext>
             </a:extLst>
           </p:cNvPr>
-          <p:cNvPicPr>
-            <a:picLocks noGrp="1" noChangeAspect="1"/>
-          </p:cNvPicPr>
+          <p:cNvSpPr>
+            <a:spLocks noGrp="1"/>
+          </p:cNvSpPr>
           <p:nvPr>
             <p:ph idx="1"/>
           </p:nvPr>
-        </p:nvPicPr>
-        <p:blipFill>
-          <a:blip r:embed="rId2"/>
-          <a:stretch>
-            <a:fillRect/>
-          </a:stretch>
-        </p:blipFill>
-        <p:spPr>
-          <a:xfrm>
-            <a:off x="2006494" y="1788160"/>
-            <a:ext cx="4154472" cy="4516830"/>
-          </a:xfrm>
-        </p:spPr>
-      </p:pic>
+        </p:nvSpPr>
+        <p:spPr/>
+        <p:txBody>
+          <a:bodyPr/>
+          <a:lstStyle/>
+          <a:p>
+            <a:pPr>
+              <a:buFont typeface="Arial" panose="020B0604020202020204" pitchFamily="34" charset="0"/>
+              <a:buChar char="•"/>
+            </a:pPr>
+            <a:r>
+              <a:rPr lang="en-US" dirty="0"/>
+              <a:t> </a:t>
+            </a:r>
+            <a:r>
+              <a:rPr lang="en-US" dirty="0" err="1"/>
+              <a:t>LLMChain</a:t>
+            </a:r>
+            <a:endParaRPr lang="en-US" dirty="0"/>
+          </a:p>
+          <a:p>
+            <a:pPr>
+              <a:buFont typeface="Arial" panose="020B0604020202020204" pitchFamily="34" charset="0"/>
+              <a:buChar char="•"/>
+            </a:pPr>
+            <a:endParaRPr lang="en-US" sz="400" dirty="0"/>
+          </a:p>
+          <a:p>
+            <a:pPr>
+              <a:buFont typeface="Arial" panose="020B0604020202020204" pitchFamily="34" charset="0"/>
+              <a:buChar char="•"/>
+            </a:pPr>
+            <a:r>
+              <a:rPr lang="en-US" dirty="0"/>
+              <a:t> Sequential Chains</a:t>
+            </a:r>
+          </a:p>
+          <a:p>
+            <a:pPr lvl="1">
+              <a:buFont typeface="Arial" panose="020B0604020202020204" pitchFamily="34" charset="0"/>
+              <a:buChar char="•"/>
+            </a:pPr>
+            <a:r>
+              <a:rPr lang="en-US" dirty="0"/>
+              <a:t>  </a:t>
+            </a:r>
+            <a:r>
+              <a:rPr lang="en-US" dirty="0" err="1"/>
+              <a:t>SimpleSequentialChain</a:t>
+            </a:r>
+            <a:endParaRPr lang="en-US" dirty="0"/>
+          </a:p>
+          <a:p>
+            <a:pPr lvl="1">
+              <a:buFont typeface="Arial" panose="020B0604020202020204" pitchFamily="34" charset="0"/>
+              <a:buChar char="•"/>
+            </a:pPr>
+            <a:r>
+              <a:rPr lang="en-US" dirty="0"/>
+              <a:t>  </a:t>
+            </a:r>
+            <a:r>
+              <a:rPr lang="en-US" dirty="0" err="1"/>
+              <a:t>SequentialChain</a:t>
+            </a:r>
+            <a:endParaRPr lang="en-US" dirty="0"/>
+          </a:p>
+          <a:p>
+            <a:pPr lvl="1">
+              <a:buFont typeface="Arial" panose="020B0604020202020204" pitchFamily="34" charset="0"/>
+              <a:buChar char="•"/>
+            </a:pPr>
+            <a:endParaRPr lang="en-US" sz="900" dirty="0"/>
+          </a:p>
+          <a:p>
+            <a:pPr>
+              <a:buFont typeface="Arial" panose="020B0604020202020204" pitchFamily="34" charset="0"/>
+              <a:buChar char="•"/>
+            </a:pPr>
+            <a:r>
+              <a:rPr lang="en-US" dirty="0"/>
+              <a:t> Router Chain</a:t>
+            </a:r>
+          </a:p>
+        </p:txBody>
+      </p:sp>
       <p:sp>
         <p:nvSpPr>
           <p:cNvPr id="4" name="TextBox 3">
@@ -8570,15 +9395,83 @@
             <a:pPr algn="ctr"/>
             <a:r>
               <a:rPr lang="en-US" dirty="0"/>
-              <a:t>5 of n</a:t>
-            </a:r>
-          </a:p>
-        </p:txBody>
-      </p:sp>
+              <a:t>4 of n</a:t>
+            </a:r>
+          </a:p>
+        </p:txBody>
+      </p:sp>
+      <p:pic>
+        <p:nvPicPr>
+          <p:cNvPr id="7" name="Picture 6">
+            <a:extLst>
+              <a:ext uri="{FF2B5EF4-FFF2-40B4-BE49-F238E27FC236}">
+                <a16:creationId xmlns:a16="http://schemas.microsoft.com/office/drawing/2014/main" id="{F2454F26-F5B2-4261-8F9C-A2228EDAE8A6}"/>
+              </a:ext>
+            </a:extLst>
+          </p:cNvPr>
+          <p:cNvPicPr>
+            <a:picLocks noChangeAspect="1"/>
+          </p:cNvPicPr>
+          <p:nvPr/>
+        </p:nvPicPr>
+        <p:blipFill rotWithShape="1">
+          <a:blip r:embed="rId2"/>
+          <a:srcRect l="25283" t="33827" r="25232" b="31820"/>
+          <a:stretch/>
+        </p:blipFill>
+        <p:spPr>
+          <a:xfrm>
+            <a:off x="5429838" y="2470596"/>
+            <a:ext cx="6033155" cy="2355928"/>
+          </a:xfrm>
+          <a:prstGeom prst="rect">
+            <a:avLst/>
+          </a:prstGeom>
+        </p:spPr>
+      </p:pic>
+      <p:cxnSp>
+        <p:nvCxnSpPr>
+          <p:cNvPr id="11" name="Straight Arrow Connector 10">
+            <a:extLst>
+              <a:ext uri="{FF2B5EF4-FFF2-40B4-BE49-F238E27FC236}">
+                <a16:creationId xmlns:a16="http://schemas.microsoft.com/office/drawing/2014/main" id="{102810CF-B1D9-4E42-BB80-7858BEB2ABCC}"/>
+              </a:ext>
+            </a:extLst>
+          </p:cNvPr>
+          <p:cNvCxnSpPr/>
+          <p:nvPr/>
+        </p:nvCxnSpPr>
+        <p:spPr>
+          <a:xfrm>
+            <a:off x="2837468" y="3987538"/>
+            <a:ext cx="2309567" cy="0"/>
+          </a:xfrm>
+          <a:prstGeom prst="straightConnector1">
+            <a:avLst/>
+          </a:prstGeom>
+          <a:ln>
+            <a:tailEnd type="triangle"/>
+          </a:ln>
+        </p:spPr>
+        <p:style>
+          <a:lnRef idx="1">
+            <a:schemeClr val="accent1"/>
+          </a:lnRef>
+          <a:fillRef idx="0">
+            <a:schemeClr val="accent1"/>
+          </a:fillRef>
+          <a:effectRef idx="0">
+            <a:schemeClr val="accent1"/>
+          </a:effectRef>
+          <a:fontRef idx="minor">
+            <a:schemeClr val="tx1"/>
+          </a:fontRef>
+        </p:style>
+      </p:cxnSp>
     </p:spTree>
     <p:extLst>
       <p:ext uri="{BB962C8B-B14F-4D97-AF65-F5344CB8AC3E}">
-        <p14:creationId xmlns:p14="http://schemas.microsoft.com/office/powerpoint/2010/main" val="3095798474"/>
+        <p14:creationId xmlns:p14="http://schemas.microsoft.com/office/powerpoint/2010/main" val="1165689143"/>
       </p:ext>
     </p:extLst>
   </p:cSld>

</xml_diff>

<commit_message>
Fixed pages of slides
</commit_message>
<xml_diff>
--- a/Presentation/Slides/Presentation.pptx
+++ b/Presentation/Slides/Presentation.pptx
@@ -4362,7 +4362,7 @@
         </p:nvSpPr>
         <p:spPr>
           <a:xfrm>
-            <a:off x="1028431" y="2516072"/>
+            <a:off x="1028430" y="2638621"/>
             <a:ext cx="10135134" cy="1435232"/>
           </a:xfrm>
         </p:spPr>
@@ -4374,14 +4374,14 @@
           <a:p>
             <a:pPr algn="ctr"/>
             <a:r>
-              <a:rPr lang="en-US" sz="4800" b="1" dirty="0">
+              <a:rPr lang="en-US" sz="6000" b="1" dirty="0">
                 <a:solidFill>
                   <a:schemeClr val="accent1"/>
                 </a:solidFill>
                 <a:latin typeface="+mn-lt"/>
                 <a:cs typeface="_PDMS_Saleem_QuranFont" panose="02010000000000000000" pitchFamily="2" charset="-78"/>
               </a:rPr>
-              <a:t>Introduction to LangChain Framework </a:t>
+              <a:t>LangChain Framework </a:t>
             </a:r>
           </a:p>
         </p:txBody>
@@ -4588,10 +4588,10 @@
       </p:pic>
       <p:sp>
         <p:nvSpPr>
-          <p:cNvPr id="4" name="TextBox 3">
+          <p:cNvPr id="5" name="TextBox 4">
             <a:extLst>
               <a:ext uri="{FF2B5EF4-FFF2-40B4-BE49-F238E27FC236}">
-                <a16:creationId xmlns:a16="http://schemas.microsoft.com/office/drawing/2014/main" id="{9ED3D534-BBDF-481B-B958-084DF4878A72}"/>
+                <a16:creationId xmlns:a16="http://schemas.microsoft.com/office/drawing/2014/main" id="{317DD72B-9F47-4EE7-AEF3-32DD4976D1F9}"/>
               </a:ext>
             </a:extLst>
           </p:cNvPr>
@@ -4617,7 +4617,7 @@
             <a:pPr algn="ctr"/>
             <a:r>
               <a:rPr lang="en-US" dirty="0"/>
-              <a:t>5 of n</a:t>
+              <a:t>9 of 22</a:t>
             </a:r>
           </a:p>
         </p:txBody>
@@ -4765,10 +4765,10 @@
       </p:sp>
       <p:sp>
         <p:nvSpPr>
-          <p:cNvPr id="4" name="TextBox 3">
+          <p:cNvPr id="5" name="TextBox 4">
             <a:extLst>
               <a:ext uri="{FF2B5EF4-FFF2-40B4-BE49-F238E27FC236}">
-                <a16:creationId xmlns:a16="http://schemas.microsoft.com/office/drawing/2014/main" id="{9ED3D534-BBDF-481B-B958-084DF4878A72}"/>
+                <a16:creationId xmlns:a16="http://schemas.microsoft.com/office/drawing/2014/main" id="{730FE59D-37B1-48FF-B9F6-90705D70FB4F}"/>
               </a:ext>
             </a:extLst>
           </p:cNvPr>
@@ -4794,7 +4794,7 @@
             <a:pPr algn="ctr"/>
             <a:r>
               <a:rPr lang="en-US" dirty="0"/>
-              <a:t>6 of n</a:t>
+              <a:t>10 of 22</a:t>
             </a:r>
           </a:p>
         </p:txBody>
@@ -4960,42 +4960,6 @@
           </a:p>
         </p:txBody>
       </p:sp>
-      <p:sp>
-        <p:nvSpPr>
-          <p:cNvPr id="4" name="TextBox 3">
-            <a:extLst>
-              <a:ext uri="{FF2B5EF4-FFF2-40B4-BE49-F238E27FC236}">
-                <a16:creationId xmlns:a16="http://schemas.microsoft.com/office/drawing/2014/main" id="{9ED3D534-BBDF-481B-B958-084DF4878A72}"/>
-              </a:ext>
-            </a:extLst>
-          </p:cNvPr>
-          <p:cNvSpPr txBox="1"/>
-          <p:nvPr/>
-        </p:nvSpPr>
-        <p:spPr>
-          <a:xfrm>
-            <a:off x="5650230" y="6451501"/>
-            <a:ext cx="1021473" cy="369332"/>
-          </a:xfrm>
-          <a:prstGeom prst="rect">
-            <a:avLst/>
-          </a:prstGeom>
-          <a:noFill/>
-        </p:spPr>
-        <p:txBody>
-          <a:bodyPr wrap="square" rtlCol="0">
-            <a:spAutoFit/>
-          </a:bodyPr>
-          <a:lstStyle/>
-          <a:p>
-            <a:pPr algn="ctr"/>
-            <a:r>
-              <a:rPr lang="en-US" dirty="0"/>
-              <a:t>6 of n</a:t>
-            </a:r>
-          </a:p>
-        </p:txBody>
-      </p:sp>
       <p:pic>
         <p:nvPicPr>
           <p:cNvPr id="6" name="Picture 5">
@@ -5026,6 +4990,42 @@
           </a:prstGeom>
         </p:spPr>
       </p:pic>
+      <p:sp>
+        <p:nvSpPr>
+          <p:cNvPr id="7" name="TextBox 6">
+            <a:extLst>
+              <a:ext uri="{FF2B5EF4-FFF2-40B4-BE49-F238E27FC236}">
+                <a16:creationId xmlns:a16="http://schemas.microsoft.com/office/drawing/2014/main" id="{649F9F7F-FB55-4684-9B1A-6FAE523D8741}"/>
+              </a:ext>
+            </a:extLst>
+          </p:cNvPr>
+          <p:cNvSpPr txBox="1"/>
+          <p:nvPr/>
+        </p:nvSpPr>
+        <p:spPr>
+          <a:xfrm>
+            <a:off x="5650230" y="6451501"/>
+            <a:ext cx="1021473" cy="369332"/>
+          </a:xfrm>
+          <a:prstGeom prst="rect">
+            <a:avLst/>
+          </a:prstGeom>
+          <a:noFill/>
+        </p:spPr>
+        <p:txBody>
+          <a:bodyPr wrap="square" rtlCol="0">
+            <a:spAutoFit/>
+          </a:bodyPr>
+          <a:lstStyle/>
+          <a:p>
+            <a:pPr algn="ctr"/>
+            <a:r>
+              <a:rPr lang="en-US" dirty="0"/>
+              <a:t>11 of 22</a:t>
+            </a:r>
+          </a:p>
+        </p:txBody>
+      </p:sp>
     </p:spTree>
     <p:extLst>
       <p:ext uri="{BB962C8B-B14F-4D97-AF65-F5344CB8AC3E}">
@@ -5263,10 +5263,10 @@
       </p:sp>
       <p:sp>
         <p:nvSpPr>
-          <p:cNvPr id="4" name="TextBox 3">
+          <p:cNvPr id="5" name="TextBox 4">
             <a:extLst>
               <a:ext uri="{FF2B5EF4-FFF2-40B4-BE49-F238E27FC236}">
-                <a16:creationId xmlns:a16="http://schemas.microsoft.com/office/drawing/2014/main" id="{9ED3D534-BBDF-481B-B958-084DF4878A72}"/>
+                <a16:creationId xmlns:a16="http://schemas.microsoft.com/office/drawing/2014/main" id="{8698B105-031C-4C5E-B871-0EFD6015AC97}"/>
               </a:ext>
             </a:extLst>
           </p:cNvPr>
@@ -5292,7 +5292,7 @@
             <a:pPr algn="ctr"/>
             <a:r>
               <a:rPr lang="en-US" dirty="0"/>
-              <a:t>7 of n</a:t>
+              <a:t>12 of 22</a:t>
             </a:r>
           </a:p>
         </p:txBody>
@@ -5384,6 +5384,42 @@
           </a:xfrm>
         </p:spPr>
       </p:pic>
+      <p:sp>
+        <p:nvSpPr>
+          <p:cNvPr id="4" name="TextBox 3">
+            <a:extLst>
+              <a:ext uri="{FF2B5EF4-FFF2-40B4-BE49-F238E27FC236}">
+                <a16:creationId xmlns:a16="http://schemas.microsoft.com/office/drawing/2014/main" id="{3F250BF9-DE70-454B-90EC-F913A3B3548E}"/>
+              </a:ext>
+            </a:extLst>
+          </p:cNvPr>
+          <p:cNvSpPr txBox="1"/>
+          <p:nvPr/>
+        </p:nvSpPr>
+        <p:spPr>
+          <a:xfrm>
+            <a:off x="5650230" y="6451501"/>
+            <a:ext cx="1021473" cy="369332"/>
+          </a:xfrm>
+          <a:prstGeom prst="rect">
+            <a:avLst/>
+          </a:prstGeom>
+          <a:noFill/>
+        </p:spPr>
+        <p:txBody>
+          <a:bodyPr wrap="square" rtlCol="0">
+            <a:spAutoFit/>
+          </a:bodyPr>
+          <a:lstStyle/>
+          <a:p>
+            <a:pPr algn="ctr"/>
+            <a:r>
+              <a:rPr lang="en-US" dirty="0"/>
+              <a:t>13 of 22</a:t>
+            </a:r>
+          </a:p>
+        </p:txBody>
+      </p:sp>
     </p:spTree>
     <p:extLst>
       <p:ext uri="{BB962C8B-B14F-4D97-AF65-F5344CB8AC3E}">
@@ -5554,42 +5590,6 @@
               <a:buChar char="•"/>
             </a:pPr>
             <a:endParaRPr lang="en-US" dirty="0"/>
-          </a:p>
-        </p:txBody>
-      </p:sp>
-      <p:sp>
-        <p:nvSpPr>
-          <p:cNvPr id="4" name="TextBox 3">
-            <a:extLst>
-              <a:ext uri="{FF2B5EF4-FFF2-40B4-BE49-F238E27FC236}">
-                <a16:creationId xmlns:a16="http://schemas.microsoft.com/office/drawing/2014/main" id="{9ED3D534-BBDF-481B-B958-084DF4878A72}"/>
-              </a:ext>
-            </a:extLst>
-          </p:cNvPr>
-          <p:cNvSpPr txBox="1"/>
-          <p:nvPr/>
-        </p:nvSpPr>
-        <p:spPr>
-          <a:xfrm>
-            <a:off x="5650230" y="6451501"/>
-            <a:ext cx="1021473" cy="369332"/>
-          </a:xfrm>
-          <a:prstGeom prst="rect">
-            <a:avLst/>
-          </a:prstGeom>
-          <a:noFill/>
-        </p:spPr>
-        <p:txBody>
-          <a:bodyPr wrap="square" rtlCol="0">
-            <a:spAutoFit/>
-          </a:bodyPr>
-          <a:lstStyle/>
-          <a:p>
-            <a:pPr algn="ctr"/>
-            <a:r>
-              <a:rPr lang="en-US" dirty="0"/>
-              <a:t>8 of n</a:t>
-            </a:r>
           </a:p>
         </p:txBody>
       </p:sp>
@@ -5653,6 +5653,42 @@
           </a:prstGeom>
         </p:spPr>
       </p:pic>
+      <p:sp>
+        <p:nvSpPr>
+          <p:cNvPr id="7" name="TextBox 6">
+            <a:extLst>
+              <a:ext uri="{FF2B5EF4-FFF2-40B4-BE49-F238E27FC236}">
+                <a16:creationId xmlns:a16="http://schemas.microsoft.com/office/drawing/2014/main" id="{A891877A-8BBE-43B4-B0CF-55B5F6E3C5A3}"/>
+              </a:ext>
+            </a:extLst>
+          </p:cNvPr>
+          <p:cNvSpPr txBox="1"/>
+          <p:nvPr/>
+        </p:nvSpPr>
+        <p:spPr>
+          <a:xfrm>
+            <a:off x="5650230" y="6451501"/>
+            <a:ext cx="1021473" cy="369332"/>
+          </a:xfrm>
+          <a:prstGeom prst="rect">
+            <a:avLst/>
+          </a:prstGeom>
+          <a:noFill/>
+        </p:spPr>
+        <p:txBody>
+          <a:bodyPr wrap="square" rtlCol="0">
+            <a:spAutoFit/>
+          </a:bodyPr>
+          <a:lstStyle/>
+          <a:p>
+            <a:pPr algn="ctr"/>
+            <a:r>
+              <a:rPr lang="en-US" dirty="0"/>
+              <a:t>14 of 22</a:t>
+            </a:r>
+          </a:p>
+        </p:txBody>
+      </p:sp>
     </p:spTree>
     <p:extLst>
       <p:ext uri="{BB962C8B-B14F-4D97-AF65-F5344CB8AC3E}">
@@ -5813,42 +5849,6 @@
               <a:buChar char="•"/>
             </a:pPr>
             <a:endParaRPr lang="en-US" dirty="0"/>
-          </a:p>
-        </p:txBody>
-      </p:sp>
-      <p:sp>
-        <p:nvSpPr>
-          <p:cNvPr id="4" name="TextBox 3">
-            <a:extLst>
-              <a:ext uri="{FF2B5EF4-FFF2-40B4-BE49-F238E27FC236}">
-                <a16:creationId xmlns:a16="http://schemas.microsoft.com/office/drawing/2014/main" id="{9ED3D534-BBDF-481B-B958-084DF4878A72}"/>
-              </a:ext>
-            </a:extLst>
-          </p:cNvPr>
-          <p:cNvSpPr txBox="1"/>
-          <p:nvPr/>
-        </p:nvSpPr>
-        <p:spPr>
-          <a:xfrm>
-            <a:off x="5650230" y="6451501"/>
-            <a:ext cx="1021473" cy="369332"/>
-          </a:xfrm>
-          <a:prstGeom prst="rect">
-            <a:avLst/>
-          </a:prstGeom>
-          <a:noFill/>
-        </p:spPr>
-        <p:txBody>
-          <a:bodyPr wrap="square" rtlCol="0">
-            <a:spAutoFit/>
-          </a:bodyPr>
-          <a:lstStyle/>
-          <a:p>
-            <a:pPr algn="ctr"/>
-            <a:r>
-              <a:rPr lang="en-US" dirty="0"/>
-              <a:t>8 of n</a:t>
-            </a:r>
           </a:p>
         </p:txBody>
       </p:sp>
@@ -5912,6 +5912,42 @@
           </a:prstGeom>
         </p:spPr>
       </p:pic>
+      <p:sp>
+        <p:nvSpPr>
+          <p:cNvPr id="8" name="TextBox 7">
+            <a:extLst>
+              <a:ext uri="{FF2B5EF4-FFF2-40B4-BE49-F238E27FC236}">
+                <a16:creationId xmlns:a16="http://schemas.microsoft.com/office/drawing/2014/main" id="{97CA6DCE-11B7-45E9-8C31-0985FB378554}"/>
+              </a:ext>
+            </a:extLst>
+          </p:cNvPr>
+          <p:cNvSpPr txBox="1"/>
+          <p:nvPr/>
+        </p:nvSpPr>
+        <p:spPr>
+          <a:xfrm>
+            <a:off x="5650230" y="6451501"/>
+            <a:ext cx="1021473" cy="369332"/>
+          </a:xfrm>
+          <a:prstGeom prst="rect">
+            <a:avLst/>
+          </a:prstGeom>
+          <a:noFill/>
+        </p:spPr>
+        <p:txBody>
+          <a:bodyPr wrap="square" rtlCol="0">
+            <a:spAutoFit/>
+          </a:bodyPr>
+          <a:lstStyle/>
+          <a:p>
+            <a:pPr algn="ctr"/>
+            <a:r>
+              <a:rPr lang="en-US" dirty="0"/>
+              <a:t>15 of 22</a:t>
+            </a:r>
+          </a:p>
+        </p:txBody>
+      </p:sp>
     </p:spTree>
     <p:extLst>
       <p:ext uri="{BB962C8B-B14F-4D97-AF65-F5344CB8AC3E}">
@@ -6059,42 +6095,6 @@
           </a:p>
         </p:txBody>
       </p:sp>
-      <p:sp>
-        <p:nvSpPr>
-          <p:cNvPr id="4" name="TextBox 3">
-            <a:extLst>
-              <a:ext uri="{FF2B5EF4-FFF2-40B4-BE49-F238E27FC236}">
-                <a16:creationId xmlns:a16="http://schemas.microsoft.com/office/drawing/2014/main" id="{9ED3D534-BBDF-481B-B958-084DF4878A72}"/>
-              </a:ext>
-            </a:extLst>
-          </p:cNvPr>
-          <p:cNvSpPr txBox="1"/>
-          <p:nvPr/>
-        </p:nvSpPr>
-        <p:spPr>
-          <a:xfrm>
-            <a:off x="5650230" y="6451501"/>
-            <a:ext cx="1021473" cy="369332"/>
-          </a:xfrm>
-          <a:prstGeom prst="rect">
-            <a:avLst/>
-          </a:prstGeom>
-          <a:noFill/>
-        </p:spPr>
-        <p:txBody>
-          <a:bodyPr wrap="square" rtlCol="0">
-            <a:spAutoFit/>
-          </a:bodyPr>
-          <a:lstStyle/>
-          <a:p>
-            <a:pPr algn="ctr"/>
-            <a:r>
-              <a:rPr lang="en-US" dirty="0"/>
-              <a:t>9 of n</a:t>
-            </a:r>
-          </a:p>
-        </p:txBody>
-      </p:sp>
       <p:pic>
         <p:nvPicPr>
           <p:cNvPr id="8" name="Picture 7">
@@ -6125,6 +6125,42 @@
           </a:prstGeom>
         </p:spPr>
       </p:pic>
+      <p:sp>
+        <p:nvSpPr>
+          <p:cNvPr id="6" name="TextBox 5">
+            <a:extLst>
+              <a:ext uri="{FF2B5EF4-FFF2-40B4-BE49-F238E27FC236}">
+                <a16:creationId xmlns:a16="http://schemas.microsoft.com/office/drawing/2014/main" id="{0DFB4CCB-3989-4CC4-B7F7-0A7DE42F5471}"/>
+              </a:ext>
+            </a:extLst>
+          </p:cNvPr>
+          <p:cNvSpPr txBox="1"/>
+          <p:nvPr/>
+        </p:nvSpPr>
+        <p:spPr>
+          <a:xfrm>
+            <a:off x="5650230" y="6451501"/>
+            <a:ext cx="1021473" cy="369332"/>
+          </a:xfrm>
+          <a:prstGeom prst="rect">
+            <a:avLst/>
+          </a:prstGeom>
+          <a:noFill/>
+        </p:spPr>
+        <p:txBody>
+          <a:bodyPr wrap="square" rtlCol="0">
+            <a:spAutoFit/>
+          </a:bodyPr>
+          <a:lstStyle/>
+          <a:p>
+            <a:pPr algn="ctr"/>
+            <a:r>
+              <a:rPr lang="en-US" dirty="0"/>
+              <a:t>16 of 22</a:t>
+            </a:r>
+          </a:p>
+        </p:txBody>
+      </p:sp>
     </p:spTree>
     <p:extLst>
       <p:ext uri="{BB962C8B-B14F-4D97-AF65-F5344CB8AC3E}">
@@ -6563,10 +6599,10 @@
       </p:sp>
       <p:sp>
         <p:nvSpPr>
-          <p:cNvPr id="4" name="TextBox 3">
+          <p:cNvPr id="5" name="TextBox 4">
             <a:extLst>
               <a:ext uri="{FF2B5EF4-FFF2-40B4-BE49-F238E27FC236}">
-                <a16:creationId xmlns:a16="http://schemas.microsoft.com/office/drawing/2014/main" id="{9ED3D534-BBDF-481B-B958-084DF4878A72}"/>
+                <a16:creationId xmlns:a16="http://schemas.microsoft.com/office/drawing/2014/main" id="{4D61187A-FB42-4403-B65F-FCD7FF41EDE2}"/>
               </a:ext>
             </a:extLst>
           </p:cNvPr>
@@ -6592,7 +6628,7 @@
             <a:pPr algn="ctr"/>
             <a:r>
               <a:rPr lang="en-US" dirty="0"/>
-              <a:t>9 of n</a:t>
+              <a:t>17 of 22</a:t>
             </a:r>
           </a:p>
         </p:txBody>
@@ -6717,42 +6753,6 @@
           </a:p>
         </p:txBody>
       </p:sp>
-      <p:sp>
-        <p:nvSpPr>
-          <p:cNvPr id="4" name="TextBox 3">
-            <a:extLst>
-              <a:ext uri="{FF2B5EF4-FFF2-40B4-BE49-F238E27FC236}">
-                <a16:creationId xmlns:a16="http://schemas.microsoft.com/office/drawing/2014/main" id="{9ED3D534-BBDF-481B-B958-084DF4878A72}"/>
-              </a:ext>
-            </a:extLst>
-          </p:cNvPr>
-          <p:cNvSpPr txBox="1"/>
-          <p:nvPr/>
-        </p:nvSpPr>
-        <p:spPr>
-          <a:xfrm>
-            <a:off x="5650230" y="6451501"/>
-            <a:ext cx="1021473" cy="369332"/>
-          </a:xfrm>
-          <a:prstGeom prst="rect">
-            <a:avLst/>
-          </a:prstGeom>
-          <a:noFill/>
-        </p:spPr>
-        <p:txBody>
-          <a:bodyPr wrap="square" rtlCol="0">
-            <a:spAutoFit/>
-          </a:bodyPr>
-          <a:lstStyle/>
-          <a:p>
-            <a:pPr algn="ctr"/>
-            <a:r>
-              <a:rPr lang="en-US" dirty="0"/>
-              <a:t>10 of n</a:t>
-            </a:r>
-          </a:p>
-        </p:txBody>
-      </p:sp>
       <p:pic>
         <p:nvPicPr>
           <p:cNvPr id="10" name="Picture 9">
@@ -6783,6 +6783,42 @@
           </a:prstGeom>
         </p:spPr>
       </p:pic>
+      <p:sp>
+        <p:nvSpPr>
+          <p:cNvPr id="6" name="TextBox 5">
+            <a:extLst>
+              <a:ext uri="{FF2B5EF4-FFF2-40B4-BE49-F238E27FC236}">
+                <a16:creationId xmlns:a16="http://schemas.microsoft.com/office/drawing/2014/main" id="{F0B48737-370C-4ACD-A851-45B37B3CDB74}"/>
+              </a:ext>
+            </a:extLst>
+          </p:cNvPr>
+          <p:cNvSpPr txBox="1"/>
+          <p:nvPr/>
+        </p:nvSpPr>
+        <p:spPr>
+          <a:xfrm>
+            <a:off x="5650230" y="6451501"/>
+            <a:ext cx="1021473" cy="369332"/>
+          </a:xfrm>
+          <a:prstGeom prst="rect">
+            <a:avLst/>
+          </a:prstGeom>
+          <a:noFill/>
+        </p:spPr>
+        <p:txBody>
+          <a:bodyPr wrap="square" rtlCol="0">
+            <a:spAutoFit/>
+          </a:bodyPr>
+          <a:lstStyle/>
+          <a:p>
+            <a:pPr algn="ctr"/>
+            <a:r>
+              <a:rPr lang="en-US" dirty="0"/>
+              <a:t>18 of 22</a:t>
+            </a:r>
+          </a:p>
+        </p:txBody>
+      </p:sp>
     </p:spTree>
     <p:extLst>
       <p:ext uri="{BB962C8B-B14F-4D97-AF65-F5344CB8AC3E}">
@@ -7068,7 +7104,7 @@
             <a:pPr algn="ctr"/>
             <a:r>
               <a:rPr lang="en-US" dirty="0"/>
-              <a:t>1 of n</a:t>
+              <a:t>1 of 22</a:t>
             </a:r>
           </a:p>
         </p:txBody>
@@ -7264,42 +7300,6 @@
           </a:p>
         </p:txBody>
       </p:sp>
-      <p:sp>
-        <p:nvSpPr>
-          <p:cNvPr id="4" name="TextBox 3">
-            <a:extLst>
-              <a:ext uri="{FF2B5EF4-FFF2-40B4-BE49-F238E27FC236}">
-                <a16:creationId xmlns:a16="http://schemas.microsoft.com/office/drawing/2014/main" id="{9ED3D534-BBDF-481B-B958-084DF4878A72}"/>
-              </a:ext>
-            </a:extLst>
-          </p:cNvPr>
-          <p:cNvSpPr txBox="1"/>
-          <p:nvPr/>
-        </p:nvSpPr>
-        <p:spPr>
-          <a:xfrm>
-            <a:off x="5650230" y="6451501"/>
-            <a:ext cx="1021473" cy="369332"/>
-          </a:xfrm>
-          <a:prstGeom prst="rect">
-            <a:avLst/>
-          </a:prstGeom>
-          <a:noFill/>
-        </p:spPr>
-        <p:txBody>
-          <a:bodyPr wrap="square" rtlCol="0">
-            <a:spAutoFit/>
-          </a:bodyPr>
-          <a:lstStyle/>
-          <a:p>
-            <a:pPr algn="ctr"/>
-            <a:r>
-              <a:rPr lang="en-US" dirty="0"/>
-              <a:t>10 of n</a:t>
-            </a:r>
-          </a:p>
-        </p:txBody>
-      </p:sp>
       <p:pic>
         <p:nvPicPr>
           <p:cNvPr id="6" name="Picture 5">
@@ -7330,6 +7330,42 @@
           </a:prstGeom>
         </p:spPr>
       </p:pic>
+      <p:sp>
+        <p:nvSpPr>
+          <p:cNvPr id="7" name="TextBox 6">
+            <a:extLst>
+              <a:ext uri="{FF2B5EF4-FFF2-40B4-BE49-F238E27FC236}">
+                <a16:creationId xmlns:a16="http://schemas.microsoft.com/office/drawing/2014/main" id="{BDBD49ED-79AF-450B-B791-15437651E7FB}"/>
+              </a:ext>
+            </a:extLst>
+          </p:cNvPr>
+          <p:cNvSpPr txBox="1"/>
+          <p:nvPr/>
+        </p:nvSpPr>
+        <p:spPr>
+          <a:xfrm>
+            <a:off x="5650230" y="6451501"/>
+            <a:ext cx="1021473" cy="369332"/>
+          </a:xfrm>
+          <a:prstGeom prst="rect">
+            <a:avLst/>
+          </a:prstGeom>
+          <a:noFill/>
+        </p:spPr>
+        <p:txBody>
+          <a:bodyPr wrap="square" rtlCol="0">
+            <a:spAutoFit/>
+          </a:bodyPr>
+          <a:lstStyle/>
+          <a:p>
+            <a:pPr algn="ctr"/>
+            <a:r>
+              <a:rPr lang="en-US" dirty="0"/>
+              <a:t>19 of 22</a:t>
+            </a:r>
+          </a:p>
+        </p:txBody>
+      </p:sp>
     </p:spTree>
     <p:extLst>
       <p:ext uri="{BB962C8B-B14F-4D97-AF65-F5344CB8AC3E}">
@@ -7537,10 +7573,10 @@
       </p:sp>
       <p:sp>
         <p:nvSpPr>
-          <p:cNvPr id="4" name="TextBox 3">
+          <p:cNvPr id="5" name="TextBox 4">
             <a:extLst>
               <a:ext uri="{FF2B5EF4-FFF2-40B4-BE49-F238E27FC236}">
-                <a16:creationId xmlns:a16="http://schemas.microsoft.com/office/drawing/2014/main" id="{9ED3D534-BBDF-481B-B958-084DF4878A72}"/>
+                <a16:creationId xmlns:a16="http://schemas.microsoft.com/office/drawing/2014/main" id="{BD1E0D0B-7312-4A48-AB82-0BA7B0BBD446}"/>
               </a:ext>
             </a:extLst>
           </p:cNvPr>
@@ -7566,7 +7602,7 @@
             <a:pPr algn="ctr"/>
             <a:r>
               <a:rPr lang="en-US" dirty="0"/>
-              <a:t>11 of n</a:t>
+              <a:t>20 of 22</a:t>
             </a:r>
           </a:p>
         </p:txBody>
@@ -7744,42 +7780,6 @@
               <a:buChar char="•"/>
             </a:pPr>
             <a:endParaRPr lang="en-US" dirty="0"/>
-          </a:p>
-        </p:txBody>
-      </p:sp>
-      <p:sp>
-        <p:nvSpPr>
-          <p:cNvPr id="4" name="TextBox 3">
-            <a:extLst>
-              <a:ext uri="{FF2B5EF4-FFF2-40B4-BE49-F238E27FC236}">
-                <a16:creationId xmlns:a16="http://schemas.microsoft.com/office/drawing/2014/main" id="{9ED3D534-BBDF-481B-B958-084DF4878A72}"/>
-              </a:ext>
-            </a:extLst>
-          </p:cNvPr>
-          <p:cNvSpPr txBox="1"/>
-          <p:nvPr/>
-        </p:nvSpPr>
-        <p:spPr>
-          <a:xfrm>
-            <a:off x="5650230" y="6451501"/>
-            <a:ext cx="1021473" cy="369332"/>
-          </a:xfrm>
-          <a:prstGeom prst="rect">
-            <a:avLst/>
-          </a:prstGeom>
-          <a:noFill/>
-        </p:spPr>
-        <p:txBody>
-          <a:bodyPr wrap="square" rtlCol="0">
-            <a:spAutoFit/>
-          </a:bodyPr>
-          <a:lstStyle/>
-          <a:p>
-            <a:pPr algn="ctr"/>
-            <a:r>
-              <a:rPr lang="en-US" dirty="0"/>
-              <a:t>12 of n</a:t>
-            </a:r>
           </a:p>
         </p:txBody>
       </p:sp>
@@ -7842,6 +7842,42 @@
           </a:prstGeom>
         </p:spPr>
       </p:pic>
+      <p:sp>
+        <p:nvSpPr>
+          <p:cNvPr id="8" name="TextBox 7">
+            <a:extLst>
+              <a:ext uri="{FF2B5EF4-FFF2-40B4-BE49-F238E27FC236}">
+                <a16:creationId xmlns:a16="http://schemas.microsoft.com/office/drawing/2014/main" id="{7A4E2F12-46E8-445A-8B00-E80601109A50}"/>
+              </a:ext>
+            </a:extLst>
+          </p:cNvPr>
+          <p:cNvSpPr txBox="1"/>
+          <p:nvPr/>
+        </p:nvSpPr>
+        <p:spPr>
+          <a:xfrm>
+            <a:off x="5650230" y="6451501"/>
+            <a:ext cx="1021473" cy="369332"/>
+          </a:xfrm>
+          <a:prstGeom prst="rect">
+            <a:avLst/>
+          </a:prstGeom>
+          <a:noFill/>
+        </p:spPr>
+        <p:txBody>
+          <a:bodyPr wrap="square" rtlCol="0">
+            <a:spAutoFit/>
+          </a:bodyPr>
+          <a:lstStyle/>
+          <a:p>
+            <a:pPr algn="ctr"/>
+            <a:r>
+              <a:rPr lang="en-US" dirty="0"/>
+              <a:t>21 of 22</a:t>
+            </a:r>
+          </a:p>
+        </p:txBody>
+      </p:sp>
     </p:spTree>
     <p:extLst>
       <p:ext uri="{BB962C8B-B14F-4D97-AF65-F5344CB8AC3E}">
@@ -8043,6 +8079,42 @@
           </a:extLst>
         </p:spPr>
       </p:pic>
+      <p:sp>
+        <p:nvSpPr>
+          <p:cNvPr id="5" name="TextBox 4">
+            <a:extLst>
+              <a:ext uri="{FF2B5EF4-FFF2-40B4-BE49-F238E27FC236}">
+                <a16:creationId xmlns:a16="http://schemas.microsoft.com/office/drawing/2014/main" id="{CB91944C-E09A-4398-8B39-73CA5ACAE45E}"/>
+              </a:ext>
+            </a:extLst>
+          </p:cNvPr>
+          <p:cNvSpPr txBox="1"/>
+          <p:nvPr/>
+        </p:nvSpPr>
+        <p:spPr>
+          <a:xfrm>
+            <a:off x="5650230" y="6451501"/>
+            <a:ext cx="1021473" cy="369332"/>
+          </a:xfrm>
+          <a:prstGeom prst="rect">
+            <a:avLst/>
+          </a:prstGeom>
+          <a:noFill/>
+        </p:spPr>
+        <p:txBody>
+          <a:bodyPr wrap="square" rtlCol="0">
+            <a:spAutoFit/>
+          </a:bodyPr>
+          <a:lstStyle/>
+          <a:p>
+            <a:pPr algn="ctr"/>
+            <a:r>
+              <a:rPr lang="en-US" dirty="0"/>
+              <a:t>22 of 22</a:t>
+            </a:r>
+          </a:p>
+        </p:txBody>
+      </p:sp>
     </p:spTree>
     <p:extLst>
       <p:ext uri="{BB962C8B-B14F-4D97-AF65-F5344CB8AC3E}">
@@ -8302,7 +8374,7 @@
             <a:pPr algn="ctr"/>
             <a:r>
               <a:rPr lang="en-US" dirty="0"/>
-              <a:t>2 of n</a:t>
+              <a:t>2 of 22</a:t>
             </a:r>
           </a:p>
         </p:txBody>
@@ -8401,6 +8473,42 @@
           </a:prstGeom>
         </p:spPr>
       </p:pic>
+      <p:sp>
+        <p:nvSpPr>
+          <p:cNvPr id="5" name="TextBox 4">
+            <a:extLst>
+              <a:ext uri="{FF2B5EF4-FFF2-40B4-BE49-F238E27FC236}">
+                <a16:creationId xmlns:a16="http://schemas.microsoft.com/office/drawing/2014/main" id="{88B69195-D5C6-47C2-AC3A-F62BC6E55035}"/>
+              </a:ext>
+            </a:extLst>
+          </p:cNvPr>
+          <p:cNvSpPr txBox="1"/>
+          <p:nvPr/>
+        </p:nvSpPr>
+        <p:spPr>
+          <a:xfrm>
+            <a:off x="5650230" y="6451501"/>
+            <a:ext cx="1021473" cy="369332"/>
+          </a:xfrm>
+          <a:prstGeom prst="rect">
+            <a:avLst/>
+          </a:prstGeom>
+          <a:noFill/>
+        </p:spPr>
+        <p:txBody>
+          <a:bodyPr wrap="square" rtlCol="0">
+            <a:spAutoFit/>
+          </a:bodyPr>
+          <a:lstStyle/>
+          <a:p>
+            <a:pPr algn="ctr"/>
+            <a:r>
+              <a:rPr lang="en-US" dirty="0"/>
+              <a:t>3 of 22</a:t>
+            </a:r>
+          </a:p>
+        </p:txBody>
+      </p:sp>
     </p:spTree>
     <p:extLst>
       <p:ext uri="{BB962C8B-B14F-4D97-AF65-F5344CB8AC3E}">
@@ -8493,6 +8601,42 @@
           </a:xfrm>
         </p:spPr>
       </p:pic>
+      <p:sp>
+        <p:nvSpPr>
+          <p:cNvPr id="4" name="TextBox 3">
+            <a:extLst>
+              <a:ext uri="{FF2B5EF4-FFF2-40B4-BE49-F238E27FC236}">
+                <a16:creationId xmlns:a16="http://schemas.microsoft.com/office/drawing/2014/main" id="{D164CBEA-6704-4AF8-9F74-D75BD57229CD}"/>
+              </a:ext>
+            </a:extLst>
+          </p:cNvPr>
+          <p:cNvSpPr txBox="1"/>
+          <p:nvPr/>
+        </p:nvSpPr>
+        <p:spPr>
+          <a:xfrm>
+            <a:off x="5650230" y="6451501"/>
+            <a:ext cx="1021473" cy="369332"/>
+          </a:xfrm>
+          <a:prstGeom prst="rect">
+            <a:avLst/>
+          </a:prstGeom>
+          <a:noFill/>
+        </p:spPr>
+        <p:txBody>
+          <a:bodyPr wrap="square" rtlCol="0">
+            <a:spAutoFit/>
+          </a:bodyPr>
+          <a:lstStyle/>
+          <a:p>
+            <a:pPr algn="ctr"/>
+            <a:r>
+              <a:rPr lang="en-US" dirty="0"/>
+              <a:t>4 of 22</a:t>
+            </a:r>
+          </a:p>
+        </p:txBody>
+      </p:sp>
     </p:spTree>
     <p:extLst>
       <p:ext uri="{BB962C8B-B14F-4D97-AF65-F5344CB8AC3E}">
@@ -8584,6 +8728,42 @@
           </a:xfrm>
         </p:spPr>
       </p:pic>
+      <p:sp>
+        <p:nvSpPr>
+          <p:cNvPr id="4" name="TextBox 3">
+            <a:extLst>
+              <a:ext uri="{FF2B5EF4-FFF2-40B4-BE49-F238E27FC236}">
+                <a16:creationId xmlns:a16="http://schemas.microsoft.com/office/drawing/2014/main" id="{D6ED833C-3A87-41BF-BE1A-505F4A8073F4}"/>
+              </a:ext>
+            </a:extLst>
+          </p:cNvPr>
+          <p:cNvSpPr txBox="1"/>
+          <p:nvPr/>
+        </p:nvSpPr>
+        <p:spPr>
+          <a:xfrm>
+            <a:off x="5650230" y="6451501"/>
+            <a:ext cx="1021473" cy="369332"/>
+          </a:xfrm>
+          <a:prstGeom prst="rect">
+            <a:avLst/>
+          </a:prstGeom>
+          <a:noFill/>
+        </p:spPr>
+        <p:txBody>
+          <a:bodyPr wrap="square" rtlCol="0">
+            <a:spAutoFit/>
+          </a:bodyPr>
+          <a:lstStyle/>
+          <a:p>
+            <a:pPr algn="ctr"/>
+            <a:r>
+              <a:rPr lang="en-US" dirty="0"/>
+              <a:t>5 of 22</a:t>
+            </a:r>
+          </a:p>
+        </p:txBody>
+      </p:sp>
     </p:spTree>
     <p:extLst>
       <p:ext uri="{BB962C8B-B14F-4D97-AF65-F5344CB8AC3E}">
@@ -8806,42 +8986,6 @@
           </a:p>
         </p:txBody>
       </p:sp>
-      <p:sp>
-        <p:nvSpPr>
-          <p:cNvPr id="4" name="TextBox 3">
-            <a:extLst>
-              <a:ext uri="{FF2B5EF4-FFF2-40B4-BE49-F238E27FC236}">
-                <a16:creationId xmlns:a16="http://schemas.microsoft.com/office/drawing/2014/main" id="{9ED3D534-BBDF-481B-B958-084DF4878A72}"/>
-              </a:ext>
-            </a:extLst>
-          </p:cNvPr>
-          <p:cNvSpPr txBox="1"/>
-          <p:nvPr/>
-        </p:nvSpPr>
-        <p:spPr>
-          <a:xfrm>
-            <a:off x="5650230" y="6451501"/>
-            <a:ext cx="1021473" cy="369332"/>
-          </a:xfrm>
-          <a:prstGeom prst="rect">
-            <a:avLst/>
-          </a:prstGeom>
-          <a:noFill/>
-        </p:spPr>
-        <p:txBody>
-          <a:bodyPr wrap="square" rtlCol="0">
-            <a:spAutoFit/>
-          </a:bodyPr>
-          <a:lstStyle/>
-          <a:p>
-            <a:pPr algn="ctr"/>
-            <a:r>
-              <a:rPr lang="en-US" dirty="0"/>
-              <a:t>3 of n</a:t>
-            </a:r>
-          </a:p>
-        </p:txBody>
-      </p:sp>
       <p:pic>
         <p:nvPicPr>
           <p:cNvPr id="8" name="Picture 7">
@@ -8872,6 +9016,42 @@
           </a:prstGeom>
         </p:spPr>
       </p:pic>
+      <p:sp>
+        <p:nvSpPr>
+          <p:cNvPr id="7" name="TextBox 6">
+            <a:extLst>
+              <a:ext uri="{FF2B5EF4-FFF2-40B4-BE49-F238E27FC236}">
+                <a16:creationId xmlns:a16="http://schemas.microsoft.com/office/drawing/2014/main" id="{46FEB2CF-7B45-476F-892F-DDCCC6D89380}"/>
+              </a:ext>
+            </a:extLst>
+          </p:cNvPr>
+          <p:cNvSpPr txBox="1"/>
+          <p:nvPr/>
+        </p:nvSpPr>
+        <p:spPr>
+          <a:xfrm>
+            <a:off x="5650230" y="6451501"/>
+            <a:ext cx="1021473" cy="369332"/>
+          </a:xfrm>
+          <a:prstGeom prst="rect">
+            <a:avLst/>
+          </a:prstGeom>
+          <a:noFill/>
+        </p:spPr>
+        <p:txBody>
+          <a:bodyPr wrap="square" rtlCol="0">
+            <a:spAutoFit/>
+          </a:bodyPr>
+          <a:lstStyle/>
+          <a:p>
+            <a:pPr algn="ctr"/>
+            <a:r>
+              <a:rPr lang="en-US" dirty="0"/>
+              <a:t>6 of 22</a:t>
+            </a:r>
+          </a:p>
+        </p:txBody>
+      </p:sp>
     </p:spTree>
     <p:extLst>
       <p:ext uri="{BB962C8B-B14F-4D97-AF65-F5344CB8AC3E}">
@@ -9027,42 +9207,6 @@
             <a:r>
               <a:rPr lang="en-US" dirty="0"/>
               <a:t> Router Chain</a:t>
-            </a:r>
-          </a:p>
-        </p:txBody>
-      </p:sp>
-      <p:sp>
-        <p:nvSpPr>
-          <p:cNvPr id="4" name="TextBox 3">
-            <a:extLst>
-              <a:ext uri="{FF2B5EF4-FFF2-40B4-BE49-F238E27FC236}">
-                <a16:creationId xmlns:a16="http://schemas.microsoft.com/office/drawing/2014/main" id="{9ED3D534-BBDF-481B-B958-084DF4878A72}"/>
-              </a:ext>
-            </a:extLst>
-          </p:cNvPr>
-          <p:cNvSpPr txBox="1"/>
-          <p:nvPr/>
-        </p:nvSpPr>
-        <p:spPr>
-          <a:xfrm>
-            <a:off x="5650230" y="6451501"/>
-            <a:ext cx="1021473" cy="369332"/>
-          </a:xfrm>
-          <a:prstGeom prst="rect">
-            <a:avLst/>
-          </a:prstGeom>
-          <a:noFill/>
-        </p:spPr>
-        <p:txBody>
-          <a:bodyPr wrap="square" rtlCol="0">
-            <a:spAutoFit/>
-          </a:bodyPr>
-          <a:lstStyle/>
-          <a:p>
-            <a:pPr algn="ctr"/>
-            <a:r>
-              <a:rPr lang="en-US" dirty="0"/>
-              <a:t>4 of n</a:t>
             </a:r>
           </a:p>
         </p:txBody>
@@ -9205,6 +9349,42 @@
           </a:fontRef>
         </p:style>
       </p:cxnSp>
+      <p:sp>
+        <p:nvSpPr>
+          <p:cNvPr id="9" name="TextBox 8">
+            <a:extLst>
+              <a:ext uri="{FF2B5EF4-FFF2-40B4-BE49-F238E27FC236}">
+                <a16:creationId xmlns:a16="http://schemas.microsoft.com/office/drawing/2014/main" id="{E6DFEAC6-0EE7-4BE6-AAFB-9B914077D47F}"/>
+              </a:ext>
+            </a:extLst>
+          </p:cNvPr>
+          <p:cNvSpPr txBox="1"/>
+          <p:nvPr/>
+        </p:nvSpPr>
+        <p:spPr>
+          <a:xfrm>
+            <a:off x="5650230" y="6451501"/>
+            <a:ext cx="1021473" cy="369332"/>
+          </a:xfrm>
+          <a:prstGeom prst="rect">
+            <a:avLst/>
+          </a:prstGeom>
+          <a:noFill/>
+        </p:spPr>
+        <p:txBody>
+          <a:bodyPr wrap="square" rtlCol="0">
+            <a:spAutoFit/>
+          </a:bodyPr>
+          <a:lstStyle/>
+          <a:p>
+            <a:pPr algn="ctr"/>
+            <a:r>
+              <a:rPr lang="en-US" dirty="0"/>
+              <a:t>7 of 22</a:t>
+            </a:r>
+          </a:p>
+        </p:txBody>
+      </p:sp>
     </p:spTree>
     <p:extLst>
       <p:ext uri="{BB962C8B-B14F-4D97-AF65-F5344CB8AC3E}">
@@ -9360,42 +9540,6 @@
             <a:r>
               <a:rPr lang="en-US" dirty="0"/>
               <a:t> Router Chain</a:t>
-            </a:r>
-          </a:p>
-        </p:txBody>
-      </p:sp>
-      <p:sp>
-        <p:nvSpPr>
-          <p:cNvPr id="4" name="TextBox 3">
-            <a:extLst>
-              <a:ext uri="{FF2B5EF4-FFF2-40B4-BE49-F238E27FC236}">
-                <a16:creationId xmlns:a16="http://schemas.microsoft.com/office/drawing/2014/main" id="{9ED3D534-BBDF-481B-B958-084DF4878A72}"/>
-              </a:ext>
-            </a:extLst>
-          </p:cNvPr>
-          <p:cNvSpPr txBox="1"/>
-          <p:nvPr/>
-        </p:nvSpPr>
-        <p:spPr>
-          <a:xfrm>
-            <a:off x="5650230" y="6451501"/>
-            <a:ext cx="1021473" cy="369332"/>
-          </a:xfrm>
-          <a:prstGeom prst="rect">
-            <a:avLst/>
-          </a:prstGeom>
-          <a:noFill/>
-        </p:spPr>
-        <p:txBody>
-          <a:bodyPr wrap="square" rtlCol="0">
-            <a:spAutoFit/>
-          </a:bodyPr>
-          <a:lstStyle/>
-          <a:p>
-            <a:pPr algn="ctr"/>
-            <a:r>
-              <a:rPr lang="en-US" dirty="0"/>
-              <a:t>4 of n</a:t>
             </a:r>
           </a:p>
         </p:txBody>
@@ -9468,6 +9612,42 @@
           </a:fontRef>
         </p:style>
       </p:cxnSp>
+      <p:sp>
+        <p:nvSpPr>
+          <p:cNvPr id="8" name="TextBox 7">
+            <a:extLst>
+              <a:ext uri="{FF2B5EF4-FFF2-40B4-BE49-F238E27FC236}">
+                <a16:creationId xmlns:a16="http://schemas.microsoft.com/office/drawing/2014/main" id="{92F37A4E-C2E8-4BF8-9E55-E6B77505D1E0}"/>
+              </a:ext>
+            </a:extLst>
+          </p:cNvPr>
+          <p:cNvSpPr txBox="1"/>
+          <p:nvPr/>
+        </p:nvSpPr>
+        <p:spPr>
+          <a:xfrm>
+            <a:off x="5650230" y="6451501"/>
+            <a:ext cx="1021473" cy="369332"/>
+          </a:xfrm>
+          <a:prstGeom prst="rect">
+            <a:avLst/>
+          </a:prstGeom>
+          <a:noFill/>
+        </p:spPr>
+        <p:txBody>
+          <a:bodyPr wrap="square" rtlCol="0">
+            <a:spAutoFit/>
+          </a:bodyPr>
+          <a:lstStyle/>
+          <a:p>
+            <a:pPr algn="ctr"/>
+            <a:r>
+              <a:rPr lang="en-US" dirty="0"/>
+              <a:t>8 of 22</a:t>
+            </a:r>
+          </a:p>
+        </p:txBody>
+      </p:sp>
     </p:spTree>
     <p:extLst>
       <p:ext uri="{BB962C8B-B14F-4D97-AF65-F5344CB8AC3E}">

</xml_diff>